<commit_message>
updated thermal demand overview
</commit_message>
<xml_diff>
--- a/docs/source/overview/OverviewFigures/ModelFramework.pptx
+++ b/docs/source/overview/OverviewFigures/ModelFramework.pptx
@@ -12,7 +12,7 @@
   </p:handoutMasterIdLst>
   <p:sldIdLst>
     <p:sldId id="580" r:id="rId5"/>
-    <p:sldId id="581" r:id="rId6"/>
+    <p:sldId id="582" r:id="rId6"/>
   </p:sldIdLst>
   <p:sldSz cx="12801600" cy="9601200" type="A3"/>
   <p:notesSz cx="6858000" cy="9144000"/>
@@ -231,7 +231,7 @@
               <a:rPr lang="fr-CH" smtClean="0">
                 <a:latin typeface="Arial" panose="020B0604020202020204" pitchFamily="34" charset="0"/>
               </a:rPr>
-              <a:t>21.05.2021</a:t>
+              <a:t>26.05.2021</a:t>
             </a:fld>
             <a:endParaRPr lang="fr-CH" dirty="0">
               <a:latin typeface="Arial" panose="020B0604020202020204" pitchFamily="34" charset="0"/>
@@ -409,7 +409,7 @@
             <a:fld id="{F8103E42-5239-1A40-AD33-3EE7E9DDF5FD}" type="datetimeFigureOut">
               <a:rPr lang="fr-FR" smtClean="0"/>
               <a:pPr/>
-              <a:t>21/05/2021</a:t>
+              <a:t>26/05/2021</a:t>
             </a:fld>
             <a:endParaRPr lang="fr-FR" dirty="0"/>
           </a:p>
@@ -1172,7 +1172,7 @@
           <a:p>
             <a:fld id="{EF9482FC-9AB3-46A7-ABC6-51DDE6D61A09}" type="datetime1">
               <a:rPr lang="fr-FR" smtClean="0"/>
-              <a:t>21/05/2021</a:t>
+              <a:t>26/05/2021</a:t>
             </a:fld>
             <a:endParaRPr lang="fr-FR" dirty="0"/>
           </a:p>
@@ -1361,7 +1361,7 @@
           <a:p>
             <a:fld id="{91547178-8E40-4915-9EB6-1845F8C5E722}" type="datetime1">
               <a:rPr lang="fr-FR" smtClean="0"/>
-              <a:t>21/05/2021</a:t>
+              <a:t>26/05/2021</a:t>
             </a:fld>
             <a:endParaRPr lang="fr-FR" dirty="0"/>
           </a:p>
@@ -1584,7 +1584,7 @@
           <a:p>
             <a:fld id="{E6CA7ED0-0D7A-41F0-B0A2-2F3DFE81CF85}" type="datetime1">
               <a:rPr lang="fr-FR" smtClean="0"/>
-              <a:t>21/05/2021</a:t>
+              <a:t>26/05/2021</a:t>
             </a:fld>
             <a:endParaRPr lang="fr-FR" dirty="0"/>
           </a:p>
@@ -1723,7 +1723,7 @@
           <a:p>
             <a:fld id="{E702D0B3-9A32-410B-928E-ECBD64C11FE5}" type="datetime1">
               <a:rPr lang="fr-FR" smtClean="0"/>
-              <a:t>21/05/2021</a:t>
+              <a:t>26/05/2021</a:t>
             </a:fld>
             <a:endParaRPr lang="fr-FR" dirty="0"/>
           </a:p>
@@ -1878,7 +1878,7 @@
           <a:p>
             <a:fld id="{DA46868D-3466-4CF3-9C27-1C139CA722B0}" type="datetime1">
               <a:rPr lang="fr-FR" smtClean="0"/>
-              <a:t>21/05/2021</a:t>
+              <a:t>26/05/2021</a:t>
             </a:fld>
             <a:endParaRPr lang="fr-FR" dirty="0"/>
           </a:p>
@@ -2077,7 +2077,7 @@
           <a:p>
             <a:fld id="{D3955088-C68A-4210-B8F8-E599D5BF2D4B}" type="datetime1">
               <a:rPr lang="fr-FR" smtClean="0"/>
-              <a:t>21/05/2021</a:t>
+              <a:t>26/05/2021</a:t>
             </a:fld>
             <a:endParaRPr lang="fr-FR" dirty="0"/>
           </a:p>
@@ -2227,7 +2227,7 @@
           <a:p>
             <a:fld id="{57309B73-E384-487B-8CA1-6D369C2B9B9E}" type="datetime1">
               <a:rPr lang="fr-FR" smtClean="0"/>
-              <a:t>21/05/2021</a:t>
+              <a:t>26/05/2021</a:t>
             </a:fld>
             <a:endParaRPr lang="fr-FR" dirty="0"/>
           </a:p>
@@ -4700,7 +4700,7 @@
           <a:p>
             <a:fld id="{50A128C6-6946-487B-A8F4-6781FB41955F}" type="datetime1">
               <a:rPr lang="fr-FR" smtClean="0"/>
-              <a:t>21/05/2021</a:t>
+              <a:t>26/05/2021</a:t>
             </a:fld>
             <a:endParaRPr lang="fr-FR" dirty="0"/>
           </a:p>
@@ -5066,7 +5066,7 @@
           <a:p>
             <a:fld id="{D594687E-B679-48C9-A5CA-9F847271E7E4}" type="datetime1">
               <a:rPr lang="fr-FR" smtClean="0"/>
-              <a:t>21/05/2021</a:t>
+              <a:t>26/05/2021</a:t>
             </a:fld>
             <a:endParaRPr lang="fr-FR" dirty="0"/>
           </a:p>
@@ -5432,7 +5432,7 @@
           <a:p>
             <a:fld id="{0D075207-25A7-4DCE-80A0-444AA65A29A7}" type="datetime1">
               <a:rPr lang="fr-FR" smtClean="0"/>
-              <a:t>21/05/2021</a:t>
+              <a:t>26/05/2021</a:t>
             </a:fld>
             <a:endParaRPr lang="fr-FR" dirty="0"/>
           </a:p>
@@ -5681,7 +5681,7 @@
           <a:p>
             <a:fld id="{489662C4-08C7-4947-8DF4-007AEBE7E573}" type="datetime1">
               <a:rPr lang="fr-FR" smtClean="0"/>
-              <a:t>21/05/2021</a:t>
+              <a:t>26/05/2021</a:t>
             </a:fld>
             <a:endParaRPr lang="fr-FR" dirty="0"/>
           </a:p>
@@ -5841,7 +5841,7 @@
           <a:p>
             <a:fld id="{2CFD78B9-21FB-4ADD-B4FB-87751F68C35B}" type="datetime1">
               <a:rPr lang="fr-FR" smtClean="0"/>
-              <a:t>21/05/2021</a:t>
+              <a:t>26/05/2021</a:t>
             </a:fld>
             <a:endParaRPr lang="fr-FR" dirty="0"/>
           </a:p>
@@ -5999,7 +5999,7 @@
           <a:p>
             <a:fld id="{8511CBC6-6ACA-4166-8DFC-1084691521E9}" type="datetime1">
               <a:rPr lang="fr-FR" smtClean="0"/>
-              <a:t>21/05/2021</a:t>
+              <a:t>26/05/2021</a:t>
             </a:fld>
             <a:endParaRPr lang="fr-FR" dirty="0"/>
           </a:p>
@@ -6219,7 +6219,7 @@
           <a:p>
             <a:fld id="{11C4889B-0FEB-4B19-AA6C-219D62F242D3}" type="datetime1">
               <a:rPr lang="fr-FR" smtClean="0"/>
-              <a:t>21/05/2021</a:t>
+              <a:t>26/05/2021</a:t>
             </a:fld>
             <a:endParaRPr lang="fr-FR" dirty="0"/>
           </a:p>
@@ -11559,6 +11559,83 @@
           </p:cxnSp>
         </p:grpSp>
       </p:grpSp>
+      <p:sp>
+        <p:nvSpPr>
+          <p:cNvPr id="8" name="TextBox 7">
+            <a:extLst>
+              <a:ext uri="{FF2B5EF4-FFF2-40B4-BE49-F238E27FC236}">
+                <a16:creationId xmlns:a16="http://schemas.microsoft.com/office/drawing/2014/main" id="{C5FCF719-10D1-4228-916C-8E7D09DBA3DD}"/>
+              </a:ext>
+            </a:extLst>
+          </p:cNvPr>
+          <p:cNvSpPr txBox="1"/>
+          <p:nvPr/>
+        </p:nvSpPr>
+        <p:spPr>
+          <a:xfrm>
+            <a:off x="333633" y="357380"/>
+            <a:ext cx="12362498" cy="1171283"/>
+          </a:xfrm>
+          <a:prstGeom prst="rect">
+            <a:avLst/>
+          </a:prstGeom>
+          <a:noFill/>
+        </p:spPr>
+        <p:txBody>
+          <a:bodyPr wrap="square" rtlCol="0">
+            <a:spAutoFit/>
+          </a:bodyPr>
+          <a:lstStyle/>
+          <a:p>
+            <a:r>
+              <a:rPr lang="fr-CH" b="1" dirty="0" err="1"/>
+              <a:t>Where</a:t>
+            </a:r>
+            <a:r>
+              <a:rPr lang="fr-CH" b="1" dirty="0"/>
+              <a:t>: </a:t>
+            </a:r>
+            <a:r>
+              <a:rPr lang="fr-CH" dirty="0" err="1"/>
+              <a:t>overview</a:t>
+            </a:r>
+            <a:r>
+              <a:rPr lang="fr-CH" dirty="0"/>
+              <a:t>&gt;index</a:t>
+            </a:r>
+          </a:p>
+          <a:p>
+            <a:r>
+              <a:rPr lang="fr-CH" b="1" dirty="0"/>
+              <a:t>Name: </a:t>
+            </a:r>
+            <a:r>
+              <a:rPr lang="en-US" dirty="0"/>
+              <a:t>ModelFramework.png </a:t>
+            </a:r>
+            <a:endParaRPr lang="fr-CH" b="1" dirty="0"/>
+          </a:p>
+          <a:p>
+            <a:r>
+              <a:rPr lang="en-US" b="1" dirty="0"/>
+              <a:t>Caption</a:t>
+            </a:r>
+            <a:r>
+              <a:rPr lang="en-US" dirty="0"/>
+              <a:t>: Domestic energy demand model framework using </a:t>
+            </a:r>
+            <a:r>
+              <a:rPr lang="en-US" dirty="0" err="1"/>
+              <a:t>demod</a:t>
+            </a:r>
+            <a:r>
+              <a:rPr lang="en-US" dirty="0"/>
+              <a:t>: a possible configuration</a:t>
+            </a:r>
+            <a:endParaRPr lang="en-US" b="1" dirty="0"/>
+          </a:p>
+        </p:txBody>
+      </p:sp>
     </p:spTree>
     <p:extLst>
       <p:ext uri="{BB962C8B-B14F-4D97-AF65-F5344CB8AC3E}">
@@ -11591,68 +11668,3064 @@
       </p:grpSpPr>
       <p:sp>
         <p:nvSpPr>
-          <p:cNvPr id="3" name="Slide Number Placeholder 2">
+          <p:cNvPr id="71" name="Rectangle 70">
             <a:extLst>
               <a:ext uri="{FF2B5EF4-FFF2-40B4-BE49-F238E27FC236}">
-                <a16:creationId xmlns:a16="http://schemas.microsoft.com/office/drawing/2014/main" id="{8B3D17D9-1B16-4C04-A8D0-82E63BDA7942}"/>
+                <a16:creationId xmlns:a16="http://schemas.microsoft.com/office/drawing/2014/main" id="{F1FCD02E-E1CE-42D3-8EE2-67196D1378E5}"/>
               </a:ext>
             </a:extLst>
           </p:cNvPr>
-          <p:cNvSpPr>
-            <a:spLocks noGrp="1"/>
-          </p:cNvSpPr>
-          <p:nvPr>
-            <p:ph type="sldNum" sz="quarter" idx="12"/>
-          </p:nvPr>
+          <p:cNvSpPr/>
+          <p:nvPr/>
         </p:nvSpPr>
-        <p:spPr/>
+        <p:spPr>
+          <a:xfrm>
+            <a:off x="9364851" y="5978144"/>
+            <a:ext cx="1282863" cy="1002974"/>
+          </a:xfrm>
+          <a:prstGeom prst="rect">
+            <a:avLst/>
+          </a:prstGeom>
+          <a:solidFill>
+            <a:schemeClr val="bg1"/>
+          </a:solidFill>
+          <a:ln>
+            <a:solidFill>
+              <a:schemeClr val="tx1"/>
+            </a:solidFill>
+            <a:prstDash val="dash"/>
+          </a:ln>
+        </p:spPr>
+        <p:style>
+          <a:lnRef idx="2">
+            <a:schemeClr val="accent1">
+              <a:shade val="50000"/>
+            </a:schemeClr>
+          </a:lnRef>
+          <a:fillRef idx="1">
+            <a:schemeClr val="accent1"/>
+          </a:fillRef>
+          <a:effectRef idx="0">
+            <a:schemeClr val="accent1"/>
+          </a:effectRef>
+          <a:fontRef idx="minor">
+            <a:schemeClr val="lt1"/>
+          </a:fontRef>
+        </p:style>
         <p:txBody>
-          <a:bodyPr/>
+          <a:bodyPr rtlCol="0" anchor="ctr"/>
           <a:lstStyle/>
           <a:p>
-            <a:fld id="{E1E1CD7C-2161-7D43-862E-CE4C333CD873}" type="slidenum">
-              <a:rPr lang="fr-FR" smtClean="0"/>
-              <a:pPr/>
-              <a:t>2</a:t>
-            </a:fld>
-            <a:endParaRPr lang="fr-FR" dirty="0"/>
+            <a:pPr algn="ctr"/>
+            <a:endParaRPr lang="en-US"/>
           </a:p>
         </p:txBody>
       </p:sp>
-      <p:pic>
-        <p:nvPicPr>
-          <p:cNvPr id="4" name="Picture 3">
+      <p:cxnSp>
+        <p:nvCxnSpPr>
+          <p:cNvPr id="143" name="Connector: Elbow 142">
             <a:extLst>
               <a:ext uri="{FF2B5EF4-FFF2-40B4-BE49-F238E27FC236}">
-                <a16:creationId xmlns:a16="http://schemas.microsoft.com/office/drawing/2014/main" id="{DDCB5248-1ACE-4794-82C5-F1BF2D05618F}"/>
+                <a16:creationId xmlns:a16="http://schemas.microsoft.com/office/drawing/2014/main" id="{C6453F5B-460B-475A-91E3-B848EC25670F}"/>
               </a:ext>
             </a:extLst>
           </p:cNvPr>
-          <p:cNvPicPr>
-            <a:picLocks noChangeAspect="1"/>
-          </p:cNvPicPr>
+          <p:cNvCxnSpPr>
+            <a:cxnSpLocks/>
+            <a:stCxn id="78" idx="3"/>
+            <a:endCxn id="145" idx="1"/>
+          </p:cNvCxnSpPr>
           <p:nvPr/>
-        </p:nvPicPr>
-        <p:blipFill>
-          <a:blip r:embed="rId2"/>
-          <a:stretch>
-            <a:fillRect/>
-          </a:stretch>
-        </p:blipFill>
+        </p:nvCxnSpPr>
         <p:spPr>
           <a:xfrm>
-            <a:off x="2044830" y="2747211"/>
-            <a:ext cx="8711939" cy="4322439"/>
+            <a:off x="3591028" y="4851118"/>
+            <a:ext cx="702222" cy="769988"/>
+          </a:xfrm>
+          <a:prstGeom prst="bentConnector3">
+            <a:avLst>
+              <a:gd name="adj1" fmla="val 50000"/>
+            </a:avLst>
+          </a:prstGeom>
+          <a:ln w="19050">
+            <a:solidFill>
+              <a:schemeClr val="tx1"/>
+            </a:solidFill>
+            <a:tailEnd type="triangle"/>
+          </a:ln>
+        </p:spPr>
+        <p:style>
+          <a:lnRef idx="1">
+            <a:schemeClr val="accent1"/>
+          </a:lnRef>
+          <a:fillRef idx="0">
+            <a:schemeClr val="accent1"/>
+          </a:fillRef>
+          <a:effectRef idx="0">
+            <a:schemeClr val="accent1"/>
+          </a:effectRef>
+          <a:fontRef idx="minor">
+            <a:schemeClr val="tx1"/>
+          </a:fontRef>
+        </p:style>
+      </p:cxnSp>
+      <p:grpSp>
+        <p:nvGrpSpPr>
+          <p:cNvPr id="26" name="Group 25">
+            <a:extLst>
+              <a:ext uri="{FF2B5EF4-FFF2-40B4-BE49-F238E27FC236}">
+                <a16:creationId xmlns:a16="http://schemas.microsoft.com/office/drawing/2014/main" id="{34FDD4DD-0807-4130-BDE1-EC7C01C55082}"/>
+              </a:ext>
+            </a:extLst>
+          </p:cNvPr>
+          <p:cNvGrpSpPr/>
+          <p:nvPr/>
+        </p:nvGrpSpPr>
+        <p:grpSpPr>
+          <a:xfrm>
+            <a:off x="9865324" y="4336251"/>
+            <a:ext cx="1495168" cy="677058"/>
+            <a:chOff x="10145705" y="3130887"/>
+            <a:chExt cx="1495168" cy="677058"/>
+          </a:xfrm>
+        </p:grpSpPr>
+        <p:sp>
+          <p:nvSpPr>
+            <p:cNvPr id="20" name="Parallelogram 19">
+              <a:extLst>
+                <a:ext uri="{FF2B5EF4-FFF2-40B4-BE49-F238E27FC236}">
+                  <a16:creationId xmlns:a16="http://schemas.microsoft.com/office/drawing/2014/main" id="{63F2F2E5-50AB-4358-8925-5F5B3A8DF8F8}"/>
+                </a:ext>
+              </a:extLst>
+            </p:cNvPr>
+            <p:cNvSpPr/>
+            <p:nvPr/>
+          </p:nvSpPr>
+          <p:spPr>
+            <a:xfrm rot="10800000" flipV="1">
+              <a:off x="10145705" y="3130887"/>
+              <a:ext cx="1495168" cy="667265"/>
+            </a:xfrm>
+            <a:prstGeom prst="parallelogram">
+              <a:avLst/>
+            </a:prstGeom>
+            <a:noFill/>
+            <a:ln w="19050">
+              <a:solidFill>
+                <a:schemeClr val="tx1"/>
+              </a:solidFill>
+            </a:ln>
+          </p:spPr>
+          <p:style>
+            <a:lnRef idx="2">
+              <a:schemeClr val="accent1">
+                <a:shade val="50000"/>
+              </a:schemeClr>
+            </a:lnRef>
+            <a:fillRef idx="1">
+              <a:schemeClr val="accent1"/>
+            </a:fillRef>
+            <a:effectRef idx="0">
+              <a:schemeClr val="accent1"/>
+            </a:effectRef>
+            <a:fontRef idx="minor">
+              <a:schemeClr val="lt1"/>
+            </a:fontRef>
+          </p:style>
+          <p:txBody>
+            <a:bodyPr rtlCol="0" anchor="ctr"/>
+            <a:lstStyle/>
+            <a:p>
+              <a:pPr algn="ctr"/>
+              <a:r>
+                <a:rPr lang="en-US" sz="1200" b="1" dirty="0">
+                  <a:solidFill>
+                    <a:schemeClr val="tx1"/>
+                  </a:solidFill>
+                </a:rPr>
+                <a:t>Domestic electric or gas demand</a:t>
+              </a:r>
+            </a:p>
+          </p:txBody>
+        </p:sp>
+        <p:sp>
+          <p:nvSpPr>
+            <p:cNvPr id="24" name="Rectangle 23">
+              <a:extLst>
+                <a:ext uri="{FF2B5EF4-FFF2-40B4-BE49-F238E27FC236}">
+                  <a16:creationId xmlns:a16="http://schemas.microsoft.com/office/drawing/2014/main" id="{0AC8D897-E59A-4114-AC5C-9C087E4AC301}"/>
+                </a:ext>
+              </a:extLst>
+            </p:cNvPr>
+            <p:cNvSpPr/>
+            <p:nvPr/>
+          </p:nvSpPr>
+          <p:spPr>
+            <a:xfrm>
+              <a:off x="10184543" y="3140680"/>
+              <a:ext cx="1445339" cy="337754"/>
+            </a:xfrm>
+            <a:prstGeom prst="rect">
+              <a:avLst/>
+            </a:prstGeom>
+            <a:noFill/>
+            <a:ln w="19050">
+              <a:noFill/>
+            </a:ln>
+          </p:spPr>
+          <p:style>
+            <a:lnRef idx="2">
+              <a:schemeClr val="accent1">
+                <a:shade val="50000"/>
+              </a:schemeClr>
+            </a:lnRef>
+            <a:fillRef idx="1">
+              <a:schemeClr val="accent1"/>
+            </a:fillRef>
+            <a:effectRef idx="0">
+              <a:schemeClr val="accent1"/>
+            </a:effectRef>
+            <a:fontRef idx="minor">
+              <a:schemeClr val="lt1"/>
+            </a:fontRef>
+          </p:style>
+          <p:txBody>
+            <a:bodyPr rtlCol="0" anchor="ctr"/>
+            <a:lstStyle/>
+            <a:p>
+              <a:pPr algn="ctr"/>
+              <a:endParaRPr lang="en-US" sz="1200" b="1" dirty="0">
+                <a:solidFill>
+                  <a:schemeClr val="tx1"/>
+                </a:solidFill>
+              </a:endParaRPr>
+            </a:p>
+          </p:txBody>
+        </p:sp>
+        <p:sp>
+          <p:nvSpPr>
+            <p:cNvPr id="25" name="Rectangle 24">
+              <a:extLst>
+                <a:ext uri="{FF2B5EF4-FFF2-40B4-BE49-F238E27FC236}">
+                  <a16:creationId xmlns:a16="http://schemas.microsoft.com/office/drawing/2014/main" id="{7CB37A1A-A9CE-450F-B97D-1593A88EA067}"/>
+                </a:ext>
+              </a:extLst>
+            </p:cNvPr>
+            <p:cNvSpPr/>
+            <p:nvPr/>
+          </p:nvSpPr>
+          <p:spPr>
+            <a:xfrm>
+              <a:off x="10293178" y="3478434"/>
+              <a:ext cx="1262750" cy="329511"/>
+            </a:xfrm>
+            <a:prstGeom prst="rect">
+              <a:avLst/>
+            </a:prstGeom>
+            <a:noFill/>
+            <a:ln w="19050">
+              <a:noFill/>
+            </a:ln>
+          </p:spPr>
+          <p:style>
+            <a:lnRef idx="2">
+              <a:schemeClr val="accent1">
+                <a:shade val="50000"/>
+              </a:schemeClr>
+            </a:lnRef>
+            <a:fillRef idx="1">
+              <a:schemeClr val="accent1"/>
+            </a:fillRef>
+            <a:effectRef idx="0">
+              <a:schemeClr val="accent1"/>
+            </a:effectRef>
+            <a:fontRef idx="minor">
+              <a:schemeClr val="lt1"/>
+            </a:fontRef>
+          </p:style>
+          <p:txBody>
+            <a:bodyPr rtlCol="0" anchor="ctr"/>
+            <a:lstStyle/>
+            <a:p>
+              <a:pPr algn="ctr"/>
+              <a:endParaRPr lang="en-US" sz="1200" b="1" dirty="0">
+                <a:solidFill>
+                  <a:schemeClr val="tx1"/>
+                </a:solidFill>
+              </a:endParaRPr>
+            </a:p>
+          </p:txBody>
+        </p:sp>
+      </p:grpSp>
+      <p:cxnSp>
+        <p:nvCxnSpPr>
+          <p:cNvPr id="41" name="Straight Arrow Connector 40">
+            <a:extLst>
+              <a:ext uri="{FF2B5EF4-FFF2-40B4-BE49-F238E27FC236}">
+                <a16:creationId xmlns:a16="http://schemas.microsoft.com/office/drawing/2014/main" id="{01440E02-E2F4-475A-8511-4A1834F46118}"/>
+              </a:ext>
+            </a:extLst>
+          </p:cNvPr>
+          <p:cNvCxnSpPr>
+            <a:cxnSpLocks/>
+            <a:stCxn id="68" idx="2"/>
+            <a:endCxn id="37" idx="1"/>
+          </p:cNvCxnSpPr>
+          <p:nvPr/>
+        </p:nvCxnSpPr>
+        <p:spPr>
+          <a:xfrm flipV="1">
+            <a:off x="3626769" y="3470743"/>
+            <a:ext cx="683666" cy="2939"/>
+          </a:xfrm>
+          <a:prstGeom prst="straightConnector1">
+            <a:avLst/>
+          </a:prstGeom>
+          <a:ln w="19050">
+            <a:solidFill>
+              <a:schemeClr val="tx1"/>
+            </a:solidFill>
+            <a:tailEnd type="triangle"/>
+          </a:ln>
+        </p:spPr>
+        <p:style>
+          <a:lnRef idx="1">
+            <a:schemeClr val="accent1"/>
+          </a:lnRef>
+          <a:fillRef idx="0">
+            <a:schemeClr val="accent1"/>
+          </a:fillRef>
+          <a:effectRef idx="0">
+            <a:schemeClr val="accent1"/>
+          </a:effectRef>
+          <a:fontRef idx="minor">
+            <a:schemeClr val="tx1"/>
+          </a:fontRef>
+        </p:style>
+      </p:cxnSp>
+      <p:grpSp>
+        <p:nvGrpSpPr>
+          <p:cNvPr id="63" name="Group 62">
+            <a:extLst>
+              <a:ext uri="{FF2B5EF4-FFF2-40B4-BE49-F238E27FC236}">
+                <a16:creationId xmlns:a16="http://schemas.microsoft.com/office/drawing/2014/main" id="{2659AFAC-5FFC-4D2E-BC74-43C09416E24B}"/>
+              </a:ext>
+            </a:extLst>
+          </p:cNvPr>
+          <p:cNvGrpSpPr/>
+          <p:nvPr/>
+        </p:nvGrpSpPr>
+        <p:grpSpPr>
+          <a:xfrm>
+            <a:off x="2228028" y="5471515"/>
+            <a:ext cx="1495168" cy="667266"/>
+            <a:chOff x="10179909" y="3140680"/>
+            <a:chExt cx="1495168" cy="667266"/>
+          </a:xfrm>
+        </p:grpSpPr>
+        <p:sp>
+          <p:nvSpPr>
+            <p:cNvPr id="64" name="Parallelogram 63">
+              <a:extLst>
+                <a:ext uri="{FF2B5EF4-FFF2-40B4-BE49-F238E27FC236}">
+                  <a16:creationId xmlns:a16="http://schemas.microsoft.com/office/drawing/2014/main" id="{DD56E352-F5DE-4176-AB54-2BAF09830017}"/>
+                </a:ext>
+              </a:extLst>
+            </p:cNvPr>
+            <p:cNvSpPr/>
+            <p:nvPr/>
+          </p:nvSpPr>
+          <p:spPr>
+            <a:xfrm>
+              <a:off x="10179909" y="3140680"/>
+              <a:ext cx="1495168" cy="667266"/>
+            </a:xfrm>
+            <a:prstGeom prst="parallelogram">
+              <a:avLst/>
+            </a:prstGeom>
+            <a:noFill/>
+            <a:ln w="19050">
+              <a:solidFill>
+                <a:schemeClr val="tx1"/>
+              </a:solidFill>
+            </a:ln>
+          </p:spPr>
+          <p:style>
+            <a:lnRef idx="2">
+              <a:schemeClr val="accent1">
+                <a:shade val="50000"/>
+              </a:schemeClr>
+            </a:lnRef>
+            <a:fillRef idx="1">
+              <a:schemeClr val="accent1"/>
+            </a:fillRef>
+            <a:effectRef idx="0">
+              <a:schemeClr val="accent1"/>
+            </a:effectRef>
+            <a:fontRef idx="minor">
+              <a:schemeClr val="lt1"/>
+            </a:fontRef>
+          </p:style>
+          <p:txBody>
+            <a:bodyPr rtlCol="0" anchor="ctr"/>
+            <a:lstStyle/>
+            <a:p>
+              <a:pPr algn="ctr"/>
+              <a:r>
+                <a:rPr lang="en-US" sz="1200" b="1" dirty="0">
+                  <a:solidFill>
+                    <a:schemeClr val="tx1"/>
+                  </a:solidFill>
+                </a:rPr>
+                <a:t>Thermostat empirical setting </a:t>
+              </a:r>
+            </a:p>
+          </p:txBody>
+        </p:sp>
+        <p:sp>
+          <p:nvSpPr>
+            <p:cNvPr id="65" name="Rectangle 64">
+              <a:extLst>
+                <a:ext uri="{FF2B5EF4-FFF2-40B4-BE49-F238E27FC236}">
+                  <a16:creationId xmlns:a16="http://schemas.microsoft.com/office/drawing/2014/main" id="{2E3366D1-3DD7-49D1-B9E8-8ECC50089A20}"/>
+                </a:ext>
+              </a:extLst>
+            </p:cNvPr>
+            <p:cNvSpPr/>
+            <p:nvPr/>
+          </p:nvSpPr>
+          <p:spPr>
+            <a:xfrm>
+              <a:off x="10293178" y="3140680"/>
+              <a:ext cx="1336704" cy="337754"/>
+            </a:xfrm>
+            <a:prstGeom prst="rect">
+              <a:avLst/>
+            </a:prstGeom>
+            <a:noFill/>
+            <a:ln w="19050">
+              <a:noFill/>
+            </a:ln>
+          </p:spPr>
+          <p:style>
+            <a:lnRef idx="2">
+              <a:schemeClr val="accent1">
+                <a:shade val="50000"/>
+              </a:schemeClr>
+            </a:lnRef>
+            <a:fillRef idx="1">
+              <a:schemeClr val="accent1"/>
+            </a:fillRef>
+            <a:effectRef idx="0">
+              <a:schemeClr val="accent1"/>
+            </a:effectRef>
+            <a:fontRef idx="minor">
+              <a:schemeClr val="lt1"/>
+            </a:fontRef>
+          </p:style>
+          <p:txBody>
+            <a:bodyPr rtlCol="0" anchor="ctr"/>
+            <a:lstStyle/>
+            <a:p>
+              <a:pPr algn="ctr"/>
+              <a:endParaRPr lang="en-US" sz="1200" b="1" dirty="0">
+                <a:solidFill>
+                  <a:schemeClr val="tx1"/>
+                </a:solidFill>
+              </a:endParaRPr>
+            </a:p>
+          </p:txBody>
+        </p:sp>
+        <p:sp>
+          <p:nvSpPr>
+            <p:cNvPr id="66" name="Rectangle 65">
+              <a:extLst>
+                <a:ext uri="{FF2B5EF4-FFF2-40B4-BE49-F238E27FC236}">
+                  <a16:creationId xmlns:a16="http://schemas.microsoft.com/office/drawing/2014/main" id="{B62759EE-4E70-4FDB-96E6-213132E35247}"/>
+                </a:ext>
+              </a:extLst>
+            </p:cNvPr>
+            <p:cNvSpPr/>
+            <p:nvPr/>
+          </p:nvSpPr>
+          <p:spPr>
+            <a:xfrm>
+              <a:off x="10219223" y="3478434"/>
+              <a:ext cx="1336705" cy="329511"/>
+            </a:xfrm>
+            <a:prstGeom prst="rect">
+              <a:avLst/>
+            </a:prstGeom>
+            <a:noFill/>
+            <a:ln w="19050">
+              <a:noFill/>
+            </a:ln>
+          </p:spPr>
+          <p:style>
+            <a:lnRef idx="2">
+              <a:schemeClr val="accent1">
+                <a:shade val="50000"/>
+              </a:schemeClr>
+            </a:lnRef>
+            <a:fillRef idx="1">
+              <a:schemeClr val="accent1"/>
+            </a:fillRef>
+            <a:effectRef idx="0">
+              <a:schemeClr val="accent1"/>
+            </a:effectRef>
+            <a:fontRef idx="minor">
+              <a:schemeClr val="lt1"/>
+            </a:fontRef>
+          </p:style>
+          <p:txBody>
+            <a:bodyPr rtlCol="0" anchor="ctr"/>
+            <a:lstStyle/>
+            <a:p>
+              <a:pPr algn="ctr"/>
+              <a:endParaRPr lang="en-US" sz="1200" b="1" dirty="0">
+                <a:solidFill>
+                  <a:schemeClr val="tx1"/>
+                </a:solidFill>
+              </a:endParaRPr>
+            </a:p>
+          </p:txBody>
+        </p:sp>
+      </p:grpSp>
+      <p:grpSp>
+        <p:nvGrpSpPr>
+          <p:cNvPr id="67" name="Group 66">
+            <a:extLst>
+              <a:ext uri="{FF2B5EF4-FFF2-40B4-BE49-F238E27FC236}">
+                <a16:creationId xmlns:a16="http://schemas.microsoft.com/office/drawing/2014/main" id="{82DF7E63-D678-4428-B529-4695A2063AF4}"/>
+              </a:ext>
+            </a:extLst>
+          </p:cNvPr>
+          <p:cNvGrpSpPr/>
+          <p:nvPr/>
+        </p:nvGrpSpPr>
+        <p:grpSpPr>
+          <a:xfrm>
+            <a:off x="2215009" y="3140049"/>
+            <a:ext cx="1495168" cy="667266"/>
+            <a:chOff x="10179909" y="3140680"/>
+            <a:chExt cx="1495168" cy="667266"/>
+          </a:xfrm>
+        </p:grpSpPr>
+        <p:sp>
+          <p:nvSpPr>
+            <p:cNvPr id="68" name="Parallelogram 67">
+              <a:extLst>
+                <a:ext uri="{FF2B5EF4-FFF2-40B4-BE49-F238E27FC236}">
+                  <a16:creationId xmlns:a16="http://schemas.microsoft.com/office/drawing/2014/main" id="{45D6DF3E-B2A1-4F70-ADAD-B54E90D442DE}"/>
+                </a:ext>
+              </a:extLst>
+            </p:cNvPr>
+            <p:cNvSpPr/>
+            <p:nvPr/>
+          </p:nvSpPr>
+          <p:spPr>
+            <a:xfrm>
+              <a:off x="10179909" y="3140680"/>
+              <a:ext cx="1495168" cy="667266"/>
+            </a:xfrm>
+            <a:prstGeom prst="parallelogram">
+              <a:avLst/>
+            </a:prstGeom>
+            <a:noFill/>
+            <a:ln w="19050">
+              <a:solidFill>
+                <a:schemeClr val="tx1"/>
+              </a:solidFill>
+            </a:ln>
+          </p:spPr>
+          <p:style>
+            <a:lnRef idx="2">
+              <a:schemeClr val="accent1">
+                <a:shade val="50000"/>
+              </a:schemeClr>
+            </a:lnRef>
+            <a:fillRef idx="1">
+              <a:schemeClr val="accent1"/>
+            </a:fillRef>
+            <a:effectRef idx="0">
+              <a:schemeClr val="accent1"/>
+            </a:effectRef>
+            <a:fontRef idx="minor">
+              <a:schemeClr val="lt1"/>
+            </a:fontRef>
+          </p:style>
+          <p:txBody>
+            <a:bodyPr rtlCol="0" anchor="ctr"/>
+            <a:lstStyle/>
+            <a:p>
+              <a:pPr algn="ctr"/>
+              <a:r>
+                <a:rPr lang="en-US" sz="1200" b="1" dirty="0">
+                  <a:solidFill>
+                    <a:schemeClr val="tx1"/>
+                  </a:solidFill>
+                </a:rPr>
+                <a:t>Activity profiles</a:t>
+              </a:r>
+            </a:p>
+          </p:txBody>
+        </p:sp>
+        <p:sp>
+          <p:nvSpPr>
+            <p:cNvPr id="69" name="Rectangle 68">
+              <a:extLst>
+                <a:ext uri="{FF2B5EF4-FFF2-40B4-BE49-F238E27FC236}">
+                  <a16:creationId xmlns:a16="http://schemas.microsoft.com/office/drawing/2014/main" id="{7C9EAB58-E2E5-4723-87C9-E4A40A70BEBA}"/>
+                </a:ext>
+              </a:extLst>
+            </p:cNvPr>
+            <p:cNvSpPr/>
+            <p:nvPr/>
+          </p:nvSpPr>
+          <p:spPr>
+            <a:xfrm>
+              <a:off x="10293178" y="3140680"/>
+              <a:ext cx="1336704" cy="337754"/>
+            </a:xfrm>
+            <a:prstGeom prst="rect">
+              <a:avLst/>
+            </a:prstGeom>
+            <a:noFill/>
+            <a:ln w="19050">
+              <a:noFill/>
+            </a:ln>
+          </p:spPr>
+          <p:style>
+            <a:lnRef idx="2">
+              <a:schemeClr val="accent1">
+                <a:shade val="50000"/>
+              </a:schemeClr>
+            </a:lnRef>
+            <a:fillRef idx="1">
+              <a:schemeClr val="accent1"/>
+            </a:fillRef>
+            <a:effectRef idx="0">
+              <a:schemeClr val="accent1"/>
+            </a:effectRef>
+            <a:fontRef idx="minor">
+              <a:schemeClr val="lt1"/>
+            </a:fontRef>
+          </p:style>
+          <p:txBody>
+            <a:bodyPr rtlCol="0" anchor="ctr"/>
+            <a:lstStyle/>
+            <a:p>
+              <a:pPr algn="ctr"/>
+              <a:endParaRPr lang="en-US" sz="1200" b="1" dirty="0">
+                <a:solidFill>
+                  <a:schemeClr val="tx1"/>
+                </a:solidFill>
+              </a:endParaRPr>
+            </a:p>
+          </p:txBody>
+        </p:sp>
+        <p:sp>
+          <p:nvSpPr>
+            <p:cNvPr id="70" name="Rectangle 69">
+              <a:extLst>
+                <a:ext uri="{FF2B5EF4-FFF2-40B4-BE49-F238E27FC236}">
+                  <a16:creationId xmlns:a16="http://schemas.microsoft.com/office/drawing/2014/main" id="{803DA744-68C1-49E1-AD33-8D99C119EA3A}"/>
+                </a:ext>
+              </a:extLst>
+            </p:cNvPr>
+            <p:cNvSpPr/>
+            <p:nvPr/>
+          </p:nvSpPr>
+          <p:spPr>
+            <a:xfrm>
+              <a:off x="10219223" y="3478434"/>
+              <a:ext cx="1336705" cy="329511"/>
+            </a:xfrm>
+            <a:prstGeom prst="rect">
+              <a:avLst/>
+            </a:prstGeom>
+            <a:noFill/>
+            <a:ln w="19050">
+              <a:noFill/>
+            </a:ln>
+          </p:spPr>
+          <p:style>
+            <a:lnRef idx="2">
+              <a:schemeClr val="accent1">
+                <a:shade val="50000"/>
+              </a:schemeClr>
+            </a:lnRef>
+            <a:fillRef idx="1">
+              <a:schemeClr val="accent1"/>
+            </a:fillRef>
+            <a:effectRef idx="0">
+              <a:schemeClr val="accent1"/>
+            </a:effectRef>
+            <a:fontRef idx="minor">
+              <a:schemeClr val="lt1"/>
+            </a:fontRef>
+          </p:style>
+          <p:txBody>
+            <a:bodyPr rtlCol="0" anchor="ctr"/>
+            <a:lstStyle/>
+            <a:p>
+              <a:pPr algn="ctr"/>
+              <a:endParaRPr lang="en-US" sz="1200" b="1" dirty="0">
+                <a:solidFill>
+                  <a:schemeClr val="tx1"/>
+                </a:solidFill>
+              </a:endParaRPr>
+            </a:p>
+          </p:txBody>
+        </p:sp>
+      </p:grpSp>
+      <p:grpSp>
+        <p:nvGrpSpPr>
+          <p:cNvPr id="75" name="Group 74">
+            <a:extLst>
+              <a:ext uri="{FF2B5EF4-FFF2-40B4-BE49-F238E27FC236}">
+                <a16:creationId xmlns:a16="http://schemas.microsoft.com/office/drawing/2014/main" id="{5257683E-8F38-454A-8D3F-DB2023C8F872}"/>
+              </a:ext>
+            </a:extLst>
+          </p:cNvPr>
+          <p:cNvGrpSpPr/>
+          <p:nvPr/>
+        </p:nvGrpSpPr>
+        <p:grpSpPr>
+          <a:xfrm>
+            <a:off x="2215009" y="4348608"/>
+            <a:ext cx="1495168" cy="667266"/>
+            <a:chOff x="10179909" y="3140680"/>
+            <a:chExt cx="1495168" cy="667266"/>
+          </a:xfrm>
+        </p:grpSpPr>
+        <p:sp>
+          <p:nvSpPr>
+            <p:cNvPr id="76" name="Parallelogram 75">
+              <a:extLst>
+                <a:ext uri="{FF2B5EF4-FFF2-40B4-BE49-F238E27FC236}">
+                  <a16:creationId xmlns:a16="http://schemas.microsoft.com/office/drawing/2014/main" id="{43B04606-0B65-43E4-BB4E-8C377D457CB2}"/>
+                </a:ext>
+              </a:extLst>
+            </p:cNvPr>
+            <p:cNvSpPr/>
+            <p:nvPr/>
+          </p:nvSpPr>
+          <p:spPr>
+            <a:xfrm>
+              <a:off x="10179909" y="3140680"/>
+              <a:ext cx="1495168" cy="667266"/>
+            </a:xfrm>
+            <a:prstGeom prst="parallelogram">
+              <a:avLst/>
+            </a:prstGeom>
+            <a:noFill/>
+            <a:ln w="19050">
+              <a:solidFill>
+                <a:schemeClr val="tx1"/>
+              </a:solidFill>
+            </a:ln>
+          </p:spPr>
+          <p:style>
+            <a:lnRef idx="2">
+              <a:schemeClr val="accent1">
+                <a:shade val="50000"/>
+              </a:schemeClr>
+            </a:lnRef>
+            <a:fillRef idx="1">
+              <a:schemeClr val="accent1"/>
+            </a:fillRef>
+            <a:effectRef idx="0">
+              <a:schemeClr val="accent1"/>
+            </a:effectRef>
+            <a:fontRef idx="minor">
+              <a:schemeClr val="lt1"/>
+            </a:fontRef>
+          </p:style>
+          <p:txBody>
+            <a:bodyPr rtlCol="0" anchor="ctr"/>
+            <a:lstStyle/>
+            <a:p>
+              <a:pPr algn="ctr"/>
+              <a:r>
+                <a:rPr lang="en-US" sz="1200" b="1" dirty="0">
+                  <a:solidFill>
+                    <a:schemeClr val="tx1"/>
+                  </a:solidFill>
+                </a:rPr>
+                <a:t>Occupancy profile</a:t>
+              </a:r>
+            </a:p>
+          </p:txBody>
+        </p:sp>
+        <p:sp>
+          <p:nvSpPr>
+            <p:cNvPr id="77" name="Rectangle 76">
+              <a:extLst>
+                <a:ext uri="{FF2B5EF4-FFF2-40B4-BE49-F238E27FC236}">
+                  <a16:creationId xmlns:a16="http://schemas.microsoft.com/office/drawing/2014/main" id="{500219CB-8108-4414-88D8-2A89D13496A9}"/>
+                </a:ext>
+              </a:extLst>
+            </p:cNvPr>
+            <p:cNvSpPr/>
+            <p:nvPr/>
+          </p:nvSpPr>
+          <p:spPr>
+            <a:xfrm>
+              <a:off x="10293178" y="3140680"/>
+              <a:ext cx="1336704" cy="337754"/>
+            </a:xfrm>
+            <a:prstGeom prst="rect">
+              <a:avLst/>
+            </a:prstGeom>
+            <a:noFill/>
+            <a:ln w="19050">
+              <a:noFill/>
+            </a:ln>
+          </p:spPr>
+          <p:style>
+            <a:lnRef idx="2">
+              <a:schemeClr val="accent1">
+                <a:shade val="50000"/>
+              </a:schemeClr>
+            </a:lnRef>
+            <a:fillRef idx="1">
+              <a:schemeClr val="accent1"/>
+            </a:fillRef>
+            <a:effectRef idx="0">
+              <a:schemeClr val="accent1"/>
+            </a:effectRef>
+            <a:fontRef idx="minor">
+              <a:schemeClr val="lt1"/>
+            </a:fontRef>
+          </p:style>
+          <p:txBody>
+            <a:bodyPr rtlCol="0" anchor="ctr"/>
+            <a:lstStyle/>
+            <a:p>
+              <a:pPr algn="ctr"/>
+              <a:endParaRPr lang="en-US" sz="1200" b="1" dirty="0">
+                <a:solidFill>
+                  <a:schemeClr val="tx1"/>
+                </a:solidFill>
+              </a:endParaRPr>
+            </a:p>
+          </p:txBody>
+        </p:sp>
+        <p:sp>
+          <p:nvSpPr>
+            <p:cNvPr id="78" name="Rectangle 77">
+              <a:extLst>
+                <a:ext uri="{FF2B5EF4-FFF2-40B4-BE49-F238E27FC236}">
+                  <a16:creationId xmlns:a16="http://schemas.microsoft.com/office/drawing/2014/main" id="{5B50BD32-41AB-46CC-BE8E-E577AEE174B8}"/>
+                </a:ext>
+              </a:extLst>
+            </p:cNvPr>
+            <p:cNvSpPr/>
+            <p:nvPr/>
+          </p:nvSpPr>
+          <p:spPr>
+            <a:xfrm>
+              <a:off x="10219223" y="3478434"/>
+              <a:ext cx="1336705" cy="329511"/>
+            </a:xfrm>
+            <a:prstGeom prst="rect">
+              <a:avLst/>
+            </a:prstGeom>
+            <a:noFill/>
+            <a:ln w="19050">
+              <a:noFill/>
+            </a:ln>
+          </p:spPr>
+          <p:style>
+            <a:lnRef idx="2">
+              <a:schemeClr val="accent1">
+                <a:shade val="50000"/>
+              </a:schemeClr>
+            </a:lnRef>
+            <a:fillRef idx="1">
+              <a:schemeClr val="accent1"/>
+            </a:fillRef>
+            <a:effectRef idx="0">
+              <a:schemeClr val="accent1"/>
+            </a:effectRef>
+            <a:fontRef idx="minor">
+              <a:schemeClr val="lt1"/>
+            </a:fontRef>
+          </p:style>
+          <p:txBody>
+            <a:bodyPr rtlCol="0" anchor="ctr"/>
+            <a:lstStyle/>
+            <a:p>
+              <a:pPr algn="ctr"/>
+              <a:endParaRPr lang="en-US" sz="1200" b="1" dirty="0">
+                <a:solidFill>
+                  <a:schemeClr val="tx1"/>
+                </a:solidFill>
+              </a:endParaRPr>
+            </a:p>
+          </p:txBody>
+        </p:sp>
+      </p:grpSp>
+      <p:grpSp>
+        <p:nvGrpSpPr>
+          <p:cNvPr id="83" name="Group 82">
+            <a:extLst>
+              <a:ext uri="{FF2B5EF4-FFF2-40B4-BE49-F238E27FC236}">
+                <a16:creationId xmlns:a16="http://schemas.microsoft.com/office/drawing/2014/main" id="{FC2DA2B5-AE10-4D33-B08D-4902EE69FB97}"/>
+              </a:ext>
+            </a:extLst>
+          </p:cNvPr>
+          <p:cNvGrpSpPr/>
+          <p:nvPr/>
+        </p:nvGrpSpPr>
+        <p:grpSpPr>
+          <a:xfrm>
+            <a:off x="4317030" y="5471514"/>
+            <a:ext cx="1372148" cy="667266"/>
+            <a:chOff x="6762716" y="1841159"/>
+            <a:chExt cx="1372148" cy="667266"/>
+          </a:xfrm>
+          <a:solidFill>
+            <a:schemeClr val="accent6">
+              <a:lumMod val="20000"/>
+              <a:lumOff val="80000"/>
+            </a:schemeClr>
+          </a:solidFill>
+        </p:grpSpPr>
+        <p:sp>
+          <p:nvSpPr>
+            <p:cNvPr id="85" name="Rectangle 84">
+              <a:extLst>
+                <a:ext uri="{FF2B5EF4-FFF2-40B4-BE49-F238E27FC236}">
+                  <a16:creationId xmlns:a16="http://schemas.microsoft.com/office/drawing/2014/main" id="{0625C6FA-55C6-4974-A8AE-50C9EC6178FE}"/>
+                </a:ext>
+              </a:extLst>
+            </p:cNvPr>
+            <p:cNvSpPr/>
+            <p:nvPr/>
+          </p:nvSpPr>
+          <p:spPr>
+            <a:xfrm>
+              <a:off x="6762716" y="1841160"/>
+              <a:ext cx="1372148" cy="337750"/>
+            </a:xfrm>
+            <a:prstGeom prst="rect">
+              <a:avLst/>
+            </a:prstGeom>
+            <a:grpFill/>
+            <a:ln w="19050">
+              <a:noFill/>
+            </a:ln>
+          </p:spPr>
+          <p:style>
+            <a:lnRef idx="2">
+              <a:schemeClr val="accent1">
+                <a:shade val="50000"/>
+              </a:schemeClr>
+            </a:lnRef>
+            <a:fillRef idx="1">
+              <a:schemeClr val="accent1"/>
+            </a:fillRef>
+            <a:effectRef idx="0">
+              <a:schemeClr val="accent1"/>
+            </a:effectRef>
+            <a:fontRef idx="minor">
+              <a:schemeClr val="lt1"/>
+            </a:fontRef>
+          </p:style>
+          <p:txBody>
+            <a:bodyPr rtlCol="0" anchor="ctr"/>
+            <a:lstStyle/>
+            <a:p>
+              <a:pPr algn="ctr"/>
+              <a:endParaRPr lang="en-US" sz="1200" b="1" dirty="0">
+                <a:solidFill>
+                  <a:schemeClr val="tx1"/>
+                </a:solidFill>
+              </a:endParaRPr>
+            </a:p>
+          </p:txBody>
+        </p:sp>
+        <p:sp>
+          <p:nvSpPr>
+            <p:cNvPr id="86" name="Rectangle 85">
+              <a:extLst>
+                <a:ext uri="{FF2B5EF4-FFF2-40B4-BE49-F238E27FC236}">
+                  <a16:creationId xmlns:a16="http://schemas.microsoft.com/office/drawing/2014/main" id="{EEEBDD45-A7AD-4A2A-9CA6-C6326944457C}"/>
+                </a:ext>
+              </a:extLst>
+            </p:cNvPr>
+            <p:cNvSpPr/>
+            <p:nvPr/>
+          </p:nvSpPr>
+          <p:spPr>
+            <a:xfrm>
+              <a:off x="6762716" y="2178910"/>
+              <a:ext cx="1372148" cy="329514"/>
+            </a:xfrm>
+            <a:prstGeom prst="rect">
+              <a:avLst/>
+            </a:prstGeom>
+            <a:grpFill/>
+            <a:ln w="19050">
+              <a:noFill/>
+            </a:ln>
+          </p:spPr>
+          <p:style>
+            <a:lnRef idx="2">
+              <a:schemeClr val="accent1">
+                <a:shade val="50000"/>
+              </a:schemeClr>
+            </a:lnRef>
+            <a:fillRef idx="1">
+              <a:schemeClr val="accent1"/>
+            </a:fillRef>
+            <a:effectRef idx="0">
+              <a:schemeClr val="accent1"/>
+            </a:effectRef>
+            <a:fontRef idx="minor">
+              <a:schemeClr val="lt1"/>
+            </a:fontRef>
+          </p:style>
+          <p:txBody>
+            <a:bodyPr rtlCol="0" anchor="ctr"/>
+            <a:lstStyle/>
+            <a:p>
+              <a:pPr algn="ctr"/>
+              <a:endParaRPr lang="en-US" sz="1200" b="1" dirty="0">
+                <a:solidFill>
+                  <a:schemeClr val="tx1"/>
+                </a:solidFill>
+              </a:endParaRPr>
+            </a:p>
+          </p:txBody>
+        </p:sp>
+        <p:sp>
+          <p:nvSpPr>
+            <p:cNvPr id="84" name="Rectangle 83">
+              <a:extLst>
+                <a:ext uri="{FF2B5EF4-FFF2-40B4-BE49-F238E27FC236}">
+                  <a16:creationId xmlns:a16="http://schemas.microsoft.com/office/drawing/2014/main" id="{2BDAFEBF-A0D1-4729-9B9C-E62A4863EE24}"/>
+                </a:ext>
+              </a:extLst>
+            </p:cNvPr>
+            <p:cNvSpPr/>
+            <p:nvPr/>
+          </p:nvSpPr>
+          <p:spPr>
+            <a:xfrm>
+              <a:off x="6762716" y="1841159"/>
+              <a:ext cx="1372148" cy="667266"/>
+            </a:xfrm>
+            <a:prstGeom prst="rect">
+              <a:avLst/>
+            </a:prstGeom>
+            <a:solidFill>
+              <a:srgbClr val="FFCC99"/>
+            </a:solidFill>
+            <a:ln w="19050">
+              <a:solidFill>
+                <a:schemeClr val="tx1"/>
+              </a:solidFill>
+            </a:ln>
+          </p:spPr>
+          <p:style>
+            <a:lnRef idx="2">
+              <a:schemeClr val="accent1">
+                <a:shade val="50000"/>
+              </a:schemeClr>
+            </a:lnRef>
+            <a:fillRef idx="1">
+              <a:schemeClr val="accent1"/>
+            </a:fillRef>
+            <a:effectRef idx="0">
+              <a:schemeClr val="accent1"/>
+            </a:effectRef>
+            <a:fontRef idx="minor">
+              <a:schemeClr val="lt1"/>
+            </a:fontRef>
+          </p:style>
+          <p:txBody>
+            <a:bodyPr rtlCol="0" anchor="ctr"/>
+            <a:lstStyle/>
+            <a:p>
+              <a:pPr algn="ctr"/>
+              <a:r>
+                <a:rPr lang="en-US" sz="1200" b="1" dirty="0">
+                  <a:solidFill>
+                    <a:schemeClr val="tx1"/>
+                  </a:solidFill>
+                </a:rPr>
+                <a:t>Thermostat control setting simulator</a:t>
+              </a:r>
+            </a:p>
+          </p:txBody>
+        </p:sp>
+      </p:grpSp>
+      <p:cxnSp>
+        <p:nvCxnSpPr>
+          <p:cNvPr id="88" name="Straight Arrow Connector 87">
+            <a:extLst>
+              <a:ext uri="{FF2B5EF4-FFF2-40B4-BE49-F238E27FC236}">
+                <a16:creationId xmlns:a16="http://schemas.microsoft.com/office/drawing/2014/main" id="{E886775F-A421-4973-9AC6-5167A03FF28C}"/>
+              </a:ext>
+            </a:extLst>
+          </p:cNvPr>
+          <p:cNvCxnSpPr>
+            <a:cxnSpLocks/>
+            <a:stCxn id="64" idx="2"/>
+            <a:endCxn id="84" idx="1"/>
+          </p:cNvCxnSpPr>
+          <p:nvPr/>
+        </p:nvCxnSpPr>
+        <p:spPr>
+          <a:xfrm flipV="1">
+            <a:off x="3639788" y="5805147"/>
+            <a:ext cx="677242" cy="1"/>
+          </a:xfrm>
+          <a:prstGeom prst="straightConnector1">
+            <a:avLst/>
+          </a:prstGeom>
+          <a:ln w="19050">
+            <a:solidFill>
+              <a:schemeClr val="tx1"/>
+            </a:solidFill>
+            <a:tailEnd type="triangle"/>
+          </a:ln>
+        </p:spPr>
+        <p:style>
+          <a:lnRef idx="1">
+            <a:schemeClr val="accent1"/>
+          </a:lnRef>
+          <a:fillRef idx="0">
+            <a:schemeClr val="accent1"/>
+          </a:fillRef>
+          <a:effectRef idx="0">
+            <a:schemeClr val="accent1"/>
+          </a:effectRef>
+          <a:fontRef idx="minor">
+            <a:schemeClr val="tx1"/>
+          </a:fontRef>
+        </p:style>
+      </p:cxnSp>
+      <p:grpSp>
+        <p:nvGrpSpPr>
+          <p:cNvPr id="94" name="Group 93">
+            <a:extLst>
+              <a:ext uri="{FF2B5EF4-FFF2-40B4-BE49-F238E27FC236}">
+                <a16:creationId xmlns:a16="http://schemas.microsoft.com/office/drawing/2014/main" id="{953C629F-0806-4BCE-9574-CB32C100FAF6}"/>
+              </a:ext>
+            </a:extLst>
+          </p:cNvPr>
+          <p:cNvGrpSpPr/>
+          <p:nvPr/>
+        </p:nvGrpSpPr>
+        <p:grpSpPr>
+          <a:xfrm>
+            <a:off x="5777605" y="6462862"/>
+            <a:ext cx="1372148" cy="667266"/>
+            <a:chOff x="6762716" y="1841159"/>
+            <a:chExt cx="1372148" cy="667266"/>
+          </a:xfrm>
+          <a:solidFill>
+            <a:schemeClr val="accent6">
+              <a:lumMod val="20000"/>
+              <a:lumOff val="80000"/>
+            </a:schemeClr>
+          </a:solidFill>
+        </p:grpSpPr>
+        <p:sp>
+          <p:nvSpPr>
+            <p:cNvPr id="96" name="Rectangle 95">
+              <a:extLst>
+                <a:ext uri="{FF2B5EF4-FFF2-40B4-BE49-F238E27FC236}">
+                  <a16:creationId xmlns:a16="http://schemas.microsoft.com/office/drawing/2014/main" id="{5E527E84-7992-49BA-A912-9E65EBA7D341}"/>
+                </a:ext>
+              </a:extLst>
+            </p:cNvPr>
+            <p:cNvSpPr/>
+            <p:nvPr/>
+          </p:nvSpPr>
+          <p:spPr>
+            <a:xfrm>
+              <a:off x="6762716" y="1841160"/>
+              <a:ext cx="1372148" cy="337750"/>
+            </a:xfrm>
+            <a:prstGeom prst="rect">
+              <a:avLst/>
+            </a:prstGeom>
+            <a:grpFill/>
+            <a:ln w="19050">
+              <a:noFill/>
+            </a:ln>
+          </p:spPr>
+          <p:style>
+            <a:lnRef idx="2">
+              <a:schemeClr val="accent1">
+                <a:shade val="50000"/>
+              </a:schemeClr>
+            </a:lnRef>
+            <a:fillRef idx="1">
+              <a:schemeClr val="accent1"/>
+            </a:fillRef>
+            <a:effectRef idx="0">
+              <a:schemeClr val="accent1"/>
+            </a:effectRef>
+            <a:fontRef idx="minor">
+              <a:schemeClr val="lt1"/>
+            </a:fontRef>
+          </p:style>
+          <p:txBody>
+            <a:bodyPr rtlCol="0" anchor="ctr"/>
+            <a:lstStyle/>
+            <a:p>
+              <a:pPr algn="ctr"/>
+              <a:endParaRPr lang="en-US" sz="1200" b="1" dirty="0">
+                <a:solidFill>
+                  <a:schemeClr val="tx1"/>
+                </a:solidFill>
+              </a:endParaRPr>
+            </a:p>
+          </p:txBody>
+        </p:sp>
+        <p:sp>
+          <p:nvSpPr>
+            <p:cNvPr id="97" name="Rectangle 96">
+              <a:extLst>
+                <a:ext uri="{FF2B5EF4-FFF2-40B4-BE49-F238E27FC236}">
+                  <a16:creationId xmlns:a16="http://schemas.microsoft.com/office/drawing/2014/main" id="{894412E5-C6B5-4D8A-B643-352B2323D233}"/>
+                </a:ext>
+              </a:extLst>
+            </p:cNvPr>
+            <p:cNvSpPr/>
+            <p:nvPr/>
+          </p:nvSpPr>
+          <p:spPr>
+            <a:xfrm>
+              <a:off x="6762716" y="2178910"/>
+              <a:ext cx="1372148" cy="329514"/>
+            </a:xfrm>
+            <a:prstGeom prst="rect">
+              <a:avLst/>
+            </a:prstGeom>
+            <a:grpFill/>
+            <a:ln w="19050">
+              <a:noFill/>
+            </a:ln>
+          </p:spPr>
+          <p:style>
+            <a:lnRef idx="2">
+              <a:schemeClr val="accent1">
+                <a:shade val="50000"/>
+              </a:schemeClr>
+            </a:lnRef>
+            <a:fillRef idx="1">
+              <a:schemeClr val="accent1"/>
+            </a:fillRef>
+            <a:effectRef idx="0">
+              <a:schemeClr val="accent1"/>
+            </a:effectRef>
+            <a:fontRef idx="minor">
+              <a:schemeClr val="lt1"/>
+            </a:fontRef>
+          </p:style>
+          <p:txBody>
+            <a:bodyPr rtlCol="0" anchor="ctr"/>
+            <a:lstStyle/>
+            <a:p>
+              <a:pPr algn="ctr"/>
+              <a:endParaRPr lang="en-US" sz="1200" b="1" dirty="0">
+                <a:solidFill>
+                  <a:schemeClr val="tx1"/>
+                </a:solidFill>
+              </a:endParaRPr>
+            </a:p>
+          </p:txBody>
+        </p:sp>
+        <p:sp>
+          <p:nvSpPr>
+            <p:cNvPr id="95" name="Rectangle 94">
+              <a:extLst>
+                <a:ext uri="{FF2B5EF4-FFF2-40B4-BE49-F238E27FC236}">
+                  <a16:creationId xmlns:a16="http://schemas.microsoft.com/office/drawing/2014/main" id="{62477711-5257-41A7-9B6C-D1F656D1DAE1}"/>
+                </a:ext>
+              </a:extLst>
+            </p:cNvPr>
+            <p:cNvSpPr/>
+            <p:nvPr/>
+          </p:nvSpPr>
+          <p:spPr>
+            <a:xfrm>
+              <a:off x="6762716" y="1841159"/>
+              <a:ext cx="1372148" cy="667266"/>
+            </a:xfrm>
+            <a:prstGeom prst="rect">
+              <a:avLst/>
+            </a:prstGeom>
+            <a:grpFill/>
+            <a:ln w="19050">
+              <a:solidFill>
+                <a:schemeClr val="tx1"/>
+              </a:solidFill>
+            </a:ln>
+          </p:spPr>
+          <p:style>
+            <a:lnRef idx="2">
+              <a:schemeClr val="accent1">
+                <a:shade val="50000"/>
+              </a:schemeClr>
+            </a:lnRef>
+            <a:fillRef idx="1">
+              <a:schemeClr val="accent1"/>
+            </a:fillRef>
+            <a:effectRef idx="0">
+              <a:schemeClr val="accent1"/>
+            </a:effectRef>
+            <a:fontRef idx="minor">
+              <a:schemeClr val="lt1"/>
+            </a:fontRef>
+          </p:style>
+          <p:txBody>
+            <a:bodyPr rtlCol="0" anchor="ctr"/>
+            <a:lstStyle/>
+            <a:p>
+              <a:pPr algn="ctr"/>
+              <a:r>
+                <a:rPr lang="en-US" sz="1200" b="1" dirty="0">
+                  <a:solidFill>
+                    <a:schemeClr val="tx1"/>
+                  </a:solidFill>
+                </a:rPr>
+                <a:t>Building thermal behavior sim.</a:t>
+              </a:r>
+            </a:p>
+          </p:txBody>
+        </p:sp>
+      </p:grpSp>
+      <p:cxnSp>
+        <p:nvCxnSpPr>
+          <p:cNvPr id="99" name="Straight Arrow Connector 98">
+            <a:extLst>
+              <a:ext uri="{FF2B5EF4-FFF2-40B4-BE49-F238E27FC236}">
+                <a16:creationId xmlns:a16="http://schemas.microsoft.com/office/drawing/2014/main" id="{D2B7F264-ADD2-4D60-988C-7AA95EAC139A}"/>
+              </a:ext>
+            </a:extLst>
+          </p:cNvPr>
+          <p:cNvCxnSpPr>
+            <a:cxnSpLocks/>
+            <a:stCxn id="107" idx="2"/>
+            <a:endCxn id="137" idx="1"/>
+          </p:cNvCxnSpPr>
+          <p:nvPr/>
+        </p:nvCxnSpPr>
+        <p:spPr>
+          <a:xfrm flipV="1">
+            <a:off x="3666083" y="6942557"/>
+            <a:ext cx="2131598" cy="3530"/>
+          </a:xfrm>
+          <a:prstGeom prst="straightConnector1">
+            <a:avLst/>
+          </a:prstGeom>
+          <a:ln w="19050">
+            <a:solidFill>
+              <a:schemeClr val="tx1"/>
+            </a:solidFill>
+            <a:tailEnd type="triangle"/>
+          </a:ln>
+        </p:spPr>
+        <p:style>
+          <a:lnRef idx="1">
+            <a:schemeClr val="accent1"/>
+          </a:lnRef>
+          <a:fillRef idx="0">
+            <a:schemeClr val="accent1"/>
+          </a:fillRef>
+          <a:effectRef idx="0">
+            <a:schemeClr val="accent1"/>
+          </a:effectRef>
+          <a:fontRef idx="minor">
+            <a:schemeClr val="tx1"/>
+          </a:fontRef>
+        </p:style>
+      </p:cxnSp>
+      <p:cxnSp>
+        <p:nvCxnSpPr>
+          <p:cNvPr id="113" name="Connector: Elbow 112">
+            <a:extLst>
+              <a:ext uri="{FF2B5EF4-FFF2-40B4-BE49-F238E27FC236}">
+                <a16:creationId xmlns:a16="http://schemas.microsoft.com/office/drawing/2014/main" id="{4BC859DE-6AB1-40D2-9F3E-747FB0BACA43}"/>
+              </a:ext>
+            </a:extLst>
+          </p:cNvPr>
+          <p:cNvCxnSpPr>
+            <a:cxnSpLocks/>
+            <a:stCxn id="76" idx="2"/>
+            <a:endCxn id="39" idx="2"/>
+          </p:cNvCxnSpPr>
+          <p:nvPr/>
+        </p:nvCxnSpPr>
+        <p:spPr>
+          <a:xfrm flipV="1">
+            <a:off x="3626769" y="3808546"/>
+            <a:ext cx="1030513" cy="873695"/>
+          </a:xfrm>
+          <a:prstGeom prst="bentConnector2">
+            <a:avLst/>
+          </a:prstGeom>
+          <a:ln w="19050">
+            <a:solidFill>
+              <a:schemeClr val="tx1"/>
+            </a:solidFill>
+            <a:tailEnd type="triangle"/>
+          </a:ln>
+        </p:spPr>
+        <p:style>
+          <a:lnRef idx="1">
+            <a:schemeClr val="accent1"/>
+          </a:lnRef>
+          <a:fillRef idx="0">
+            <a:schemeClr val="accent1"/>
+          </a:fillRef>
+          <a:effectRef idx="0">
+            <a:schemeClr val="accent1"/>
+          </a:effectRef>
+          <a:fontRef idx="minor">
+            <a:schemeClr val="tx1"/>
+          </a:fontRef>
+        </p:style>
+      </p:cxnSp>
+      <p:cxnSp>
+        <p:nvCxnSpPr>
+          <p:cNvPr id="124" name="Connector: Elbow 123">
+            <a:extLst>
+              <a:ext uri="{FF2B5EF4-FFF2-40B4-BE49-F238E27FC236}">
+                <a16:creationId xmlns:a16="http://schemas.microsoft.com/office/drawing/2014/main" id="{A4003A56-8E74-443E-800F-8E40D12FD9C3}"/>
+              </a:ext>
+            </a:extLst>
+          </p:cNvPr>
+          <p:cNvCxnSpPr>
+            <a:cxnSpLocks/>
+            <a:stCxn id="184" idx="2"/>
+            <a:endCxn id="95" idx="3"/>
+          </p:cNvCxnSpPr>
+          <p:nvPr/>
+        </p:nvCxnSpPr>
+        <p:spPr>
+          <a:xfrm rot="5400000">
+            <a:off x="6978869" y="5170729"/>
+            <a:ext cx="1796650" cy="1454882"/>
+          </a:xfrm>
+          <a:prstGeom prst="bentConnector2">
+            <a:avLst/>
+          </a:prstGeom>
+          <a:ln w="19050">
+            <a:solidFill>
+              <a:schemeClr val="tx1"/>
+            </a:solidFill>
+            <a:tailEnd type="triangle"/>
+          </a:ln>
+        </p:spPr>
+        <p:style>
+          <a:lnRef idx="1">
+            <a:schemeClr val="accent1"/>
+          </a:lnRef>
+          <a:fillRef idx="0">
+            <a:schemeClr val="accent1"/>
+          </a:fillRef>
+          <a:effectRef idx="0">
+            <a:schemeClr val="accent1"/>
+          </a:effectRef>
+          <a:fontRef idx="minor">
+            <a:schemeClr val="tx1"/>
+          </a:fontRef>
+        </p:style>
+      </p:cxnSp>
+      <p:grpSp>
+        <p:nvGrpSpPr>
+          <p:cNvPr id="62" name="Group 61">
+            <a:extLst>
+              <a:ext uri="{FF2B5EF4-FFF2-40B4-BE49-F238E27FC236}">
+                <a16:creationId xmlns:a16="http://schemas.microsoft.com/office/drawing/2014/main" id="{66D56477-0283-4765-90F8-C35F52B7D129}"/>
+              </a:ext>
+            </a:extLst>
+          </p:cNvPr>
+          <p:cNvGrpSpPr/>
+          <p:nvPr/>
+        </p:nvGrpSpPr>
+        <p:grpSpPr>
+          <a:xfrm>
+            <a:off x="4310435" y="3137110"/>
+            <a:ext cx="1372148" cy="671436"/>
+            <a:chOff x="5402703" y="3646050"/>
+            <a:chExt cx="1372148" cy="671436"/>
+          </a:xfrm>
+        </p:grpSpPr>
+        <p:grpSp>
+          <p:nvGrpSpPr>
+            <p:cNvPr id="36" name="Group 35">
+              <a:extLst>
+                <a:ext uri="{FF2B5EF4-FFF2-40B4-BE49-F238E27FC236}">
+                  <a16:creationId xmlns:a16="http://schemas.microsoft.com/office/drawing/2014/main" id="{E1C02CC0-35A6-4638-9089-EC7C5FC43730}"/>
+                </a:ext>
+              </a:extLst>
+            </p:cNvPr>
+            <p:cNvGrpSpPr/>
+            <p:nvPr/>
+          </p:nvGrpSpPr>
+          <p:grpSpPr>
+            <a:xfrm>
+              <a:off x="5402703" y="3646050"/>
+              <a:ext cx="1372148" cy="671436"/>
+              <a:chOff x="6803360" y="1740796"/>
+              <a:chExt cx="1372148" cy="671436"/>
+            </a:xfrm>
+          </p:grpSpPr>
+          <p:sp>
+            <p:nvSpPr>
+              <p:cNvPr id="37" name="Rectangle 36">
+                <a:extLst>
+                  <a:ext uri="{FF2B5EF4-FFF2-40B4-BE49-F238E27FC236}">
+                    <a16:creationId xmlns:a16="http://schemas.microsoft.com/office/drawing/2014/main" id="{F6A8BF3C-E767-44B8-BF99-EB550F0E035E}"/>
+                  </a:ext>
+                </a:extLst>
+              </p:cNvPr>
+              <p:cNvSpPr/>
+              <p:nvPr/>
+            </p:nvSpPr>
+            <p:spPr>
+              <a:xfrm>
+                <a:off x="6803360" y="1740796"/>
+                <a:ext cx="1372148" cy="667266"/>
+              </a:xfrm>
+              <a:prstGeom prst="rect">
+                <a:avLst/>
+              </a:prstGeom>
+              <a:solidFill>
+                <a:srgbClr val="B2DE82"/>
+              </a:solidFill>
+              <a:ln w="19050">
+                <a:solidFill>
+                  <a:schemeClr val="tx1"/>
+                </a:solidFill>
+              </a:ln>
+            </p:spPr>
+            <p:style>
+              <a:lnRef idx="2">
+                <a:schemeClr val="accent1">
+                  <a:shade val="50000"/>
+                </a:schemeClr>
+              </a:lnRef>
+              <a:fillRef idx="1">
+                <a:schemeClr val="accent1"/>
+              </a:fillRef>
+              <a:effectRef idx="0">
+                <a:schemeClr val="accent1"/>
+              </a:effectRef>
+              <a:fontRef idx="minor">
+                <a:schemeClr val="lt1"/>
+              </a:fontRef>
+            </p:style>
+            <p:txBody>
+              <a:bodyPr rtlCol="0" anchor="ctr"/>
+              <a:lstStyle/>
+              <a:p>
+                <a:pPr algn="ctr"/>
+                <a:r>
+                  <a:rPr lang="en-US" sz="1200" b="1" dirty="0">
+                    <a:solidFill>
+                      <a:schemeClr val="tx1"/>
+                    </a:solidFill>
+                  </a:rPr>
+                  <a:t>Appliance and water fixture usage sim.</a:t>
+                </a:r>
+              </a:p>
+            </p:txBody>
+          </p:sp>
+          <p:sp>
+            <p:nvSpPr>
+              <p:cNvPr id="39" name="Rectangle 38">
+                <a:extLst>
+                  <a:ext uri="{FF2B5EF4-FFF2-40B4-BE49-F238E27FC236}">
+                    <a16:creationId xmlns:a16="http://schemas.microsoft.com/office/drawing/2014/main" id="{1041BABD-3028-4378-864C-5CB1819EF093}"/>
+                  </a:ext>
+                </a:extLst>
+              </p:cNvPr>
+              <p:cNvSpPr/>
+              <p:nvPr/>
+            </p:nvSpPr>
+            <p:spPr>
+              <a:xfrm>
+                <a:off x="6803360" y="2124951"/>
+                <a:ext cx="693694" cy="287281"/>
+              </a:xfrm>
+              <a:prstGeom prst="rect">
+                <a:avLst/>
+              </a:prstGeom>
+              <a:noFill/>
+              <a:ln w="19050">
+                <a:noFill/>
+              </a:ln>
+            </p:spPr>
+            <p:style>
+              <a:lnRef idx="2">
+                <a:schemeClr val="accent1">
+                  <a:shade val="50000"/>
+                </a:schemeClr>
+              </a:lnRef>
+              <a:fillRef idx="1">
+                <a:schemeClr val="accent1"/>
+              </a:fillRef>
+              <a:effectRef idx="0">
+                <a:schemeClr val="accent1"/>
+              </a:effectRef>
+              <a:fontRef idx="minor">
+                <a:schemeClr val="lt1"/>
+              </a:fontRef>
+            </p:style>
+            <p:txBody>
+              <a:bodyPr rtlCol="0" anchor="ctr"/>
+              <a:lstStyle/>
+              <a:p>
+                <a:pPr algn="ctr"/>
+                <a:endParaRPr lang="en-US" sz="1200" b="1" dirty="0">
+                  <a:solidFill>
+                    <a:schemeClr val="tx1"/>
+                  </a:solidFill>
+                </a:endParaRPr>
+              </a:p>
+            </p:txBody>
+          </p:sp>
+        </p:grpSp>
+        <p:sp>
+          <p:nvSpPr>
+            <p:cNvPr id="138" name="Rectangle 137">
+              <a:extLst>
+                <a:ext uri="{FF2B5EF4-FFF2-40B4-BE49-F238E27FC236}">
+                  <a16:creationId xmlns:a16="http://schemas.microsoft.com/office/drawing/2014/main" id="{F5D4E25A-96DF-428B-97F1-6531CD7F660E}"/>
+                </a:ext>
+              </a:extLst>
+            </p:cNvPr>
+            <p:cNvSpPr/>
+            <p:nvPr/>
+          </p:nvSpPr>
+          <p:spPr>
+            <a:xfrm>
+              <a:off x="6069522" y="4022150"/>
+              <a:ext cx="693694" cy="287281"/>
+            </a:xfrm>
+            <a:prstGeom prst="rect">
+              <a:avLst/>
+            </a:prstGeom>
+            <a:noFill/>
+            <a:ln w="19050">
+              <a:noFill/>
+            </a:ln>
+          </p:spPr>
+          <p:style>
+            <a:lnRef idx="2">
+              <a:schemeClr val="accent1">
+                <a:shade val="50000"/>
+              </a:schemeClr>
+            </a:lnRef>
+            <a:fillRef idx="1">
+              <a:schemeClr val="accent1"/>
+            </a:fillRef>
+            <a:effectRef idx="0">
+              <a:schemeClr val="accent1"/>
+            </a:effectRef>
+            <a:fontRef idx="minor">
+              <a:schemeClr val="lt1"/>
+            </a:fontRef>
+          </p:style>
+          <p:txBody>
+            <a:bodyPr rtlCol="0" anchor="ctr"/>
+            <a:lstStyle/>
+            <a:p>
+              <a:pPr algn="ctr"/>
+              <a:endParaRPr lang="en-US" sz="1200" b="1" dirty="0">
+                <a:solidFill>
+                  <a:schemeClr val="tx1"/>
+                </a:solidFill>
+              </a:endParaRPr>
+            </a:p>
+          </p:txBody>
+        </p:sp>
+      </p:grpSp>
+      <p:cxnSp>
+        <p:nvCxnSpPr>
+          <p:cNvPr id="140" name="Connector: Elbow 139">
+            <a:extLst>
+              <a:ext uri="{FF2B5EF4-FFF2-40B4-BE49-F238E27FC236}">
+                <a16:creationId xmlns:a16="http://schemas.microsoft.com/office/drawing/2014/main" id="{FE638E65-E1BC-4E21-AECA-86FC523DE59E}"/>
+              </a:ext>
+            </a:extLst>
+          </p:cNvPr>
+          <p:cNvCxnSpPr>
+            <a:cxnSpLocks/>
+            <a:stCxn id="138" idx="2"/>
+            <a:endCxn id="103" idx="1"/>
+          </p:cNvCxnSpPr>
+          <p:nvPr/>
+        </p:nvCxnSpPr>
+        <p:spPr>
+          <a:xfrm rot="16200000" flipH="1">
+            <a:off x="5117992" y="4006600"/>
+            <a:ext cx="865722" cy="453504"/>
+          </a:xfrm>
+          <a:prstGeom prst="bentConnector2">
+            <a:avLst/>
+          </a:prstGeom>
+          <a:ln w="19050">
+            <a:solidFill>
+              <a:schemeClr val="tx1"/>
+            </a:solidFill>
+            <a:tailEnd type="triangle"/>
+          </a:ln>
+        </p:spPr>
+        <p:style>
+          <a:lnRef idx="1">
+            <a:schemeClr val="accent1"/>
+          </a:lnRef>
+          <a:fillRef idx="0">
+            <a:schemeClr val="accent1"/>
+          </a:fillRef>
+          <a:effectRef idx="0">
+            <a:schemeClr val="accent1"/>
+          </a:effectRef>
+          <a:fontRef idx="minor">
+            <a:schemeClr val="tx1"/>
+          </a:fontRef>
+        </p:style>
+      </p:cxnSp>
+      <p:grpSp>
+        <p:nvGrpSpPr>
+          <p:cNvPr id="133" name="Group 132">
+            <a:extLst>
+              <a:ext uri="{FF2B5EF4-FFF2-40B4-BE49-F238E27FC236}">
+                <a16:creationId xmlns:a16="http://schemas.microsoft.com/office/drawing/2014/main" id="{DD290E8F-F4EC-452F-AFCE-074BDDC0A316}"/>
+              </a:ext>
+            </a:extLst>
+          </p:cNvPr>
+          <p:cNvGrpSpPr/>
+          <p:nvPr/>
+        </p:nvGrpSpPr>
+        <p:grpSpPr>
+          <a:xfrm>
+            <a:off x="5777605" y="4332580"/>
+            <a:ext cx="1379813" cy="671489"/>
+            <a:chOff x="6386278" y="4920051"/>
+            <a:chExt cx="1379813" cy="671489"/>
+          </a:xfrm>
+        </p:grpSpPr>
+        <p:grpSp>
+          <p:nvGrpSpPr>
+            <p:cNvPr id="102" name="Group 101">
+              <a:extLst>
+                <a:ext uri="{FF2B5EF4-FFF2-40B4-BE49-F238E27FC236}">
+                  <a16:creationId xmlns:a16="http://schemas.microsoft.com/office/drawing/2014/main" id="{462CDEA8-6306-4920-8FB0-028AB231B144}"/>
+                </a:ext>
+              </a:extLst>
+            </p:cNvPr>
+            <p:cNvGrpSpPr/>
+            <p:nvPr/>
+          </p:nvGrpSpPr>
+          <p:grpSpPr>
+            <a:xfrm>
+              <a:off x="6386278" y="4920051"/>
+              <a:ext cx="1372148" cy="667266"/>
+              <a:chOff x="6762716" y="1841159"/>
+              <a:chExt cx="1372148" cy="667266"/>
+            </a:xfrm>
+            <a:solidFill>
+              <a:schemeClr val="accent6">
+                <a:lumMod val="20000"/>
+                <a:lumOff val="80000"/>
+              </a:schemeClr>
+            </a:solidFill>
+          </p:grpSpPr>
+          <p:sp>
+            <p:nvSpPr>
+              <p:cNvPr id="104" name="Rectangle 103">
+                <a:extLst>
+                  <a:ext uri="{FF2B5EF4-FFF2-40B4-BE49-F238E27FC236}">
+                    <a16:creationId xmlns:a16="http://schemas.microsoft.com/office/drawing/2014/main" id="{409FEA45-72CC-4EB1-AAD9-5BD9BFC82CB1}"/>
+                  </a:ext>
+                </a:extLst>
+              </p:cNvPr>
+              <p:cNvSpPr/>
+              <p:nvPr/>
+            </p:nvSpPr>
+            <p:spPr>
+              <a:xfrm>
+                <a:off x="6762716" y="1841160"/>
+                <a:ext cx="1372148" cy="337750"/>
+              </a:xfrm>
+              <a:prstGeom prst="rect">
+                <a:avLst/>
+              </a:prstGeom>
+              <a:grpFill/>
+              <a:ln w="19050">
+                <a:noFill/>
+              </a:ln>
+            </p:spPr>
+            <p:style>
+              <a:lnRef idx="2">
+                <a:schemeClr val="accent1">
+                  <a:shade val="50000"/>
+                </a:schemeClr>
+              </a:lnRef>
+              <a:fillRef idx="1">
+                <a:schemeClr val="accent1"/>
+              </a:fillRef>
+              <a:effectRef idx="0">
+                <a:schemeClr val="accent1"/>
+              </a:effectRef>
+              <a:fontRef idx="minor">
+                <a:schemeClr val="lt1"/>
+              </a:fontRef>
+            </p:style>
+            <p:txBody>
+              <a:bodyPr rtlCol="0" anchor="ctr"/>
+              <a:lstStyle/>
+              <a:p>
+                <a:pPr algn="ctr"/>
+                <a:endParaRPr lang="en-US" sz="1200" b="1" dirty="0">
+                  <a:solidFill>
+                    <a:schemeClr val="tx1"/>
+                  </a:solidFill>
+                </a:endParaRPr>
+              </a:p>
+            </p:txBody>
+          </p:sp>
+          <p:sp>
+            <p:nvSpPr>
+              <p:cNvPr id="105" name="Rectangle 104">
+                <a:extLst>
+                  <a:ext uri="{FF2B5EF4-FFF2-40B4-BE49-F238E27FC236}">
+                    <a16:creationId xmlns:a16="http://schemas.microsoft.com/office/drawing/2014/main" id="{D7628EC6-CE71-428A-8DAD-E90082429685}"/>
+                  </a:ext>
+                </a:extLst>
+              </p:cNvPr>
+              <p:cNvSpPr/>
+              <p:nvPr/>
+            </p:nvSpPr>
+            <p:spPr>
+              <a:xfrm>
+                <a:off x="6762716" y="2178910"/>
+                <a:ext cx="1372148" cy="329514"/>
+              </a:xfrm>
+              <a:prstGeom prst="rect">
+                <a:avLst/>
+              </a:prstGeom>
+              <a:grpFill/>
+              <a:ln w="19050">
+                <a:noFill/>
+              </a:ln>
+            </p:spPr>
+            <p:style>
+              <a:lnRef idx="2">
+                <a:schemeClr val="accent1">
+                  <a:shade val="50000"/>
+                </a:schemeClr>
+              </a:lnRef>
+              <a:fillRef idx="1">
+                <a:schemeClr val="accent1"/>
+              </a:fillRef>
+              <a:effectRef idx="0">
+                <a:schemeClr val="accent1"/>
+              </a:effectRef>
+              <a:fontRef idx="minor">
+                <a:schemeClr val="lt1"/>
+              </a:fontRef>
+            </p:style>
+            <p:txBody>
+              <a:bodyPr rtlCol="0" anchor="ctr"/>
+              <a:lstStyle/>
+              <a:p>
+                <a:pPr algn="ctr"/>
+                <a:endParaRPr lang="en-US" sz="1200" b="1" dirty="0">
+                  <a:solidFill>
+                    <a:schemeClr val="tx1"/>
+                  </a:solidFill>
+                </a:endParaRPr>
+              </a:p>
+            </p:txBody>
+          </p:sp>
+          <p:sp>
+            <p:nvSpPr>
+              <p:cNvPr id="103" name="Rectangle 102">
+                <a:extLst>
+                  <a:ext uri="{FF2B5EF4-FFF2-40B4-BE49-F238E27FC236}">
+                    <a16:creationId xmlns:a16="http://schemas.microsoft.com/office/drawing/2014/main" id="{E0985C17-6FE2-4C60-AA32-EF3D23AFDBB1}"/>
+                  </a:ext>
+                </a:extLst>
+              </p:cNvPr>
+              <p:cNvSpPr/>
+              <p:nvPr/>
+            </p:nvSpPr>
+            <p:spPr>
+              <a:xfrm>
+                <a:off x="6762716" y="1841159"/>
+                <a:ext cx="1372148" cy="667266"/>
+              </a:xfrm>
+              <a:prstGeom prst="rect">
+                <a:avLst/>
+              </a:prstGeom>
+              <a:solidFill>
+                <a:schemeClr val="accent5">
+                  <a:lumMod val="75000"/>
+                </a:schemeClr>
+              </a:solidFill>
+              <a:ln w="19050">
+                <a:solidFill>
+                  <a:schemeClr val="tx1"/>
+                </a:solidFill>
+              </a:ln>
+            </p:spPr>
+            <p:style>
+              <a:lnRef idx="2">
+                <a:schemeClr val="accent1">
+                  <a:shade val="50000"/>
+                </a:schemeClr>
+              </a:lnRef>
+              <a:fillRef idx="1">
+                <a:schemeClr val="accent1"/>
+              </a:fillRef>
+              <a:effectRef idx="0">
+                <a:schemeClr val="accent1"/>
+              </a:effectRef>
+              <a:fontRef idx="minor">
+                <a:schemeClr val="lt1"/>
+              </a:fontRef>
+            </p:style>
+            <p:txBody>
+              <a:bodyPr rtlCol="0" anchor="ctr"/>
+              <a:lstStyle/>
+              <a:p>
+                <a:pPr algn="ctr"/>
+                <a:r>
+                  <a:rPr lang="fr-CH" sz="1200" b="1" dirty="0">
+                    <a:solidFill>
+                      <a:schemeClr val="bg1"/>
+                    </a:solidFill>
+                  </a:rPr>
+                  <a:t>Integrated</a:t>
+                </a:r>
+                <a:r>
+                  <a:rPr lang="en-US" sz="1200" b="1" dirty="0">
+                    <a:solidFill>
+                      <a:schemeClr val="bg1"/>
+                    </a:solidFill>
+                  </a:rPr>
+                  <a:t> heat demand simulator</a:t>
+                </a:r>
+              </a:p>
+            </p:txBody>
+          </p:sp>
+        </p:grpSp>
+        <p:sp>
+          <p:nvSpPr>
+            <p:cNvPr id="147" name="Rectangle 146">
+              <a:extLst>
+                <a:ext uri="{FF2B5EF4-FFF2-40B4-BE49-F238E27FC236}">
+                  <a16:creationId xmlns:a16="http://schemas.microsoft.com/office/drawing/2014/main" id="{A60363D7-C754-4661-AFE3-9E4519A77161}"/>
+                </a:ext>
+              </a:extLst>
+            </p:cNvPr>
+            <p:cNvSpPr/>
+            <p:nvPr/>
+          </p:nvSpPr>
+          <p:spPr>
+            <a:xfrm>
+              <a:off x="6386280" y="5253790"/>
+              <a:ext cx="1372148" cy="337750"/>
+            </a:xfrm>
+            <a:prstGeom prst="rect">
+              <a:avLst/>
+            </a:prstGeom>
+            <a:noFill/>
+            <a:ln w="19050">
+              <a:noFill/>
+            </a:ln>
+          </p:spPr>
+          <p:style>
+            <a:lnRef idx="2">
+              <a:schemeClr val="accent1">
+                <a:shade val="50000"/>
+              </a:schemeClr>
+            </a:lnRef>
+            <a:fillRef idx="1">
+              <a:schemeClr val="accent1"/>
+            </a:fillRef>
+            <a:effectRef idx="0">
+              <a:schemeClr val="accent1"/>
+            </a:effectRef>
+            <a:fontRef idx="minor">
+              <a:schemeClr val="lt1"/>
+            </a:fontRef>
+          </p:style>
+          <p:txBody>
+            <a:bodyPr rtlCol="0" anchor="ctr"/>
+            <a:lstStyle/>
+            <a:p>
+              <a:pPr algn="ctr"/>
+              <a:endParaRPr lang="en-US" sz="1200" b="1" dirty="0">
+                <a:solidFill>
+                  <a:schemeClr val="tx1"/>
+                </a:solidFill>
+              </a:endParaRPr>
+            </a:p>
+          </p:txBody>
+        </p:sp>
+        <p:sp>
+          <p:nvSpPr>
+            <p:cNvPr id="149" name="Rectangle 148">
+              <a:extLst>
+                <a:ext uri="{FF2B5EF4-FFF2-40B4-BE49-F238E27FC236}">
+                  <a16:creationId xmlns:a16="http://schemas.microsoft.com/office/drawing/2014/main" id="{47708183-C30D-4FD7-BDC7-0F20A4F5AD63}"/>
+                </a:ext>
+              </a:extLst>
+            </p:cNvPr>
+            <p:cNvSpPr/>
+            <p:nvPr/>
+          </p:nvSpPr>
+          <p:spPr>
+            <a:xfrm>
+              <a:off x="6393943" y="4927262"/>
+              <a:ext cx="1372148" cy="337750"/>
+            </a:xfrm>
+            <a:prstGeom prst="rect">
+              <a:avLst/>
+            </a:prstGeom>
+            <a:noFill/>
+            <a:ln w="19050">
+              <a:noFill/>
+            </a:ln>
+          </p:spPr>
+          <p:style>
+            <a:lnRef idx="2">
+              <a:schemeClr val="accent1">
+                <a:shade val="50000"/>
+              </a:schemeClr>
+            </a:lnRef>
+            <a:fillRef idx="1">
+              <a:schemeClr val="accent1"/>
+            </a:fillRef>
+            <a:effectRef idx="0">
+              <a:schemeClr val="accent1"/>
+            </a:effectRef>
+            <a:fontRef idx="minor">
+              <a:schemeClr val="lt1"/>
+            </a:fontRef>
+          </p:style>
+          <p:txBody>
+            <a:bodyPr rtlCol="0" anchor="ctr"/>
+            <a:lstStyle/>
+            <a:p>
+              <a:pPr algn="ctr"/>
+              <a:endParaRPr lang="en-US" sz="1200" b="1" dirty="0">
+                <a:solidFill>
+                  <a:schemeClr val="tx1"/>
+                </a:solidFill>
+              </a:endParaRPr>
+            </a:p>
+          </p:txBody>
+        </p:sp>
+      </p:grpSp>
+      <p:sp>
+        <p:nvSpPr>
+          <p:cNvPr id="184" name="Rectangle 183">
+            <a:extLst>
+              <a:ext uri="{FF2B5EF4-FFF2-40B4-BE49-F238E27FC236}">
+                <a16:creationId xmlns:a16="http://schemas.microsoft.com/office/drawing/2014/main" id="{7D937AD1-0D4E-425E-9640-1770E737FF65}"/>
+              </a:ext>
+            </a:extLst>
+          </p:cNvPr>
+          <p:cNvSpPr/>
+          <p:nvPr/>
+        </p:nvSpPr>
+        <p:spPr>
+          <a:xfrm>
+            <a:off x="7918561" y="4332579"/>
+            <a:ext cx="1372148" cy="667266"/>
           </a:xfrm>
           <a:prstGeom prst="rect">
             <a:avLst/>
           </a:prstGeom>
+          <a:solidFill>
+            <a:schemeClr val="accent1">
+              <a:lumMod val="75000"/>
+            </a:schemeClr>
+          </a:solidFill>
+          <a:ln w="19050">
+            <a:solidFill>
+              <a:schemeClr val="tx1"/>
+            </a:solidFill>
+          </a:ln>
         </p:spPr>
-      </p:pic>
+        <p:style>
+          <a:lnRef idx="2">
+            <a:schemeClr val="accent1">
+              <a:shade val="50000"/>
+            </a:schemeClr>
+          </a:lnRef>
+          <a:fillRef idx="1">
+            <a:schemeClr val="accent1"/>
+          </a:fillRef>
+          <a:effectRef idx="0">
+            <a:schemeClr val="accent1"/>
+          </a:effectRef>
+          <a:fontRef idx="minor">
+            <a:schemeClr val="lt1"/>
+          </a:fontRef>
+        </p:style>
+        <p:txBody>
+          <a:bodyPr rtlCol="0" anchor="ctr"/>
+          <a:lstStyle/>
+          <a:p>
+            <a:pPr algn="ctr"/>
+            <a:r>
+              <a:rPr lang="en-US" sz="1200" b="1" dirty="0">
+                <a:solidFill>
+                  <a:schemeClr val="bg1"/>
+                </a:solidFill>
+              </a:rPr>
+              <a:t>Heating system controller and operation sim.</a:t>
+            </a:r>
+          </a:p>
+        </p:txBody>
+      </p:sp>
+      <p:sp>
+        <p:nvSpPr>
+          <p:cNvPr id="219" name="Rectangle 218">
+            <a:extLst>
+              <a:ext uri="{FF2B5EF4-FFF2-40B4-BE49-F238E27FC236}">
+                <a16:creationId xmlns:a16="http://schemas.microsoft.com/office/drawing/2014/main" id="{A2941758-CCFC-497F-98D6-BBD0D8DC6C1E}"/>
+              </a:ext>
+            </a:extLst>
+          </p:cNvPr>
+          <p:cNvSpPr/>
+          <p:nvPr/>
+        </p:nvSpPr>
+        <p:spPr>
+          <a:xfrm>
+            <a:off x="5771097" y="6478161"/>
+            <a:ext cx="684004" cy="322452"/>
+          </a:xfrm>
+          <a:prstGeom prst="rect">
+            <a:avLst/>
+          </a:prstGeom>
+          <a:noFill/>
+          <a:ln>
+            <a:noFill/>
+          </a:ln>
+        </p:spPr>
+        <p:style>
+          <a:lnRef idx="2">
+            <a:schemeClr val="accent1">
+              <a:shade val="50000"/>
+            </a:schemeClr>
+          </a:lnRef>
+          <a:fillRef idx="1">
+            <a:schemeClr val="accent1"/>
+          </a:fillRef>
+          <a:effectRef idx="0">
+            <a:schemeClr val="accent1"/>
+          </a:effectRef>
+          <a:fontRef idx="minor">
+            <a:schemeClr val="lt1"/>
+          </a:fontRef>
+        </p:style>
+        <p:txBody>
+          <a:bodyPr rtlCol="0" anchor="ctr"/>
+          <a:lstStyle/>
+          <a:p>
+            <a:pPr algn="ctr"/>
+            <a:endParaRPr lang="en-US"/>
+          </a:p>
+        </p:txBody>
+      </p:sp>
+      <p:sp>
+        <p:nvSpPr>
+          <p:cNvPr id="220" name="Rectangle 219">
+            <a:extLst>
+              <a:ext uri="{FF2B5EF4-FFF2-40B4-BE49-F238E27FC236}">
+                <a16:creationId xmlns:a16="http://schemas.microsoft.com/office/drawing/2014/main" id="{2F6AE078-B9D2-4FE1-B4FD-79F087DAC1DE}"/>
+              </a:ext>
+            </a:extLst>
+          </p:cNvPr>
+          <p:cNvSpPr/>
+          <p:nvPr/>
+        </p:nvSpPr>
+        <p:spPr>
+          <a:xfrm>
+            <a:off x="4944414" y="3337661"/>
+            <a:ext cx="684004" cy="322452"/>
+          </a:xfrm>
+          <a:prstGeom prst="rect">
+            <a:avLst/>
+          </a:prstGeom>
+          <a:noFill/>
+          <a:ln>
+            <a:noFill/>
+          </a:ln>
+        </p:spPr>
+        <p:style>
+          <a:lnRef idx="2">
+            <a:schemeClr val="accent1">
+              <a:shade val="50000"/>
+            </a:schemeClr>
+          </a:lnRef>
+          <a:fillRef idx="1">
+            <a:schemeClr val="accent1"/>
+          </a:fillRef>
+          <a:effectRef idx="0">
+            <a:schemeClr val="accent1"/>
+          </a:effectRef>
+          <a:fontRef idx="minor">
+            <a:schemeClr val="lt1"/>
+          </a:fontRef>
+        </p:style>
+        <p:txBody>
+          <a:bodyPr rtlCol="0" anchor="ctr"/>
+          <a:lstStyle/>
+          <a:p>
+            <a:pPr algn="ctr"/>
+            <a:endParaRPr lang="en-US"/>
+          </a:p>
+        </p:txBody>
+      </p:sp>
+      <p:sp>
+        <p:nvSpPr>
+          <p:cNvPr id="101" name="TextBox 100">
+            <a:extLst>
+              <a:ext uri="{FF2B5EF4-FFF2-40B4-BE49-F238E27FC236}">
+                <a16:creationId xmlns:a16="http://schemas.microsoft.com/office/drawing/2014/main" id="{7ACEBC14-8159-4220-A66E-BDAC24961BE9}"/>
+              </a:ext>
+            </a:extLst>
+          </p:cNvPr>
+          <p:cNvSpPr txBox="1"/>
+          <p:nvPr/>
+        </p:nvSpPr>
+        <p:spPr>
+          <a:xfrm>
+            <a:off x="462941" y="357380"/>
+            <a:ext cx="12233189" cy="1171283"/>
+          </a:xfrm>
+          <a:prstGeom prst="rect">
+            <a:avLst/>
+          </a:prstGeom>
+          <a:noFill/>
+        </p:spPr>
+        <p:txBody>
+          <a:bodyPr wrap="square" rtlCol="0">
+            <a:spAutoFit/>
+          </a:bodyPr>
+          <a:lstStyle/>
+          <a:p>
+            <a:r>
+              <a:rPr lang="fr-CH" b="1" dirty="0" err="1"/>
+              <a:t>Where</a:t>
+            </a:r>
+            <a:r>
+              <a:rPr lang="fr-CH" b="1" dirty="0"/>
+              <a:t>: </a:t>
+            </a:r>
+            <a:r>
+              <a:rPr lang="fr-CH" dirty="0" err="1"/>
+              <a:t>overview</a:t>
+            </a:r>
+            <a:r>
+              <a:rPr lang="fr-CH" dirty="0"/>
+              <a:t>&gt;</a:t>
+            </a:r>
+            <a:r>
+              <a:rPr lang="fr-CH" dirty="0" err="1"/>
+              <a:t>thermaldemand_overview</a:t>
+            </a:r>
+            <a:endParaRPr lang="fr-CH" dirty="0"/>
+          </a:p>
+          <a:p>
+            <a:r>
+              <a:rPr lang="fr-CH" b="1" dirty="0"/>
+              <a:t>Name: </a:t>
+            </a:r>
+            <a:r>
+              <a:rPr lang="en-US" dirty="0"/>
+              <a:t>CREST5modulesheatingsystem.png</a:t>
+            </a:r>
+          </a:p>
+          <a:p>
+            <a:r>
+              <a:rPr lang="en-US" b="1" dirty="0"/>
+              <a:t>Caption</a:t>
+            </a:r>
+            <a:r>
+              <a:rPr lang="en-US" dirty="0"/>
+              <a:t>: CREST integrated heating demand and supply model</a:t>
+            </a:r>
+          </a:p>
+        </p:txBody>
+      </p:sp>
+      <p:grpSp>
+        <p:nvGrpSpPr>
+          <p:cNvPr id="106" name="Group 105">
+            <a:extLst>
+              <a:ext uri="{FF2B5EF4-FFF2-40B4-BE49-F238E27FC236}">
+                <a16:creationId xmlns:a16="http://schemas.microsoft.com/office/drawing/2014/main" id="{C8F26AC2-7D50-43C8-B239-358A92438488}"/>
+              </a:ext>
+            </a:extLst>
+          </p:cNvPr>
+          <p:cNvGrpSpPr/>
+          <p:nvPr/>
+        </p:nvGrpSpPr>
+        <p:grpSpPr>
+          <a:xfrm>
+            <a:off x="2254323" y="6612454"/>
+            <a:ext cx="1495168" cy="667266"/>
+            <a:chOff x="10179909" y="3140680"/>
+            <a:chExt cx="1495168" cy="667266"/>
+          </a:xfrm>
+        </p:grpSpPr>
+        <p:sp>
+          <p:nvSpPr>
+            <p:cNvPr id="107" name="Parallelogram 106">
+              <a:extLst>
+                <a:ext uri="{FF2B5EF4-FFF2-40B4-BE49-F238E27FC236}">
+                  <a16:creationId xmlns:a16="http://schemas.microsoft.com/office/drawing/2014/main" id="{E0888440-118F-40AB-9803-32F87C49418A}"/>
+                </a:ext>
+              </a:extLst>
+            </p:cNvPr>
+            <p:cNvSpPr/>
+            <p:nvPr/>
+          </p:nvSpPr>
+          <p:spPr>
+            <a:xfrm>
+              <a:off x="10179909" y="3140680"/>
+              <a:ext cx="1495168" cy="667266"/>
+            </a:xfrm>
+            <a:prstGeom prst="parallelogram">
+              <a:avLst/>
+            </a:prstGeom>
+            <a:noFill/>
+            <a:ln w="19050">
+              <a:solidFill>
+                <a:schemeClr val="tx1"/>
+              </a:solidFill>
+            </a:ln>
+          </p:spPr>
+          <p:style>
+            <a:lnRef idx="2">
+              <a:schemeClr val="accent1">
+                <a:shade val="50000"/>
+              </a:schemeClr>
+            </a:lnRef>
+            <a:fillRef idx="1">
+              <a:schemeClr val="accent1"/>
+            </a:fillRef>
+            <a:effectRef idx="0">
+              <a:schemeClr val="accent1"/>
+            </a:effectRef>
+            <a:fontRef idx="minor">
+              <a:schemeClr val="lt1"/>
+            </a:fontRef>
+          </p:style>
+          <p:txBody>
+            <a:bodyPr rtlCol="0" anchor="ctr"/>
+            <a:lstStyle/>
+            <a:p>
+              <a:pPr algn="ctr"/>
+              <a:r>
+                <a:rPr lang="en-US" sz="1200" b="1" dirty="0">
+                  <a:solidFill>
+                    <a:schemeClr val="tx1"/>
+                  </a:solidFill>
+                </a:rPr>
+                <a:t>Weather data</a:t>
+              </a:r>
+            </a:p>
+          </p:txBody>
+        </p:sp>
+        <p:sp>
+          <p:nvSpPr>
+            <p:cNvPr id="108" name="Rectangle 107">
+              <a:extLst>
+                <a:ext uri="{FF2B5EF4-FFF2-40B4-BE49-F238E27FC236}">
+                  <a16:creationId xmlns:a16="http://schemas.microsoft.com/office/drawing/2014/main" id="{7B171898-8533-4AD6-922B-2CE19D6146CA}"/>
+                </a:ext>
+              </a:extLst>
+            </p:cNvPr>
+            <p:cNvSpPr/>
+            <p:nvPr/>
+          </p:nvSpPr>
+          <p:spPr>
+            <a:xfrm>
+              <a:off x="10293178" y="3140680"/>
+              <a:ext cx="1336704" cy="337754"/>
+            </a:xfrm>
+            <a:prstGeom prst="rect">
+              <a:avLst/>
+            </a:prstGeom>
+            <a:noFill/>
+            <a:ln w="19050">
+              <a:noFill/>
+            </a:ln>
+          </p:spPr>
+          <p:style>
+            <a:lnRef idx="2">
+              <a:schemeClr val="accent1">
+                <a:shade val="50000"/>
+              </a:schemeClr>
+            </a:lnRef>
+            <a:fillRef idx="1">
+              <a:schemeClr val="accent1"/>
+            </a:fillRef>
+            <a:effectRef idx="0">
+              <a:schemeClr val="accent1"/>
+            </a:effectRef>
+            <a:fontRef idx="minor">
+              <a:schemeClr val="lt1"/>
+            </a:fontRef>
+          </p:style>
+          <p:txBody>
+            <a:bodyPr rtlCol="0" anchor="ctr"/>
+            <a:lstStyle/>
+            <a:p>
+              <a:pPr algn="ctr"/>
+              <a:endParaRPr lang="en-US" sz="1200" b="1" dirty="0">
+                <a:solidFill>
+                  <a:schemeClr val="tx1"/>
+                </a:solidFill>
+              </a:endParaRPr>
+            </a:p>
+          </p:txBody>
+        </p:sp>
+        <p:sp>
+          <p:nvSpPr>
+            <p:cNvPr id="109" name="Rectangle 108">
+              <a:extLst>
+                <a:ext uri="{FF2B5EF4-FFF2-40B4-BE49-F238E27FC236}">
+                  <a16:creationId xmlns:a16="http://schemas.microsoft.com/office/drawing/2014/main" id="{93EBE9D4-E4E0-4BA1-9CBC-3C3B0DD86BA0}"/>
+                </a:ext>
+              </a:extLst>
+            </p:cNvPr>
+            <p:cNvSpPr/>
+            <p:nvPr/>
+          </p:nvSpPr>
+          <p:spPr>
+            <a:xfrm>
+              <a:off x="10219223" y="3478434"/>
+              <a:ext cx="1336705" cy="329511"/>
+            </a:xfrm>
+            <a:prstGeom prst="rect">
+              <a:avLst/>
+            </a:prstGeom>
+            <a:noFill/>
+            <a:ln w="19050">
+              <a:noFill/>
+            </a:ln>
+          </p:spPr>
+          <p:style>
+            <a:lnRef idx="2">
+              <a:schemeClr val="accent1">
+                <a:shade val="50000"/>
+              </a:schemeClr>
+            </a:lnRef>
+            <a:fillRef idx="1">
+              <a:schemeClr val="accent1"/>
+            </a:fillRef>
+            <a:effectRef idx="0">
+              <a:schemeClr val="accent1"/>
+            </a:effectRef>
+            <a:fontRef idx="minor">
+              <a:schemeClr val="lt1"/>
+            </a:fontRef>
+          </p:style>
+          <p:txBody>
+            <a:bodyPr rtlCol="0" anchor="ctr"/>
+            <a:lstStyle/>
+            <a:p>
+              <a:pPr algn="ctr"/>
+              <a:endParaRPr lang="en-US" sz="1200" b="1" dirty="0">
+                <a:solidFill>
+                  <a:schemeClr val="tx1"/>
+                </a:solidFill>
+              </a:endParaRPr>
+            </a:p>
+          </p:txBody>
+        </p:sp>
+      </p:grpSp>
+      <p:cxnSp>
+        <p:nvCxnSpPr>
+          <p:cNvPr id="120" name="Straight Arrow Connector 119">
+            <a:extLst>
+              <a:ext uri="{FF2B5EF4-FFF2-40B4-BE49-F238E27FC236}">
+                <a16:creationId xmlns:a16="http://schemas.microsoft.com/office/drawing/2014/main" id="{F002A0A0-63E4-4CBE-93D3-486621E55686}"/>
+              </a:ext>
+            </a:extLst>
+          </p:cNvPr>
+          <p:cNvCxnSpPr>
+            <a:cxnSpLocks/>
+            <a:stCxn id="103" idx="3"/>
+            <a:endCxn id="184" idx="1"/>
+          </p:cNvCxnSpPr>
+          <p:nvPr/>
+        </p:nvCxnSpPr>
+        <p:spPr>
+          <a:xfrm flipV="1">
+            <a:off x="7149753" y="4666212"/>
+            <a:ext cx="768808" cy="1"/>
+          </a:xfrm>
+          <a:prstGeom prst="straightConnector1">
+            <a:avLst/>
+          </a:prstGeom>
+          <a:ln w="19050">
+            <a:solidFill>
+              <a:schemeClr val="tx1"/>
+            </a:solidFill>
+            <a:tailEnd type="triangle"/>
+          </a:ln>
+        </p:spPr>
+        <p:style>
+          <a:lnRef idx="1">
+            <a:schemeClr val="accent1"/>
+          </a:lnRef>
+          <a:fillRef idx="0">
+            <a:schemeClr val="accent1"/>
+          </a:fillRef>
+          <a:effectRef idx="0">
+            <a:schemeClr val="accent1"/>
+          </a:effectRef>
+          <a:fontRef idx="minor">
+            <a:schemeClr val="tx1"/>
+          </a:fontRef>
+        </p:style>
+      </p:cxnSp>
+      <p:cxnSp>
+        <p:nvCxnSpPr>
+          <p:cNvPr id="125" name="Straight Arrow Connector 124">
+            <a:extLst>
+              <a:ext uri="{FF2B5EF4-FFF2-40B4-BE49-F238E27FC236}">
+                <a16:creationId xmlns:a16="http://schemas.microsoft.com/office/drawing/2014/main" id="{F01084DD-96D9-4125-AE9C-94ECD37EF962}"/>
+              </a:ext>
+            </a:extLst>
+          </p:cNvPr>
+          <p:cNvCxnSpPr>
+            <a:cxnSpLocks/>
+            <a:stCxn id="184" idx="3"/>
+            <a:endCxn id="20" idx="2"/>
+          </p:cNvCxnSpPr>
+          <p:nvPr/>
+        </p:nvCxnSpPr>
+        <p:spPr>
+          <a:xfrm>
+            <a:off x="9290709" y="4666212"/>
+            <a:ext cx="658023" cy="3672"/>
+          </a:xfrm>
+          <a:prstGeom prst="straightConnector1">
+            <a:avLst/>
+          </a:prstGeom>
+          <a:ln w="19050">
+            <a:solidFill>
+              <a:schemeClr val="tx1"/>
+            </a:solidFill>
+            <a:tailEnd type="triangle"/>
+          </a:ln>
+        </p:spPr>
+        <p:style>
+          <a:lnRef idx="1">
+            <a:schemeClr val="accent1"/>
+          </a:lnRef>
+          <a:fillRef idx="0">
+            <a:schemeClr val="accent1"/>
+          </a:fillRef>
+          <a:effectRef idx="0">
+            <a:schemeClr val="accent1"/>
+          </a:effectRef>
+          <a:fontRef idx="minor">
+            <a:schemeClr val="tx1"/>
+          </a:fontRef>
+        </p:style>
+      </p:cxnSp>
+      <p:cxnSp>
+        <p:nvCxnSpPr>
+          <p:cNvPr id="128" name="Straight Arrow Connector 127">
+            <a:extLst>
+              <a:ext uri="{FF2B5EF4-FFF2-40B4-BE49-F238E27FC236}">
+                <a16:creationId xmlns:a16="http://schemas.microsoft.com/office/drawing/2014/main" id="{85327D1F-BA5D-4646-BB3F-732A28CF1A0D}"/>
+              </a:ext>
+            </a:extLst>
+          </p:cNvPr>
+          <p:cNvCxnSpPr>
+            <a:cxnSpLocks/>
+            <a:stCxn id="95" idx="0"/>
+            <a:endCxn id="103" idx="2"/>
+          </p:cNvCxnSpPr>
+          <p:nvPr/>
+        </p:nvCxnSpPr>
+        <p:spPr>
+          <a:xfrm flipV="1">
+            <a:off x="6463679" y="4999846"/>
+            <a:ext cx="0" cy="1463016"/>
+          </a:xfrm>
+          <a:prstGeom prst="straightConnector1">
+            <a:avLst/>
+          </a:prstGeom>
+          <a:ln w="19050">
+            <a:solidFill>
+              <a:schemeClr val="tx1"/>
+            </a:solidFill>
+            <a:tailEnd type="triangle"/>
+          </a:ln>
+        </p:spPr>
+        <p:style>
+          <a:lnRef idx="1">
+            <a:schemeClr val="accent1"/>
+          </a:lnRef>
+          <a:fillRef idx="0">
+            <a:schemeClr val="accent1"/>
+          </a:fillRef>
+          <a:effectRef idx="0">
+            <a:schemeClr val="accent1"/>
+          </a:effectRef>
+          <a:fontRef idx="minor">
+            <a:schemeClr val="tx1"/>
+          </a:fontRef>
+        </p:style>
+      </p:cxnSp>
+      <p:cxnSp>
+        <p:nvCxnSpPr>
+          <p:cNvPr id="131" name="Connector: Elbow 130">
+            <a:extLst>
+              <a:ext uri="{FF2B5EF4-FFF2-40B4-BE49-F238E27FC236}">
+                <a16:creationId xmlns:a16="http://schemas.microsoft.com/office/drawing/2014/main" id="{7A71FFB1-12D9-4DE6-86F9-14A62E842CB9}"/>
+              </a:ext>
+            </a:extLst>
+          </p:cNvPr>
+          <p:cNvCxnSpPr>
+            <a:cxnSpLocks/>
+            <a:stCxn id="84" idx="2"/>
+            <a:endCxn id="219" idx="1"/>
+          </p:cNvCxnSpPr>
+          <p:nvPr/>
+        </p:nvCxnSpPr>
+        <p:spPr>
+          <a:xfrm rot="16200000" flipH="1">
+            <a:off x="5136797" y="6005086"/>
+            <a:ext cx="500607" cy="767993"/>
+          </a:xfrm>
+          <a:prstGeom prst="bentConnector2">
+            <a:avLst/>
+          </a:prstGeom>
+          <a:ln w="19050">
+            <a:solidFill>
+              <a:schemeClr val="tx1"/>
+            </a:solidFill>
+            <a:tailEnd type="triangle"/>
+          </a:ln>
+        </p:spPr>
+        <p:style>
+          <a:lnRef idx="1">
+            <a:schemeClr val="accent1"/>
+          </a:lnRef>
+          <a:fillRef idx="0">
+            <a:schemeClr val="accent1"/>
+          </a:fillRef>
+          <a:effectRef idx="0">
+            <a:schemeClr val="accent1"/>
+          </a:effectRef>
+          <a:fontRef idx="minor">
+            <a:schemeClr val="tx1"/>
+          </a:fontRef>
+        </p:style>
+      </p:cxnSp>
+      <p:sp>
+        <p:nvSpPr>
+          <p:cNvPr id="137" name="Rectangle 136">
+            <a:extLst>
+              <a:ext uri="{FF2B5EF4-FFF2-40B4-BE49-F238E27FC236}">
+                <a16:creationId xmlns:a16="http://schemas.microsoft.com/office/drawing/2014/main" id="{A9945F18-DD01-4343-81F0-45DD4182EBB4}"/>
+              </a:ext>
+            </a:extLst>
+          </p:cNvPr>
+          <p:cNvSpPr/>
+          <p:nvPr/>
+        </p:nvSpPr>
+        <p:spPr>
+          <a:xfrm>
+            <a:off x="5797681" y="6781331"/>
+            <a:ext cx="684004" cy="322452"/>
+          </a:xfrm>
+          <a:prstGeom prst="rect">
+            <a:avLst/>
+          </a:prstGeom>
+          <a:noFill/>
+          <a:ln>
+            <a:noFill/>
+          </a:ln>
+        </p:spPr>
+        <p:style>
+          <a:lnRef idx="2">
+            <a:schemeClr val="accent1">
+              <a:shade val="50000"/>
+            </a:schemeClr>
+          </a:lnRef>
+          <a:fillRef idx="1">
+            <a:schemeClr val="accent1"/>
+          </a:fillRef>
+          <a:effectRef idx="0">
+            <a:schemeClr val="accent1"/>
+          </a:effectRef>
+          <a:fontRef idx="minor">
+            <a:schemeClr val="lt1"/>
+          </a:fontRef>
+        </p:style>
+        <p:txBody>
+          <a:bodyPr rtlCol="0" anchor="ctr"/>
+          <a:lstStyle/>
+          <a:p>
+            <a:pPr algn="ctr"/>
+            <a:endParaRPr lang="en-US"/>
+          </a:p>
+        </p:txBody>
+      </p:sp>
+      <p:sp>
+        <p:nvSpPr>
+          <p:cNvPr id="145" name="Rectangle 144">
+            <a:extLst>
+              <a:ext uri="{FF2B5EF4-FFF2-40B4-BE49-F238E27FC236}">
+                <a16:creationId xmlns:a16="http://schemas.microsoft.com/office/drawing/2014/main" id="{C05D177C-E7D1-4649-B815-B5F404A53067}"/>
+              </a:ext>
+            </a:extLst>
+          </p:cNvPr>
+          <p:cNvSpPr/>
+          <p:nvPr/>
+        </p:nvSpPr>
+        <p:spPr>
+          <a:xfrm>
+            <a:off x="4293250" y="5459880"/>
+            <a:ext cx="684004" cy="322452"/>
+          </a:xfrm>
+          <a:prstGeom prst="rect">
+            <a:avLst/>
+          </a:prstGeom>
+          <a:noFill/>
+          <a:ln>
+            <a:noFill/>
+          </a:ln>
+        </p:spPr>
+        <p:style>
+          <a:lnRef idx="2">
+            <a:schemeClr val="accent1">
+              <a:shade val="50000"/>
+            </a:schemeClr>
+          </a:lnRef>
+          <a:fillRef idx="1">
+            <a:schemeClr val="accent1"/>
+          </a:fillRef>
+          <a:effectRef idx="0">
+            <a:schemeClr val="accent1"/>
+          </a:effectRef>
+          <a:fontRef idx="minor">
+            <a:schemeClr val="lt1"/>
+          </a:fontRef>
+        </p:style>
+        <p:txBody>
+          <a:bodyPr rtlCol="0" anchor="ctr"/>
+          <a:lstStyle/>
+          <a:p>
+            <a:pPr algn="ctr"/>
+            <a:endParaRPr lang="en-US"/>
+          </a:p>
+        </p:txBody>
+      </p:sp>
+      <p:sp>
+        <p:nvSpPr>
+          <p:cNvPr id="148" name="Parallelogram 147">
+            <a:extLst>
+              <a:ext uri="{FF2B5EF4-FFF2-40B4-BE49-F238E27FC236}">
+                <a16:creationId xmlns:a16="http://schemas.microsoft.com/office/drawing/2014/main" id="{38D3495F-057E-4E72-8F38-7930DBC8769B}"/>
+              </a:ext>
+            </a:extLst>
+          </p:cNvPr>
+          <p:cNvSpPr/>
+          <p:nvPr/>
+        </p:nvSpPr>
+        <p:spPr>
+          <a:xfrm rot="10800000" flipV="1">
+            <a:off x="9494054" y="6436537"/>
+            <a:ext cx="250784" cy="109542"/>
+          </a:xfrm>
+          <a:prstGeom prst="parallelogram">
+            <a:avLst>
+              <a:gd name="adj" fmla="val 42610"/>
+            </a:avLst>
+          </a:prstGeom>
+          <a:noFill/>
+          <a:ln w="19050">
+            <a:solidFill>
+              <a:schemeClr val="tx1"/>
+            </a:solidFill>
+          </a:ln>
+        </p:spPr>
+        <p:style>
+          <a:lnRef idx="2">
+            <a:schemeClr val="accent1">
+              <a:shade val="50000"/>
+            </a:schemeClr>
+          </a:lnRef>
+          <a:fillRef idx="1">
+            <a:schemeClr val="accent1"/>
+          </a:fillRef>
+          <a:effectRef idx="0">
+            <a:schemeClr val="accent1"/>
+          </a:effectRef>
+          <a:fontRef idx="minor">
+            <a:schemeClr val="lt1"/>
+          </a:fontRef>
+        </p:style>
+        <p:txBody>
+          <a:bodyPr rtlCol="0" anchor="ctr"/>
+          <a:lstStyle/>
+          <a:p>
+            <a:pPr algn="ctr"/>
+            <a:endParaRPr lang="en-US" sz="1200" b="1" dirty="0">
+              <a:solidFill>
+                <a:schemeClr val="tx1"/>
+              </a:solidFill>
+            </a:endParaRPr>
+          </a:p>
+        </p:txBody>
+      </p:sp>
+      <p:sp>
+        <p:nvSpPr>
+          <p:cNvPr id="150" name="Parallelogram 149">
+            <a:extLst>
+              <a:ext uri="{FF2B5EF4-FFF2-40B4-BE49-F238E27FC236}">
+                <a16:creationId xmlns:a16="http://schemas.microsoft.com/office/drawing/2014/main" id="{C6900575-F7CD-4D40-A7DA-417BE720828D}"/>
+              </a:ext>
+            </a:extLst>
+          </p:cNvPr>
+          <p:cNvSpPr/>
+          <p:nvPr/>
+        </p:nvSpPr>
+        <p:spPr>
+          <a:xfrm>
+            <a:off x="9497020" y="6692290"/>
+            <a:ext cx="250778" cy="108177"/>
+          </a:xfrm>
+          <a:prstGeom prst="parallelogram">
+            <a:avLst>
+              <a:gd name="adj" fmla="val 0"/>
+            </a:avLst>
+          </a:prstGeom>
+          <a:noFill/>
+          <a:ln w="19050">
+            <a:solidFill>
+              <a:schemeClr val="tx1"/>
+            </a:solidFill>
+          </a:ln>
+        </p:spPr>
+        <p:style>
+          <a:lnRef idx="2">
+            <a:schemeClr val="accent1">
+              <a:shade val="50000"/>
+            </a:schemeClr>
+          </a:lnRef>
+          <a:fillRef idx="1">
+            <a:schemeClr val="accent1"/>
+          </a:fillRef>
+          <a:effectRef idx="0">
+            <a:schemeClr val="accent1"/>
+          </a:effectRef>
+          <a:fontRef idx="minor">
+            <a:schemeClr val="lt1"/>
+          </a:fontRef>
+        </p:style>
+        <p:txBody>
+          <a:bodyPr rtlCol="0" anchor="ctr"/>
+          <a:lstStyle/>
+          <a:p>
+            <a:pPr algn="ctr"/>
+            <a:endParaRPr lang="en-US" sz="1200" b="1" dirty="0">
+              <a:solidFill>
+                <a:schemeClr val="tx1"/>
+              </a:solidFill>
+            </a:endParaRPr>
+          </a:p>
+        </p:txBody>
+      </p:sp>
+      <p:sp>
+        <p:nvSpPr>
+          <p:cNvPr id="151" name="TextBox 150">
+            <a:extLst>
+              <a:ext uri="{FF2B5EF4-FFF2-40B4-BE49-F238E27FC236}">
+                <a16:creationId xmlns:a16="http://schemas.microsoft.com/office/drawing/2014/main" id="{3338C23F-D0B5-4DD5-9F10-E8480CAEC96C}"/>
+              </a:ext>
+            </a:extLst>
+          </p:cNvPr>
+          <p:cNvSpPr txBox="1"/>
+          <p:nvPr/>
+        </p:nvSpPr>
+        <p:spPr>
+          <a:xfrm>
+            <a:off x="9786861" y="6330915"/>
+            <a:ext cx="1098190" cy="276999"/>
+          </a:xfrm>
+          <a:prstGeom prst="rect">
+            <a:avLst/>
+          </a:prstGeom>
+          <a:noFill/>
+        </p:spPr>
+        <p:txBody>
+          <a:bodyPr wrap="square" rtlCol="0">
+            <a:spAutoFit/>
+          </a:bodyPr>
+          <a:lstStyle/>
+          <a:p>
+            <a:r>
+              <a:rPr lang="fr-CH" sz="1200" b="1" dirty="0"/>
+              <a:t>Output</a:t>
+            </a:r>
+            <a:endParaRPr lang="en-US" sz="1200" b="1" dirty="0"/>
+          </a:p>
+        </p:txBody>
+      </p:sp>
+      <p:sp>
+        <p:nvSpPr>
+          <p:cNvPr id="152" name="TextBox 151">
+            <a:extLst>
+              <a:ext uri="{FF2B5EF4-FFF2-40B4-BE49-F238E27FC236}">
+                <a16:creationId xmlns:a16="http://schemas.microsoft.com/office/drawing/2014/main" id="{B5E18518-718C-4D4E-8996-020F08BC1B16}"/>
+              </a:ext>
+            </a:extLst>
+          </p:cNvPr>
+          <p:cNvSpPr txBox="1"/>
+          <p:nvPr/>
+        </p:nvSpPr>
+        <p:spPr>
+          <a:xfrm>
+            <a:off x="9786862" y="6607880"/>
+            <a:ext cx="993022" cy="276999"/>
+          </a:xfrm>
+          <a:prstGeom prst="rect">
+            <a:avLst/>
+          </a:prstGeom>
+          <a:noFill/>
+        </p:spPr>
+        <p:txBody>
+          <a:bodyPr wrap="square" rtlCol="0">
+            <a:spAutoFit/>
+          </a:bodyPr>
+          <a:lstStyle/>
+          <a:p>
+            <a:r>
+              <a:rPr lang="fr-CH" sz="1200" b="1" dirty="0"/>
+              <a:t>Modules</a:t>
+            </a:r>
+            <a:endParaRPr lang="en-US" sz="1200" b="1" dirty="0"/>
+          </a:p>
+        </p:txBody>
+      </p:sp>
+      <p:sp>
+        <p:nvSpPr>
+          <p:cNvPr id="153" name="Parallelogram 152">
+            <a:extLst>
+              <a:ext uri="{FF2B5EF4-FFF2-40B4-BE49-F238E27FC236}">
+                <a16:creationId xmlns:a16="http://schemas.microsoft.com/office/drawing/2014/main" id="{0BAE00F0-4B75-4D5D-B6D4-259EA8AA2EE1}"/>
+              </a:ext>
+            </a:extLst>
+          </p:cNvPr>
+          <p:cNvSpPr/>
+          <p:nvPr/>
+        </p:nvSpPr>
+        <p:spPr>
+          <a:xfrm>
+            <a:off x="9508554" y="6178481"/>
+            <a:ext cx="250783" cy="108179"/>
+          </a:xfrm>
+          <a:prstGeom prst="parallelogram">
+            <a:avLst>
+              <a:gd name="adj" fmla="val 36006"/>
+            </a:avLst>
+          </a:prstGeom>
+          <a:noFill/>
+          <a:ln w="19050">
+            <a:solidFill>
+              <a:schemeClr val="tx1"/>
+            </a:solidFill>
+          </a:ln>
+        </p:spPr>
+        <p:style>
+          <a:lnRef idx="2">
+            <a:schemeClr val="accent1">
+              <a:shade val="50000"/>
+            </a:schemeClr>
+          </a:lnRef>
+          <a:fillRef idx="1">
+            <a:schemeClr val="accent1"/>
+          </a:fillRef>
+          <a:effectRef idx="0">
+            <a:schemeClr val="accent1"/>
+          </a:effectRef>
+          <a:fontRef idx="minor">
+            <a:schemeClr val="lt1"/>
+          </a:fontRef>
+        </p:style>
+        <p:txBody>
+          <a:bodyPr rtlCol="0" anchor="ctr"/>
+          <a:lstStyle/>
+          <a:p>
+            <a:pPr algn="ctr"/>
+            <a:endParaRPr lang="en-US" sz="1200" b="1" dirty="0">
+              <a:solidFill>
+                <a:schemeClr val="tx1"/>
+              </a:solidFill>
+            </a:endParaRPr>
+          </a:p>
+        </p:txBody>
+      </p:sp>
+      <p:sp>
+        <p:nvSpPr>
+          <p:cNvPr id="154" name="TextBox 153">
+            <a:extLst>
+              <a:ext uri="{FF2B5EF4-FFF2-40B4-BE49-F238E27FC236}">
+                <a16:creationId xmlns:a16="http://schemas.microsoft.com/office/drawing/2014/main" id="{102A67D2-F096-4E43-81DF-7F6C58D798C3}"/>
+              </a:ext>
+            </a:extLst>
+          </p:cNvPr>
+          <p:cNvSpPr txBox="1"/>
+          <p:nvPr/>
+        </p:nvSpPr>
+        <p:spPr>
+          <a:xfrm>
+            <a:off x="9798400" y="6088138"/>
+            <a:ext cx="1098190" cy="276999"/>
+          </a:xfrm>
+          <a:prstGeom prst="rect">
+            <a:avLst/>
+          </a:prstGeom>
+          <a:noFill/>
+        </p:spPr>
+        <p:txBody>
+          <a:bodyPr wrap="square" rtlCol="0">
+            <a:spAutoFit/>
+          </a:bodyPr>
+          <a:lstStyle/>
+          <a:p>
+            <a:r>
+              <a:rPr lang="fr-CH" sz="1200" b="1" dirty="0"/>
+              <a:t>Input</a:t>
+            </a:r>
+            <a:endParaRPr lang="en-US" sz="1200" b="1" dirty="0"/>
+          </a:p>
+        </p:txBody>
+      </p:sp>
     </p:spTree>
     <p:extLst>
       <p:ext uri="{BB962C8B-B14F-4D97-AF65-F5344CB8AC3E}">
-        <p14:creationId xmlns:p14="http://schemas.microsoft.com/office/powerpoint/2010/main" val="4096849720"/>
+        <p14:creationId xmlns:p14="http://schemas.microsoft.com/office/powerpoint/2010/main" val="1670475653"/>
       </p:ext>
     </p:extLst>
   </p:cSld>
@@ -12420,6 +15493,15 @@
 </file>
 
 <file path=customXml/item1.xml><?xml version="1.0" encoding="utf-8"?>
+<?mso-contentType ?>
+<FormTemplates xmlns="http://schemas.microsoft.com/sharepoint/v3/contenttype/forms">
+  <Display>DocumentLibraryForm</Display>
+  <Edit>DocumentLibraryForm</Edit>
+  <New>DocumentLibraryForm</New>
+</FormTemplates>
+</file>
+
+<file path=customXml/item2.xml><?xml version="1.0" encoding="utf-8"?>
 <ct:contentTypeSchema xmlns:ct="http://schemas.microsoft.com/office/2006/metadata/contentType" xmlns:ma="http://schemas.microsoft.com/office/2006/metadata/properties/metaAttributes" ct:_="" ma:_="" ma:contentTypeName="EPFL Document" ma:contentTypeID="0x0101009E359B892F0745A488A3BA50FA95E220008D12AA6DD8705844A8F440FB2627C65C" ma:contentTypeVersion="2" ma:contentTypeDescription="Base Content Type for all EPFL documents" ma:contentTypeScope="" ma:versionID="243fe3aa2b7702eb0a8fc0aba44d7aac">
   <xsd:schema xmlns:xsd="http://www.w3.org/2001/XMLSchema" xmlns:xs="http://www.w3.org/2001/XMLSchema" xmlns:p="http://schemas.microsoft.com/office/2006/metadata/properties" xmlns:ns2="366578e5-d8fa-4ca3-80b4-96d4f4020af2" xmlns:ns3="505a1229-fefc-4964-aa43-a843a2e4cec8" targetNamespace="http://schemas.microsoft.com/office/2006/metadata/properties" ma:root="true" ma:fieldsID="874849853f62a370529474de8c246750" ns2:_="" ns3:_="">
     <xsd:import namespace="366578e5-d8fa-4ca3-80b4-96d4f4020af2"/>
@@ -12590,15 +15672,6 @@
 </ct:contentTypeSchema>
 </file>
 
-<file path=customXml/item2.xml><?xml version="1.0" encoding="utf-8"?>
-<?mso-contentType ?>
-<FormTemplates xmlns="http://schemas.microsoft.com/sharepoint/v3/contenttype/forms">
-  <Display>DocumentLibraryForm</Display>
-  <Edit>DocumentLibraryForm</Edit>
-  <New>DocumentLibraryForm</New>
-</FormTemplates>
-</file>
-
 <file path=customXml/item3.xml><?xml version="1.0" encoding="utf-8"?>
 <p:properties xmlns:p="http://schemas.microsoft.com/office/2006/metadata/properties" xmlns:xsi="http://www.w3.org/2001/XMLSchema-instance" xmlns:pc="http://schemas.microsoft.com/office/infopath/2007/PartnerControls">
   <documentManagement>
@@ -12626,6 +15699,14 @@
 </file>
 
 <file path=customXml/itemProps1.xml><?xml version="1.0" encoding="utf-8"?>
+<ds:datastoreItem xmlns:ds="http://schemas.openxmlformats.org/officeDocument/2006/customXml" ds:itemID="{B6EC99A6-5E64-4A2A-9ABF-C3A21F434FEC}">
+  <ds:schemaRefs>
+    <ds:schemaRef ds:uri="http://schemas.microsoft.com/sharepoint/v3/contenttype/forms"/>
+  </ds:schemaRefs>
+</ds:datastoreItem>
+</file>
+
+<file path=customXml/itemProps2.xml><?xml version="1.0" encoding="utf-8"?>
 <ds:datastoreItem xmlns:ds="http://schemas.openxmlformats.org/officeDocument/2006/customXml" ds:itemID="{77433D70-4CBE-4E89-80C9-3E32896E887D}">
   <ds:schemaRefs>
     <ds:schemaRef ds:uri="http://schemas.microsoft.com/office/2006/metadata/contentType"/>
@@ -12640,14 +15721,6 @@
     <ds:schemaRef ds:uri="http://purl.org/dc/elements/1.1/"/>
     <ds:schemaRef ds:uri="http://purl.org/dc/terms/"/>
     <ds:schemaRef ds:uri="http://schemas.microsoft.com/internal/obd"/>
-  </ds:schemaRefs>
-</ds:datastoreItem>
-</file>
-
-<file path=customXml/itemProps2.xml><?xml version="1.0" encoding="utf-8"?>
-<ds:datastoreItem xmlns:ds="http://schemas.openxmlformats.org/officeDocument/2006/customXml" ds:itemID="{B6EC99A6-5E64-4A2A-9ABF-C3A21F434FEC}">
-  <ds:schemaRefs>
-    <ds:schemaRef ds:uri="http://schemas.microsoft.com/sharepoint/v3/contenttype/forms"/>
   </ds:schemaRefs>
 </ds:datastoreItem>
 </file>

</xml_diff>

<commit_message>
updated documentation - Jan comments
</commit_message>
<xml_diff>
--- a/docs/source/overview/OverviewFigures/ModelFramework.pptx
+++ b/docs/source/overview/OverviewFigures/ModelFramework.pptx
@@ -5,14 +5,15 @@
     <p:sldMasterId id="2147483660" r:id="rId4"/>
   </p:sldMasterIdLst>
   <p:notesMasterIdLst>
-    <p:notesMasterId r:id="rId7"/>
+    <p:notesMasterId r:id="rId8"/>
   </p:notesMasterIdLst>
   <p:handoutMasterIdLst>
-    <p:handoutMasterId r:id="rId8"/>
+    <p:handoutMasterId r:id="rId9"/>
   </p:handoutMasterIdLst>
   <p:sldIdLst>
     <p:sldId id="580" r:id="rId5"/>
-    <p:sldId id="582" r:id="rId6"/>
+    <p:sldId id="583" r:id="rId6"/>
+    <p:sldId id="582" r:id="rId7"/>
   </p:sldIdLst>
   <p:sldSz cx="12801600" cy="9601200" type="A3"/>
   <p:notesSz cx="6858000" cy="9144000"/>
@@ -231,7 +232,7 @@
               <a:rPr lang="fr-CH" smtClean="0">
                 <a:latin typeface="Arial" panose="020B0604020202020204" pitchFamily="34" charset="0"/>
               </a:rPr>
-              <a:t>26.05.2021</a:t>
+              <a:t>01.07.2021</a:t>
             </a:fld>
             <a:endParaRPr lang="fr-CH" dirty="0">
               <a:latin typeface="Arial" panose="020B0604020202020204" pitchFamily="34" charset="0"/>
@@ -409,7 +410,7 @@
             <a:fld id="{F8103E42-5239-1A40-AD33-3EE7E9DDF5FD}" type="datetimeFigureOut">
               <a:rPr lang="fr-FR" smtClean="0"/>
               <a:pPr/>
-              <a:t>26/05/2021</a:t>
+              <a:t>01/07/2021</a:t>
             </a:fld>
             <a:endParaRPr lang="fr-FR" dirty="0"/>
           </a:p>
@@ -1172,7 +1173,7 @@
           <a:p>
             <a:fld id="{EF9482FC-9AB3-46A7-ABC6-51DDE6D61A09}" type="datetime1">
               <a:rPr lang="fr-FR" smtClean="0"/>
-              <a:t>26/05/2021</a:t>
+              <a:t>01/07/2021</a:t>
             </a:fld>
             <a:endParaRPr lang="fr-FR" dirty="0"/>
           </a:p>
@@ -1361,7 +1362,7 @@
           <a:p>
             <a:fld id="{91547178-8E40-4915-9EB6-1845F8C5E722}" type="datetime1">
               <a:rPr lang="fr-FR" smtClean="0"/>
-              <a:t>26/05/2021</a:t>
+              <a:t>01/07/2021</a:t>
             </a:fld>
             <a:endParaRPr lang="fr-FR" dirty="0"/>
           </a:p>
@@ -1584,7 +1585,7 @@
           <a:p>
             <a:fld id="{E6CA7ED0-0D7A-41F0-B0A2-2F3DFE81CF85}" type="datetime1">
               <a:rPr lang="fr-FR" smtClean="0"/>
-              <a:t>26/05/2021</a:t>
+              <a:t>01/07/2021</a:t>
             </a:fld>
             <a:endParaRPr lang="fr-FR" dirty="0"/>
           </a:p>
@@ -1723,7 +1724,7 @@
           <a:p>
             <a:fld id="{E702D0B3-9A32-410B-928E-ECBD64C11FE5}" type="datetime1">
               <a:rPr lang="fr-FR" smtClean="0"/>
-              <a:t>26/05/2021</a:t>
+              <a:t>01/07/2021</a:t>
             </a:fld>
             <a:endParaRPr lang="fr-FR" dirty="0"/>
           </a:p>
@@ -1878,7 +1879,7 @@
           <a:p>
             <a:fld id="{DA46868D-3466-4CF3-9C27-1C139CA722B0}" type="datetime1">
               <a:rPr lang="fr-FR" smtClean="0"/>
-              <a:t>26/05/2021</a:t>
+              <a:t>01/07/2021</a:t>
             </a:fld>
             <a:endParaRPr lang="fr-FR" dirty="0"/>
           </a:p>
@@ -2077,7 +2078,7 @@
           <a:p>
             <a:fld id="{D3955088-C68A-4210-B8F8-E599D5BF2D4B}" type="datetime1">
               <a:rPr lang="fr-FR" smtClean="0"/>
-              <a:t>26/05/2021</a:t>
+              <a:t>01/07/2021</a:t>
             </a:fld>
             <a:endParaRPr lang="fr-FR" dirty="0"/>
           </a:p>
@@ -2227,7 +2228,7 @@
           <a:p>
             <a:fld id="{57309B73-E384-487B-8CA1-6D369C2B9B9E}" type="datetime1">
               <a:rPr lang="fr-FR" smtClean="0"/>
-              <a:t>26/05/2021</a:t>
+              <a:t>01/07/2021</a:t>
             </a:fld>
             <a:endParaRPr lang="fr-FR" dirty="0"/>
           </a:p>
@@ -4700,7 +4701,7 @@
           <a:p>
             <a:fld id="{50A128C6-6946-487B-A8F4-6781FB41955F}" type="datetime1">
               <a:rPr lang="fr-FR" smtClean="0"/>
-              <a:t>26/05/2021</a:t>
+              <a:t>01/07/2021</a:t>
             </a:fld>
             <a:endParaRPr lang="fr-FR" dirty="0"/>
           </a:p>
@@ -5066,7 +5067,7 @@
           <a:p>
             <a:fld id="{D594687E-B679-48C9-A5CA-9F847271E7E4}" type="datetime1">
               <a:rPr lang="fr-FR" smtClean="0"/>
-              <a:t>26/05/2021</a:t>
+              <a:t>01/07/2021</a:t>
             </a:fld>
             <a:endParaRPr lang="fr-FR" dirty="0"/>
           </a:p>
@@ -5432,7 +5433,7 @@
           <a:p>
             <a:fld id="{0D075207-25A7-4DCE-80A0-444AA65A29A7}" type="datetime1">
               <a:rPr lang="fr-FR" smtClean="0"/>
-              <a:t>26/05/2021</a:t>
+              <a:t>01/07/2021</a:t>
             </a:fld>
             <a:endParaRPr lang="fr-FR" dirty="0"/>
           </a:p>
@@ -5681,7 +5682,7 @@
           <a:p>
             <a:fld id="{489662C4-08C7-4947-8DF4-007AEBE7E573}" type="datetime1">
               <a:rPr lang="fr-FR" smtClean="0"/>
-              <a:t>26/05/2021</a:t>
+              <a:t>01/07/2021</a:t>
             </a:fld>
             <a:endParaRPr lang="fr-FR" dirty="0"/>
           </a:p>
@@ -5841,7 +5842,7 @@
           <a:p>
             <a:fld id="{2CFD78B9-21FB-4ADD-B4FB-87751F68C35B}" type="datetime1">
               <a:rPr lang="fr-FR" smtClean="0"/>
-              <a:t>26/05/2021</a:t>
+              <a:t>01/07/2021</a:t>
             </a:fld>
             <a:endParaRPr lang="fr-FR" dirty="0"/>
           </a:p>
@@ -5999,7 +6000,7 @@
           <a:p>
             <a:fld id="{8511CBC6-6ACA-4166-8DFC-1084691521E9}" type="datetime1">
               <a:rPr lang="fr-FR" smtClean="0"/>
-              <a:t>26/05/2021</a:t>
+              <a:t>01/07/2021</a:t>
             </a:fld>
             <a:endParaRPr lang="fr-FR" dirty="0"/>
           </a:p>
@@ -6219,7 +6220,7 @@
           <a:p>
             <a:fld id="{11C4889B-0FEB-4B19-AA6C-219D62F242D3}" type="datetime1">
               <a:rPr lang="fr-FR" smtClean="0"/>
-              <a:t>26/05/2021</a:t>
+              <a:t>01/07/2021</a:t>
             </a:fld>
             <a:endParaRPr lang="fr-FR" dirty="0"/>
           </a:p>
@@ -11650,6 +11651,3543 @@
 </file>
 
 <file path=ppt/slides/slide2.xml><?xml version="1.0" encoding="utf-8"?>
+<p:sld xmlns:a="http://schemas.openxmlformats.org/drawingml/2006/main" xmlns:r="http://schemas.openxmlformats.org/officeDocument/2006/relationships" xmlns:p="http://schemas.openxmlformats.org/presentationml/2006/main">
+  <p:cSld>
+    <p:spTree>
+      <p:nvGrpSpPr>
+        <p:cNvPr id="1" name=""/>
+        <p:cNvGrpSpPr/>
+        <p:nvPr/>
+      </p:nvGrpSpPr>
+      <p:grpSpPr>
+        <a:xfrm>
+          <a:off x="0" y="0"/>
+          <a:ext cx="0" cy="0"/>
+          <a:chOff x="0" y="0"/>
+          <a:chExt cx="0" cy="0"/>
+        </a:xfrm>
+      </p:grpSpPr>
+      <p:sp>
+        <p:nvSpPr>
+          <p:cNvPr id="4" name="Rectangle 3">
+            <a:extLst>
+              <a:ext uri="{FF2B5EF4-FFF2-40B4-BE49-F238E27FC236}">
+                <a16:creationId xmlns:a16="http://schemas.microsoft.com/office/drawing/2014/main" id="{E85BAFDC-09CF-4430-9AF7-80DF3BF9FE49}"/>
+              </a:ext>
+            </a:extLst>
+          </p:cNvPr>
+          <p:cNvSpPr/>
+          <p:nvPr/>
+        </p:nvSpPr>
+        <p:spPr>
+          <a:xfrm>
+            <a:off x="4407672" y="2703825"/>
+            <a:ext cx="4128868" cy="3798277"/>
+          </a:xfrm>
+          <a:prstGeom prst="rect">
+            <a:avLst/>
+          </a:prstGeom>
+          <a:solidFill>
+            <a:schemeClr val="bg1"/>
+          </a:solidFill>
+          <a:ln w="12700">
+            <a:solidFill>
+              <a:schemeClr val="tx1"/>
+            </a:solidFill>
+          </a:ln>
+        </p:spPr>
+        <p:style>
+          <a:lnRef idx="2">
+            <a:schemeClr val="accent1">
+              <a:shade val="50000"/>
+            </a:schemeClr>
+          </a:lnRef>
+          <a:fillRef idx="1">
+            <a:schemeClr val="accent1"/>
+          </a:fillRef>
+          <a:effectRef idx="0">
+            <a:schemeClr val="accent1"/>
+          </a:effectRef>
+          <a:fontRef idx="minor">
+            <a:schemeClr val="lt1"/>
+          </a:fontRef>
+        </p:style>
+        <p:txBody>
+          <a:bodyPr rtlCol="0" anchor="ctr"/>
+          <a:lstStyle/>
+          <a:p>
+            <a:pPr algn="ctr"/>
+            <a:endParaRPr lang="en-US"/>
+          </a:p>
+        </p:txBody>
+      </p:sp>
+      <p:sp>
+        <p:nvSpPr>
+          <p:cNvPr id="5" name="Rectangle 4">
+            <a:extLst>
+              <a:ext uri="{FF2B5EF4-FFF2-40B4-BE49-F238E27FC236}">
+                <a16:creationId xmlns:a16="http://schemas.microsoft.com/office/drawing/2014/main" id="{AB2D36D3-21C0-44F4-8BDA-49390471690C}"/>
+              </a:ext>
+            </a:extLst>
+          </p:cNvPr>
+          <p:cNvSpPr/>
+          <p:nvPr/>
+        </p:nvSpPr>
+        <p:spPr>
+          <a:xfrm>
+            <a:off x="4501457" y="2800774"/>
+            <a:ext cx="4128868" cy="3798277"/>
+          </a:xfrm>
+          <a:prstGeom prst="rect">
+            <a:avLst/>
+          </a:prstGeom>
+          <a:solidFill>
+            <a:schemeClr val="bg1"/>
+          </a:solidFill>
+          <a:ln w="12700">
+            <a:solidFill>
+              <a:schemeClr val="tx1"/>
+            </a:solidFill>
+          </a:ln>
+        </p:spPr>
+        <p:style>
+          <a:lnRef idx="2">
+            <a:schemeClr val="accent1">
+              <a:shade val="50000"/>
+            </a:schemeClr>
+          </a:lnRef>
+          <a:fillRef idx="1">
+            <a:schemeClr val="accent1"/>
+          </a:fillRef>
+          <a:effectRef idx="0">
+            <a:schemeClr val="accent1"/>
+          </a:effectRef>
+          <a:fontRef idx="minor">
+            <a:schemeClr val="lt1"/>
+          </a:fontRef>
+        </p:style>
+        <p:txBody>
+          <a:bodyPr rtlCol="0" anchor="ctr"/>
+          <a:lstStyle/>
+          <a:p>
+            <a:pPr algn="ctr"/>
+            <a:endParaRPr lang="en-US"/>
+          </a:p>
+        </p:txBody>
+      </p:sp>
+      <p:sp>
+        <p:nvSpPr>
+          <p:cNvPr id="6" name="Rectangle 5">
+            <a:extLst>
+              <a:ext uri="{FF2B5EF4-FFF2-40B4-BE49-F238E27FC236}">
+                <a16:creationId xmlns:a16="http://schemas.microsoft.com/office/drawing/2014/main" id="{3EEB1A50-E347-4D0B-BF9A-93D2FC64AFAA}"/>
+              </a:ext>
+            </a:extLst>
+          </p:cNvPr>
+          <p:cNvSpPr/>
+          <p:nvPr/>
+        </p:nvSpPr>
+        <p:spPr>
+          <a:xfrm>
+            <a:off x="4595242" y="2897723"/>
+            <a:ext cx="4128868" cy="3798277"/>
+          </a:xfrm>
+          <a:prstGeom prst="rect">
+            <a:avLst/>
+          </a:prstGeom>
+          <a:solidFill>
+            <a:schemeClr val="bg1"/>
+          </a:solidFill>
+          <a:ln w="12700">
+            <a:solidFill>
+              <a:schemeClr val="tx1"/>
+            </a:solidFill>
+          </a:ln>
+        </p:spPr>
+        <p:style>
+          <a:lnRef idx="2">
+            <a:schemeClr val="accent1">
+              <a:shade val="50000"/>
+            </a:schemeClr>
+          </a:lnRef>
+          <a:fillRef idx="1">
+            <a:schemeClr val="accent1"/>
+          </a:fillRef>
+          <a:effectRef idx="0">
+            <a:schemeClr val="accent1"/>
+          </a:effectRef>
+          <a:fontRef idx="minor">
+            <a:schemeClr val="lt1"/>
+          </a:fontRef>
+        </p:style>
+        <p:txBody>
+          <a:bodyPr rtlCol="0" anchor="ctr"/>
+          <a:lstStyle/>
+          <a:p>
+            <a:pPr algn="ctr"/>
+            <a:endParaRPr lang="en-US"/>
+          </a:p>
+        </p:txBody>
+      </p:sp>
+      <p:grpSp>
+        <p:nvGrpSpPr>
+          <p:cNvPr id="7" name="Group 6">
+            <a:extLst>
+              <a:ext uri="{FF2B5EF4-FFF2-40B4-BE49-F238E27FC236}">
+                <a16:creationId xmlns:a16="http://schemas.microsoft.com/office/drawing/2014/main" id="{701FA2FA-CD0D-488D-9092-CA3C3C6BA45F}"/>
+              </a:ext>
+            </a:extLst>
+          </p:cNvPr>
+          <p:cNvGrpSpPr/>
+          <p:nvPr/>
+        </p:nvGrpSpPr>
+        <p:grpSpPr>
+          <a:xfrm>
+            <a:off x="4755287" y="2970333"/>
+            <a:ext cx="3750418" cy="3653056"/>
+            <a:chOff x="1628947" y="1168997"/>
+            <a:chExt cx="3750418" cy="3653056"/>
+          </a:xfrm>
+        </p:grpSpPr>
+        <p:sp>
+          <p:nvSpPr>
+            <p:cNvPr id="8" name="Rectangle: Rounded Corners 7">
+              <a:extLst>
+                <a:ext uri="{FF2B5EF4-FFF2-40B4-BE49-F238E27FC236}">
+                  <a16:creationId xmlns:a16="http://schemas.microsoft.com/office/drawing/2014/main" id="{383DA237-C853-40C5-B724-CCC8E4DCD531}"/>
+                </a:ext>
+              </a:extLst>
+            </p:cNvPr>
+            <p:cNvSpPr/>
+            <p:nvPr/>
+          </p:nvSpPr>
+          <p:spPr>
+            <a:xfrm>
+              <a:off x="1628947" y="2969441"/>
+              <a:ext cx="3740479" cy="1852612"/>
+            </a:xfrm>
+            <a:prstGeom prst="roundRect">
+              <a:avLst>
+                <a:gd name="adj" fmla="val 7644"/>
+              </a:avLst>
+            </a:prstGeom>
+            <a:solidFill>
+              <a:schemeClr val="bg1"/>
+            </a:solidFill>
+            <a:ln w="9525">
+              <a:solidFill>
+                <a:schemeClr val="tx1"/>
+              </a:solidFill>
+              <a:prstDash val="dash"/>
+            </a:ln>
+          </p:spPr>
+          <p:style>
+            <a:lnRef idx="2">
+              <a:schemeClr val="accent1">
+                <a:shade val="50000"/>
+              </a:schemeClr>
+            </a:lnRef>
+            <a:fillRef idx="1">
+              <a:schemeClr val="accent1"/>
+            </a:fillRef>
+            <a:effectRef idx="0">
+              <a:schemeClr val="accent1"/>
+            </a:effectRef>
+            <a:fontRef idx="minor">
+              <a:schemeClr val="lt1"/>
+            </a:fontRef>
+          </p:style>
+          <p:txBody>
+            <a:bodyPr vert="vert270" rtlCol="0" anchor="t"/>
+            <a:lstStyle/>
+            <a:p>
+              <a:pPr algn="ctr"/>
+              <a:r>
+                <a:rPr lang="en-US" sz="800" dirty="0">
+                  <a:solidFill>
+                    <a:schemeClr val="tx1"/>
+                  </a:solidFill>
+                </a:rPr>
+                <a:t>Domestic devices operation</a:t>
+              </a:r>
+            </a:p>
+          </p:txBody>
+        </p:sp>
+        <p:sp>
+          <p:nvSpPr>
+            <p:cNvPr id="9" name="Rectangle: Rounded Corners 8">
+              <a:extLst>
+                <a:ext uri="{FF2B5EF4-FFF2-40B4-BE49-F238E27FC236}">
+                  <a16:creationId xmlns:a16="http://schemas.microsoft.com/office/drawing/2014/main" id="{5DEB4F09-F53A-4F1B-B9A3-24C34DC02905}"/>
+                </a:ext>
+              </a:extLst>
+            </p:cNvPr>
+            <p:cNvSpPr/>
+            <p:nvPr/>
+          </p:nvSpPr>
+          <p:spPr>
+            <a:xfrm>
+              <a:off x="1638886" y="2104910"/>
+              <a:ext cx="3740479" cy="767582"/>
+            </a:xfrm>
+            <a:prstGeom prst="roundRect">
+              <a:avLst>
+                <a:gd name="adj" fmla="val 7644"/>
+              </a:avLst>
+            </a:prstGeom>
+            <a:solidFill>
+              <a:schemeClr val="bg1"/>
+            </a:solidFill>
+            <a:ln w="9525">
+              <a:solidFill>
+                <a:schemeClr val="tx1"/>
+              </a:solidFill>
+              <a:prstDash val="dash"/>
+            </a:ln>
+          </p:spPr>
+          <p:style>
+            <a:lnRef idx="2">
+              <a:schemeClr val="accent1">
+                <a:shade val="50000"/>
+              </a:schemeClr>
+            </a:lnRef>
+            <a:fillRef idx="1">
+              <a:schemeClr val="accent1"/>
+            </a:fillRef>
+            <a:effectRef idx="0">
+              <a:schemeClr val="accent1"/>
+            </a:effectRef>
+            <a:fontRef idx="minor">
+              <a:schemeClr val="lt1"/>
+            </a:fontRef>
+          </p:style>
+          <p:txBody>
+            <a:bodyPr vert="vert270" rtlCol="0" anchor="t"/>
+            <a:lstStyle/>
+            <a:p>
+              <a:pPr algn="ctr"/>
+              <a:r>
+                <a:rPr lang="en-US" sz="800" dirty="0">
+                  <a:solidFill>
+                    <a:schemeClr val="tx1"/>
+                  </a:solidFill>
+                </a:rPr>
+                <a:t>Household behavior</a:t>
+              </a:r>
+            </a:p>
+          </p:txBody>
+        </p:sp>
+        <p:sp>
+          <p:nvSpPr>
+            <p:cNvPr id="10" name="Rectangle: Rounded Corners 9">
+              <a:extLst>
+                <a:ext uri="{FF2B5EF4-FFF2-40B4-BE49-F238E27FC236}">
+                  <a16:creationId xmlns:a16="http://schemas.microsoft.com/office/drawing/2014/main" id="{0A327114-E100-4513-A702-841A0171D507}"/>
+                </a:ext>
+              </a:extLst>
+            </p:cNvPr>
+            <p:cNvSpPr/>
+            <p:nvPr/>
+          </p:nvSpPr>
+          <p:spPr>
+            <a:xfrm>
+              <a:off x="1638886" y="1168997"/>
+              <a:ext cx="3740479" cy="838963"/>
+            </a:xfrm>
+            <a:prstGeom prst="roundRect">
+              <a:avLst>
+                <a:gd name="adj" fmla="val 7644"/>
+              </a:avLst>
+            </a:prstGeom>
+            <a:solidFill>
+              <a:schemeClr val="bg1"/>
+            </a:solidFill>
+            <a:ln w="9525">
+              <a:solidFill>
+                <a:schemeClr val="tx1"/>
+              </a:solidFill>
+              <a:prstDash val="dash"/>
+            </a:ln>
+          </p:spPr>
+          <p:style>
+            <a:lnRef idx="2">
+              <a:schemeClr val="accent1">
+                <a:shade val="50000"/>
+              </a:schemeClr>
+            </a:lnRef>
+            <a:fillRef idx="1">
+              <a:schemeClr val="accent1"/>
+            </a:fillRef>
+            <a:effectRef idx="0">
+              <a:schemeClr val="accent1"/>
+            </a:effectRef>
+            <a:fontRef idx="minor">
+              <a:schemeClr val="lt1"/>
+            </a:fontRef>
+          </p:style>
+          <p:txBody>
+            <a:bodyPr vert="vert270" rtlCol="0" anchor="t"/>
+            <a:lstStyle/>
+            <a:p>
+              <a:pPr algn="ctr"/>
+              <a:r>
+                <a:rPr lang="en-US" sz="800" dirty="0">
+                  <a:solidFill>
+                    <a:schemeClr val="tx1"/>
+                  </a:solidFill>
+                </a:rPr>
+                <a:t>Household specific inputs</a:t>
+              </a:r>
+            </a:p>
+          </p:txBody>
+        </p:sp>
+      </p:grpSp>
+      <p:sp>
+        <p:nvSpPr>
+          <p:cNvPr id="11" name="Rectangle 10">
+            <a:extLst>
+              <a:ext uri="{FF2B5EF4-FFF2-40B4-BE49-F238E27FC236}">
+                <a16:creationId xmlns:a16="http://schemas.microsoft.com/office/drawing/2014/main" id="{E37C7BC0-9D49-4ECD-AE53-BFD365B36541}"/>
+              </a:ext>
+            </a:extLst>
+          </p:cNvPr>
+          <p:cNvSpPr/>
+          <p:nvPr/>
+        </p:nvSpPr>
+        <p:spPr>
+          <a:xfrm>
+            <a:off x="6347908" y="3136975"/>
+            <a:ext cx="894733" cy="389197"/>
+          </a:xfrm>
+          <a:prstGeom prst="rect">
+            <a:avLst/>
+          </a:prstGeom>
+          <a:solidFill>
+            <a:schemeClr val="tx2">
+              <a:lumMod val="20000"/>
+              <a:lumOff val="80000"/>
+            </a:schemeClr>
+          </a:solidFill>
+          <a:ln w="9525">
+            <a:solidFill>
+              <a:schemeClr val="tx1"/>
+            </a:solidFill>
+          </a:ln>
+        </p:spPr>
+        <p:style>
+          <a:lnRef idx="2">
+            <a:schemeClr val="accent1">
+              <a:shade val="50000"/>
+            </a:schemeClr>
+          </a:lnRef>
+          <a:fillRef idx="1">
+            <a:schemeClr val="accent1"/>
+          </a:fillRef>
+          <a:effectRef idx="0">
+            <a:schemeClr val="accent1"/>
+          </a:effectRef>
+          <a:fontRef idx="minor">
+            <a:schemeClr val="lt1"/>
+          </a:fontRef>
+        </p:style>
+        <p:txBody>
+          <a:bodyPr rtlCol="0" anchor="ctr"/>
+          <a:lstStyle/>
+          <a:p>
+            <a:pPr algn="ctr"/>
+            <a:r>
+              <a:rPr lang="en-US" sz="700" b="1" dirty="0">
+                <a:solidFill>
+                  <a:schemeClr val="tx1"/>
+                </a:solidFill>
+              </a:rPr>
+              <a:t>Transition/ duration probabilities</a:t>
+            </a:r>
+          </a:p>
+        </p:txBody>
+      </p:sp>
+      <p:sp>
+        <p:nvSpPr>
+          <p:cNvPr id="12" name="Rectangle 11">
+            <a:extLst>
+              <a:ext uri="{FF2B5EF4-FFF2-40B4-BE49-F238E27FC236}">
+                <a16:creationId xmlns:a16="http://schemas.microsoft.com/office/drawing/2014/main" id="{47B7D3D1-E057-464A-BAEF-14E284C9F547}"/>
+              </a:ext>
+            </a:extLst>
+          </p:cNvPr>
+          <p:cNvSpPr/>
+          <p:nvPr/>
+        </p:nvSpPr>
+        <p:spPr>
+          <a:xfrm>
+            <a:off x="3271359" y="2845294"/>
+            <a:ext cx="836593" cy="380329"/>
+          </a:xfrm>
+          <a:prstGeom prst="rect">
+            <a:avLst/>
+          </a:prstGeom>
+          <a:pattFill prst="wdUpDiag">
+            <a:fgClr>
+              <a:schemeClr val="tx2">
+                <a:lumMod val="20000"/>
+                <a:lumOff val="80000"/>
+              </a:schemeClr>
+            </a:fgClr>
+            <a:bgClr>
+              <a:schemeClr val="bg1"/>
+            </a:bgClr>
+          </a:pattFill>
+          <a:ln w="9525">
+            <a:solidFill>
+              <a:schemeClr val="tx1"/>
+            </a:solidFill>
+          </a:ln>
+        </p:spPr>
+        <p:style>
+          <a:lnRef idx="2">
+            <a:schemeClr val="accent1">
+              <a:shade val="50000"/>
+            </a:schemeClr>
+          </a:lnRef>
+          <a:fillRef idx="1">
+            <a:schemeClr val="accent1"/>
+          </a:fillRef>
+          <a:effectRef idx="0">
+            <a:schemeClr val="accent1"/>
+          </a:effectRef>
+          <a:fontRef idx="minor">
+            <a:schemeClr val="lt1"/>
+          </a:fontRef>
+        </p:style>
+        <p:txBody>
+          <a:bodyPr rtlCol="0" anchor="ctr"/>
+          <a:lstStyle/>
+          <a:p>
+            <a:pPr algn="ctr"/>
+            <a:r>
+              <a:rPr lang="en-US" sz="700" b="1" dirty="0">
+                <a:solidFill>
+                  <a:schemeClr val="tx1"/>
+                </a:solidFill>
+              </a:rPr>
+              <a:t>Appliance ownership statistics</a:t>
+            </a:r>
+          </a:p>
+        </p:txBody>
+      </p:sp>
+      <p:sp>
+        <p:nvSpPr>
+          <p:cNvPr id="13" name="Rectangle 12">
+            <a:extLst>
+              <a:ext uri="{FF2B5EF4-FFF2-40B4-BE49-F238E27FC236}">
+                <a16:creationId xmlns:a16="http://schemas.microsoft.com/office/drawing/2014/main" id="{E0B9C025-DC69-4145-904D-A0FF82DB66EF}"/>
+              </a:ext>
+            </a:extLst>
+          </p:cNvPr>
+          <p:cNvSpPr/>
+          <p:nvPr/>
+        </p:nvSpPr>
+        <p:spPr>
+          <a:xfrm>
+            <a:off x="6340074" y="4092877"/>
+            <a:ext cx="910403" cy="389198"/>
+          </a:xfrm>
+          <a:prstGeom prst="rect">
+            <a:avLst/>
+          </a:prstGeom>
+          <a:solidFill>
+            <a:srgbClr val="00B050">
+              <a:alpha val="20000"/>
+            </a:srgbClr>
+          </a:solidFill>
+          <a:ln w="9525">
+            <a:solidFill>
+              <a:schemeClr val="tx1"/>
+            </a:solidFill>
+          </a:ln>
+        </p:spPr>
+        <p:style>
+          <a:lnRef idx="2">
+            <a:schemeClr val="accent1">
+              <a:shade val="50000"/>
+            </a:schemeClr>
+          </a:lnRef>
+          <a:fillRef idx="1">
+            <a:schemeClr val="accent1"/>
+          </a:fillRef>
+          <a:effectRef idx="0">
+            <a:schemeClr val="accent1"/>
+          </a:effectRef>
+          <a:fontRef idx="minor">
+            <a:schemeClr val="lt1"/>
+          </a:fontRef>
+        </p:style>
+        <p:txBody>
+          <a:bodyPr rtlCol="0" anchor="ctr"/>
+          <a:lstStyle/>
+          <a:p>
+            <a:pPr algn="ctr"/>
+            <a:r>
+              <a:rPr lang="en-US" sz="700" b="1" dirty="0">
+                <a:solidFill>
+                  <a:schemeClr val="tx1"/>
+                </a:solidFill>
+              </a:rPr>
+              <a:t>Occupancy/ activity simulator</a:t>
+            </a:r>
+          </a:p>
+        </p:txBody>
+      </p:sp>
+      <p:sp>
+        <p:nvSpPr>
+          <p:cNvPr id="14" name="Rectangle 13">
+            <a:extLst>
+              <a:ext uri="{FF2B5EF4-FFF2-40B4-BE49-F238E27FC236}">
+                <a16:creationId xmlns:a16="http://schemas.microsoft.com/office/drawing/2014/main" id="{A02FB6EF-0A38-4277-8B4A-242A556B03A4}"/>
+              </a:ext>
+            </a:extLst>
+          </p:cNvPr>
+          <p:cNvSpPr/>
+          <p:nvPr/>
+        </p:nvSpPr>
+        <p:spPr>
+          <a:xfrm>
+            <a:off x="3268864" y="2417019"/>
+            <a:ext cx="836593" cy="380329"/>
+          </a:xfrm>
+          <a:prstGeom prst="rect">
+            <a:avLst/>
+          </a:prstGeom>
+          <a:pattFill prst="wdUpDiag">
+            <a:fgClr>
+              <a:schemeClr val="tx2">
+                <a:lumMod val="20000"/>
+                <a:lumOff val="80000"/>
+              </a:schemeClr>
+            </a:fgClr>
+            <a:bgClr>
+              <a:schemeClr val="bg1"/>
+            </a:bgClr>
+          </a:pattFill>
+          <a:ln w="9525">
+            <a:solidFill>
+              <a:schemeClr val="tx1"/>
+            </a:solidFill>
+          </a:ln>
+        </p:spPr>
+        <p:style>
+          <a:lnRef idx="2">
+            <a:schemeClr val="accent1">
+              <a:shade val="50000"/>
+            </a:schemeClr>
+          </a:lnRef>
+          <a:fillRef idx="1">
+            <a:schemeClr val="accent1"/>
+          </a:fillRef>
+          <a:effectRef idx="0">
+            <a:schemeClr val="accent1"/>
+          </a:effectRef>
+          <a:fontRef idx="minor">
+            <a:schemeClr val="lt1"/>
+          </a:fontRef>
+        </p:style>
+        <p:txBody>
+          <a:bodyPr rtlCol="0" anchor="ctr"/>
+          <a:lstStyle/>
+          <a:p>
+            <a:pPr algn="ctr"/>
+            <a:r>
+              <a:rPr lang="en-US" sz="700" b="1" dirty="0">
+                <a:solidFill>
+                  <a:schemeClr val="tx1"/>
+                </a:solidFill>
+              </a:rPr>
+              <a:t>TOU statistics</a:t>
+            </a:r>
+          </a:p>
+        </p:txBody>
+      </p:sp>
+      <p:sp>
+        <p:nvSpPr>
+          <p:cNvPr id="15" name="Rectangle 14">
+            <a:extLst>
+              <a:ext uri="{FF2B5EF4-FFF2-40B4-BE49-F238E27FC236}">
+                <a16:creationId xmlns:a16="http://schemas.microsoft.com/office/drawing/2014/main" id="{F6D4570B-80F2-4DF9-8086-E137732BAABD}"/>
+              </a:ext>
+            </a:extLst>
+          </p:cNvPr>
+          <p:cNvSpPr/>
+          <p:nvPr/>
+        </p:nvSpPr>
+        <p:spPr>
+          <a:xfrm>
+            <a:off x="3268864" y="3273569"/>
+            <a:ext cx="836593" cy="380329"/>
+          </a:xfrm>
+          <a:prstGeom prst="rect">
+            <a:avLst/>
+          </a:prstGeom>
+          <a:pattFill prst="wdUpDiag">
+            <a:fgClr>
+              <a:schemeClr val="tx2">
+                <a:lumMod val="20000"/>
+                <a:lumOff val="80000"/>
+              </a:schemeClr>
+            </a:fgClr>
+            <a:bgClr>
+              <a:schemeClr val="bg1"/>
+            </a:bgClr>
+          </a:pattFill>
+          <a:ln w="9525">
+            <a:solidFill>
+              <a:schemeClr val="tx1"/>
+            </a:solidFill>
+          </a:ln>
+        </p:spPr>
+        <p:style>
+          <a:lnRef idx="2">
+            <a:schemeClr val="accent1">
+              <a:shade val="50000"/>
+            </a:schemeClr>
+          </a:lnRef>
+          <a:fillRef idx="1">
+            <a:schemeClr val="accent1"/>
+          </a:fillRef>
+          <a:effectRef idx="0">
+            <a:schemeClr val="accent1"/>
+          </a:effectRef>
+          <a:fontRef idx="minor">
+            <a:schemeClr val="lt1"/>
+          </a:fontRef>
+        </p:style>
+        <p:txBody>
+          <a:bodyPr rtlCol="0" anchor="ctr"/>
+          <a:lstStyle/>
+          <a:p>
+            <a:pPr algn="ctr"/>
+            <a:r>
+              <a:rPr lang="en-US" sz="700" b="1" dirty="0">
+                <a:solidFill>
+                  <a:schemeClr val="tx1"/>
+                </a:solidFill>
+              </a:rPr>
+              <a:t>Micro-census data</a:t>
+            </a:r>
+          </a:p>
+        </p:txBody>
+      </p:sp>
+      <p:sp>
+        <p:nvSpPr>
+          <p:cNvPr id="16" name="Rectangle 15">
+            <a:extLst>
+              <a:ext uri="{FF2B5EF4-FFF2-40B4-BE49-F238E27FC236}">
+                <a16:creationId xmlns:a16="http://schemas.microsoft.com/office/drawing/2014/main" id="{A0DD8FAF-692C-4248-BF43-C92A58A1C244}"/>
+              </a:ext>
+            </a:extLst>
+          </p:cNvPr>
+          <p:cNvSpPr/>
+          <p:nvPr/>
+        </p:nvSpPr>
+        <p:spPr>
+          <a:xfrm>
+            <a:off x="3268864" y="3704590"/>
+            <a:ext cx="836593" cy="380329"/>
+          </a:xfrm>
+          <a:prstGeom prst="rect">
+            <a:avLst/>
+          </a:prstGeom>
+          <a:pattFill prst="wdUpDiag">
+            <a:fgClr>
+              <a:schemeClr val="tx2">
+                <a:lumMod val="20000"/>
+                <a:lumOff val="80000"/>
+              </a:schemeClr>
+            </a:fgClr>
+            <a:bgClr>
+              <a:schemeClr val="bg1"/>
+            </a:bgClr>
+          </a:pattFill>
+          <a:ln w="9525">
+            <a:solidFill>
+              <a:schemeClr val="tx1"/>
+            </a:solidFill>
+          </a:ln>
+        </p:spPr>
+        <p:style>
+          <a:lnRef idx="2">
+            <a:schemeClr val="accent1">
+              <a:shade val="50000"/>
+            </a:schemeClr>
+          </a:lnRef>
+          <a:fillRef idx="1">
+            <a:schemeClr val="accent1"/>
+          </a:fillRef>
+          <a:effectRef idx="0">
+            <a:schemeClr val="accent1"/>
+          </a:effectRef>
+          <a:fontRef idx="minor">
+            <a:schemeClr val="lt1"/>
+          </a:fontRef>
+        </p:style>
+        <p:txBody>
+          <a:bodyPr rtlCol="0" anchor="ctr"/>
+          <a:lstStyle/>
+          <a:p>
+            <a:pPr algn="ctr"/>
+            <a:r>
+              <a:rPr lang="en-US" sz="700" b="1" dirty="0">
+                <a:solidFill>
+                  <a:schemeClr val="tx1"/>
+                </a:solidFill>
+              </a:rPr>
+              <a:t>Devices and dwelling characteristics</a:t>
+            </a:r>
+          </a:p>
+        </p:txBody>
+      </p:sp>
+      <p:sp>
+        <p:nvSpPr>
+          <p:cNvPr id="17" name="Rectangle 16">
+            <a:extLst>
+              <a:ext uri="{FF2B5EF4-FFF2-40B4-BE49-F238E27FC236}">
+                <a16:creationId xmlns:a16="http://schemas.microsoft.com/office/drawing/2014/main" id="{D17A0D9B-1EE0-442C-9AEB-81BED2E0343C}"/>
+              </a:ext>
+            </a:extLst>
+          </p:cNvPr>
+          <p:cNvSpPr/>
+          <p:nvPr/>
+        </p:nvSpPr>
+        <p:spPr>
+          <a:xfrm>
+            <a:off x="7451977" y="3134789"/>
+            <a:ext cx="910402" cy="389197"/>
+          </a:xfrm>
+          <a:prstGeom prst="rect">
+            <a:avLst/>
+          </a:prstGeom>
+          <a:solidFill>
+            <a:schemeClr val="tx2">
+              <a:lumMod val="20000"/>
+              <a:lumOff val="80000"/>
+            </a:schemeClr>
+          </a:solidFill>
+          <a:ln w="9525">
+            <a:solidFill>
+              <a:schemeClr val="tx1"/>
+            </a:solidFill>
+          </a:ln>
+        </p:spPr>
+        <p:style>
+          <a:lnRef idx="2">
+            <a:schemeClr val="accent1">
+              <a:shade val="50000"/>
+            </a:schemeClr>
+          </a:lnRef>
+          <a:fillRef idx="1">
+            <a:schemeClr val="accent1"/>
+          </a:fillRef>
+          <a:effectRef idx="0">
+            <a:schemeClr val="accent1"/>
+          </a:effectRef>
+          <a:fontRef idx="minor">
+            <a:schemeClr val="lt1"/>
+          </a:fontRef>
+        </p:style>
+        <p:txBody>
+          <a:bodyPr rtlCol="0" anchor="ctr"/>
+          <a:lstStyle/>
+          <a:p>
+            <a:pPr algn="ctr"/>
+            <a:r>
+              <a:rPr lang="en-US" sz="700" b="1" dirty="0">
+                <a:solidFill>
+                  <a:schemeClr val="tx1"/>
+                </a:solidFill>
+              </a:rPr>
+              <a:t>Appliance set</a:t>
+            </a:r>
+          </a:p>
+        </p:txBody>
+      </p:sp>
+      <p:sp>
+        <p:nvSpPr>
+          <p:cNvPr id="18" name="Rectangle 17">
+            <a:extLst>
+              <a:ext uri="{FF2B5EF4-FFF2-40B4-BE49-F238E27FC236}">
+                <a16:creationId xmlns:a16="http://schemas.microsoft.com/office/drawing/2014/main" id="{95258396-4718-419D-9EC2-22C37BFCA1B6}"/>
+              </a:ext>
+            </a:extLst>
+          </p:cNvPr>
+          <p:cNvSpPr/>
+          <p:nvPr/>
+        </p:nvSpPr>
+        <p:spPr>
+          <a:xfrm>
+            <a:off x="3268864" y="5615072"/>
+            <a:ext cx="836593" cy="380329"/>
+          </a:xfrm>
+          <a:prstGeom prst="rect">
+            <a:avLst/>
+          </a:prstGeom>
+          <a:solidFill>
+            <a:srgbClr val="91C9EF">
+              <a:alpha val="48000"/>
+            </a:srgbClr>
+          </a:solidFill>
+          <a:ln w="9525">
+            <a:solidFill>
+              <a:schemeClr val="tx1"/>
+            </a:solidFill>
+          </a:ln>
+        </p:spPr>
+        <p:style>
+          <a:lnRef idx="2">
+            <a:schemeClr val="accent1">
+              <a:shade val="50000"/>
+            </a:schemeClr>
+          </a:lnRef>
+          <a:fillRef idx="1">
+            <a:schemeClr val="accent1"/>
+          </a:fillRef>
+          <a:effectRef idx="0">
+            <a:schemeClr val="accent1"/>
+          </a:effectRef>
+          <a:fontRef idx="minor">
+            <a:schemeClr val="lt1"/>
+          </a:fontRef>
+        </p:style>
+        <p:txBody>
+          <a:bodyPr rtlCol="0" anchor="ctr"/>
+          <a:lstStyle/>
+          <a:p>
+            <a:pPr algn="ctr"/>
+            <a:r>
+              <a:rPr lang="en-US" sz="700" b="1" dirty="0">
+                <a:solidFill>
+                  <a:schemeClr val="tx1"/>
+                </a:solidFill>
+              </a:rPr>
+              <a:t>Weather simulator</a:t>
+            </a:r>
+          </a:p>
+        </p:txBody>
+      </p:sp>
+      <p:sp>
+        <p:nvSpPr>
+          <p:cNvPr id="19" name="Rectangle 18">
+            <a:extLst>
+              <a:ext uri="{FF2B5EF4-FFF2-40B4-BE49-F238E27FC236}">
+                <a16:creationId xmlns:a16="http://schemas.microsoft.com/office/drawing/2014/main" id="{B6AADBFE-720A-4E0E-B784-D83DE3D2AB14}"/>
+              </a:ext>
+            </a:extLst>
+          </p:cNvPr>
+          <p:cNvSpPr/>
+          <p:nvPr/>
+        </p:nvSpPr>
+        <p:spPr>
+          <a:xfrm>
+            <a:off x="5284677" y="3142409"/>
+            <a:ext cx="894733" cy="389197"/>
+          </a:xfrm>
+          <a:prstGeom prst="rect">
+            <a:avLst/>
+          </a:prstGeom>
+          <a:solidFill>
+            <a:schemeClr val="tx2">
+              <a:lumMod val="20000"/>
+              <a:lumOff val="80000"/>
+            </a:schemeClr>
+          </a:solidFill>
+          <a:ln w="9525">
+            <a:solidFill>
+              <a:schemeClr val="tx1"/>
+            </a:solidFill>
+          </a:ln>
+        </p:spPr>
+        <p:style>
+          <a:lnRef idx="2">
+            <a:schemeClr val="accent1">
+              <a:shade val="50000"/>
+            </a:schemeClr>
+          </a:lnRef>
+          <a:fillRef idx="1">
+            <a:schemeClr val="accent1"/>
+          </a:fillRef>
+          <a:effectRef idx="0">
+            <a:schemeClr val="accent1"/>
+          </a:effectRef>
+          <a:fontRef idx="minor">
+            <a:schemeClr val="lt1"/>
+          </a:fontRef>
+        </p:style>
+        <p:txBody>
+          <a:bodyPr rtlCol="0" anchor="ctr"/>
+          <a:lstStyle/>
+          <a:p>
+            <a:pPr algn="ctr"/>
+            <a:r>
+              <a:rPr lang="en-US" sz="700" b="1" dirty="0">
+                <a:solidFill>
+                  <a:schemeClr val="tx1"/>
+                </a:solidFill>
+              </a:rPr>
+              <a:t>Thermostat empirical settings</a:t>
+            </a:r>
+          </a:p>
+        </p:txBody>
+      </p:sp>
+      <p:sp>
+        <p:nvSpPr>
+          <p:cNvPr id="20" name="Rectangle 19">
+            <a:extLst>
+              <a:ext uri="{FF2B5EF4-FFF2-40B4-BE49-F238E27FC236}">
+                <a16:creationId xmlns:a16="http://schemas.microsoft.com/office/drawing/2014/main" id="{2FD31E62-2CE0-4430-BE00-3C98B2B88352}"/>
+              </a:ext>
+            </a:extLst>
+          </p:cNvPr>
+          <p:cNvSpPr/>
+          <p:nvPr/>
+        </p:nvSpPr>
+        <p:spPr>
+          <a:xfrm>
+            <a:off x="7457260" y="5007982"/>
+            <a:ext cx="910403" cy="330662"/>
+          </a:xfrm>
+          <a:prstGeom prst="rect">
+            <a:avLst/>
+          </a:prstGeom>
+          <a:solidFill>
+            <a:srgbClr val="FFFF00">
+              <a:alpha val="24000"/>
+            </a:srgbClr>
+          </a:solidFill>
+          <a:ln w="9525">
+            <a:solidFill>
+              <a:schemeClr val="tx1"/>
+            </a:solidFill>
+          </a:ln>
+        </p:spPr>
+        <p:style>
+          <a:lnRef idx="2">
+            <a:schemeClr val="accent1">
+              <a:shade val="50000"/>
+            </a:schemeClr>
+          </a:lnRef>
+          <a:fillRef idx="1">
+            <a:schemeClr val="accent1"/>
+          </a:fillRef>
+          <a:effectRef idx="0">
+            <a:schemeClr val="accent1"/>
+          </a:effectRef>
+          <a:fontRef idx="minor">
+            <a:schemeClr val="lt1"/>
+          </a:fontRef>
+        </p:style>
+        <p:txBody>
+          <a:bodyPr rtlCol="0" anchor="ctr"/>
+          <a:lstStyle/>
+          <a:p>
+            <a:pPr algn="ctr"/>
+            <a:r>
+              <a:rPr lang="en-US" sz="700" b="1" dirty="0">
+                <a:solidFill>
+                  <a:schemeClr val="tx1"/>
+                </a:solidFill>
+              </a:rPr>
+              <a:t>Appliance and water fixtures usage sim.</a:t>
+            </a:r>
+          </a:p>
+        </p:txBody>
+      </p:sp>
+      <p:sp>
+        <p:nvSpPr>
+          <p:cNvPr id="21" name="Rectangle 20">
+            <a:extLst>
+              <a:ext uri="{FF2B5EF4-FFF2-40B4-BE49-F238E27FC236}">
+                <a16:creationId xmlns:a16="http://schemas.microsoft.com/office/drawing/2014/main" id="{43BFF934-FD45-4590-961C-01D085A4BA10}"/>
+              </a:ext>
+            </a:extLst>
+          </p:cNvPr>
+          <p:cNvSpPr/>
+          <p:nvPr/>
+        </p:nvSpPr>
+        <p:spPr>
+          <a:xfrm>
+            <a:off x="7457260" y="5638618"/>
+            <a:ext cx="910403" cy="330662"/>
+          </a:xfrm>
+          <a:prstGeom prst="rect">
+            <a:avLst/>
+          </a:prstGeom>
+          <a:solidFill>
+            <a:srgbClr val="FFFF00">
+              <a:alpha val="24000"/>
+            </a:srgbClr>
+          </a:solidFill>
+          <a:ln w="9525">
+            <a:solidFill>
+              <a:schemeClr val="tx1"/>
+            </a:solidFill>
+          </a:ln>
+        </p:spPr>
+        <p:style>
+          <a:lnRef idx="2">
+            <a:schemeClr val="accent1">
+              <a:shade val="50000"/>
+            </a:schemeClr>
+          </a:lnRef>
+          <a:fillRef idx="1">
+            <a:schemeClr val="accent1"/>
+          </a:fillRef>
+          <a:effectRef idx="0">
+            <a:schemeClr val="accent1"/>
+          </a:effectRef>
+          <a:fontRef idx="minor">
+            <a:schemeClr val="lt1"/>
+          </a:fontRef>
+        </p:style>
+        <p:txBody>
+          <a:bodyPr rtlCol="0" anchor="ctr"/>
+          <a:lstStyle/>
+          <a:p>
+            <a:pPr algn="ctr"/>
+            <a:r>
+              <a:rPr lang="en-US" sz="700" b="1" dirty="0">
+                <a:solidFill>
+                  <a:schemeClr val="tx1"/>
+                </a:solidFill>
+              </a:rPr>
+              <a:t>Lighting simulator</a:t>
+            </a:r>
+          </a:p>
+        </p:txBody>
+      </p:sp>
+      <p:sp>
+        <p:nvSpPr>
+          <p:cNvPr id="22" name="Rectangle 21">
+            <a:extLst>
+              <a:ext uri="{FF2B5EF4-FFF2-40B4-BE49-F238E27FC236}">
+                <a16:creationId xmlns:a16="http://schemas.microsoft.com/office/drawing/2014/main" id="{B0BA07E9-DDA3-44F1-ACB7-1B1D4C410A65}"/>
+              </a:ext>
+            </a:extLst>
+          </p:cNvPr>
+          <p:cNvSpPr/>
+          <p:nvPr/>
+        </p:nvSpPr>
+        <p:spPr>
+          <a:xfrm>
+            <a:off x="5217279" y="5007982"/>
+            <a:ext cx="910403" cy="330662"/>
+          </a:xfrm>
+          <a:prstGeom prst="rect">
+            <a:avLst/>
+          </a:prstGeom>
+          <a:solidFill>
+            <a:schemeClr val="accent6">
+              <a:lumMod val="20000"/>
+              <a:lumOff val="80000"/>
+            </a:schemeClr>
+          </a:solidFill>
+          <a:ln w="9525">
+            <a:solidFill>
+              <a:schemeClr val="tx1"/>
+            </a:solidFill>
+          </a:ln>
+        </p:spPr>
+        <p:style>
+          <a:lnRef idx="2">
+            <a:schemeClr val="accent1">
+              <a:shade val="50000"/>
+            </a:schemeClr>
+          </a:lnRef>
+          <a:fillRef idx="1">
+            <a:schemeClr val="accent1"/>
+          </a:fillRef>
+          <a:effectRef idx="0">
+            <a:schemeClr val="accent1"/>
+          </a:effectRef>
+          <a:fontRef idx="minor">
+            <a:schemeClr val="lt1"/>
+          </a:fontRef>
+        </p:style>
+        <p:txBody>
+          <a:bodyPr rtlCol="0" anchor="ctr"/>
+          <a:lstStyle/>
+          <a:p>
+            <a:pPr algn="ctr"/>
+            <a:r>
+              <a:rPr lang="en-US" sz="700" b="1" dirty="0">
+                <a:solidFill>
+                  <a:schemeClr val="tx1"/>
+                </a:solidFill>
+              </a:rPr>
+              <a:t>Thermostat control setting sim.</a:t>
+            </a:r>
+          </a:p>
+        </p:txBody>
+      </p:sp>
+      <p:sp>
+        <p:nvSpPr>
+          <p:cNvPr id="23" name="Rectangle 22">
+            <a:extLst>
+              <a:ext uri="{FF2B5EF4-FFF2-40B4-BE49-F238E27FC236}">
+                <a16:creationId xmlns:a16="http://schemas.microsoft.com/office/drawing/2014/main" id="{E342C8A6-EFCB-4F0C-B034-6A8D24B5E54C}"/>
+              </a:ext>
+            </a:extLst>
+          </p:cNvPr>
+          <p:cNvSpPr/>
+          <p:nvPr/>
+        </p:nvSpPr>
+        <p:spPr>
+          <a:xfrm>
+            <a:off x="6340074" y="5638618"/>
+            <a:ext cx="910403" cy="330662"/>
+          </a:xfrm>
+          <a:prstGeom prst="rect">
+            <a:avLst/>
+          </a:prstGeom>
+          <a:solidFill>
+            <a:schemeClr val="accent6">
+              <a:lumMod val="20000"/>
+              <a:lumOff val="80000"/>
+            </a:schemeClr>
+          </a:solidFill>
+          <a:ln w="9525">
+            <a:solidFill>
+              <a:schemeClr val="tx1"/>
+            </a:solidFill>
+          </a:ln>
+        </p:spPr>
+        <p:style>
+          <a:lnRef idx="2">
+            <a:schemeClr val="accent1">
+              <a:shade val="50000"/>
+            </a:schemeClr>
+          </a:lnRef>
+          <a:fillRef idx="1">
+            <a:schemeClr val="accent1"/>
+          </a:fillRef>
+          <a:effectRef idx="0">
+            <a:schemeClr val="accent1"/>
+          </a:effectRef>
+          <a:fontRef idx="minor">
+            <a:schemeClr val="lt1"/>
+          </a:fontRef>
+        </p:style>
+        <p:txBody>
+          <a:bodyPr rtlCol="0" anchor="ctr"/>
+          <a:lstStyle/>
+          <a:p>
+            <a:pPr algn="ctr"/>
+            <a:r>
+              <a:rPr lang="en-US" sz="700" b="1" dirty="0">
+                <a:solidFill>
+                  <a:schemeClr val="tx1"/>
+                </a:solidFill>
+              </a:rPr>
+              <a:t>Integrated heating &amp; DHW demand sim.</a:t>
+            </a:r>
+          </a:p>
+        </p:txBody>
+      </p:sp>
+      <p:sp>
+        <p:nvSpPr>
+          <p:cNvPr id="24" name="Rectangle 23">
+            <a:extLst>
+              <a:ext uri="{FF2B5EF4-FFF2-40B4-BE49-F238E27FC236}">
+                <a16:creationId xmlns:a16="http://schemas.microsoft.com/office/drawing/2014/main" id="{EDD781FB-E48D-42FE-B351-F475423E8562}"/>
+              </a:ext>
+            </a:extLst>
+          </p:cNvPr>
+          <p:cNvSpPr/>
+          <p:nvPr/>
+        </p:nvSpPr>
+        <p:spPr>
+          <a:xfrm>
+            <a:off x="5217280" y="5639906"/>
+            <a:ext cx="910403" cy="330662"/>
+          </a:xfrm>
+          <a:prstGeom prst="rect">
+            <a:avLst/>
+          </a:prstGeom>
+          <a:solidFill>
+            <a:schemeClr val="accent6">
+              <a:lumMod val="20000"/>
+              <a:lumOff val="80000"/>
+            </a:schemeClr>
+          </a:solidFill>
+          <a:ln w="9525">
+            <a:solidFill>
+              <a:schemeClr val="tx1"/>
+            </a:solidFill>
+          </a:ln>
+        </p:spPr>
+        <p:style>
+          <a:lnRef idx="2">
+            <a:schemeClr val="accent1">
+              <a:shade val="50000"/>
+            </a:schemeClr>
+          </a:lnRef>
+          <a:fillRef idx="1">
+            <a:schemeClr val="accent1"/>
+          </a:fillRef>
+          <a:effectRef idx="0">
+            <a:schemeClr val="accent1"/>
+          </a:effectRef>
+          <a:fontRef idx="minor">
+            <a:schemeClr val="lt1"/>
+          </a:fontRef>
+        </p:style>
+        <p:txBody>
+          <a:bodyPr rtlCol="0" anchor="ctr"/>
+          <a:lstStyle/>
+          <a:p>
+            <a:pPr algn="ctr"/>
+            <a:r>
+              <a:rPr lang="en-US" sz="700" b="1" dirty="0">
+                <a:solidFill>
+                  <a:schemeClr val="tx1"/>
+                </a:solidFill>
+              </a:rPr>
+              <a:t>Building thermal behavior sim.</a:t>
+            </a:r>
+          </a:p>
+        </p:txBody>
+      </p:sp>
+      <p:sp>
+        <p:nvSpPr>
+          <p:cNvPr id="25" name="Rectangle 24">
+            <a:extLst>
+              <a:ext uri="{FF2B5EF4-FFF2-40B4-BE49-F238E27FC236}">
+                <a16:creationId xmlns:a16="http://schemas.microsoft.com/office/drawing/2014/main" id="{B47A60D5-1CAB-4017-B99B-AFADE187E370}"/>
+              </a:ext>
+            </a:extLst>
+          </p:cNvPr>
+          <p:cNvSpPr/>
+          <p:nvPr/>
+        </p:nvSpPr>
+        <p:spPr>
+          <a:xfrm>
+            <a:off x="6341372" y="6183609"/>
+            <a:ext cx="910403" cy="330662"/>
+          </a:xfrm>
+          <a:prstGeom prst="rect">
+            <a:avLst/>
+          </a:prstGeom>
+          <a:solidFill>
+            <a:schemeClr val="accent6">
+              <a:lumMod val="20000"/>
+              <a:lumOff val="80000"/>
+            </a:schemeClr>
+          </a:solidFill>
+          <a:ln w="9525">
+            <a:solidFill>
+              <a:schemeClr val="tx1"/>
+            </a:solidFill>
+          </a:ln>
+        </p:spPr>
+        <p:style>
+          <a:lnRef idx="2">
+            <a:schemeClr val="accent1">
+              <a:shade val="50000"/>
+            </a:schemeClr>
+          </a:lnRef>
+          <a:fillRef idx="1">
+            <a:schemeClr val="accent1"/>
+          </a:fillRef>
+          <a:effectRef idx="0">
+            <a:schemeClr val="accent1"/>
+          </a:effectRef>
+          <a:fontRef idx="minor">
+            <a:schemeClr val="lt1"/>
+          </a:fontRef>
+        </p:style>
+        <p:txBody>
+          <a:bodyPr rtlCol="0" anchor="ctr"/>
+          <a:lstStyle/>
+          <a:p>
+            <a:pPr algn="ctr"/>
+            <a:r>
+              <a:rPr lang="en-US" sz="700" b="1" dirty="0">
+                <a:solidFill>
+                  <a:schemeClr val="tx1"/>
+                </a:solidFill>
+              </a:rPr>
+              <a:t>Heating system controller and operation sim.</a:t>
+            </a:r>
+          </a:p>
+        </p:txBody>
+      </p:sp>
+      <p:cxnSp>
+        <p:nvCxnSpPr>
+          <p:cNvPr id="26" name="Connector: Elbow 25">
+            <a:extLst>
+              <a:ext uri="{FF2B5EF4-FFF2-40B4-BE49-F238E27FC236}">
+                <a16:creationId xmlns:a16="http://schemas.microsoft.com/office/drawing/2014/main" id="{4D4BF168-24A7-4645-8874-DC15C07B314C}"/>
+              </a:ext>
+            </a:extLst>
+          </p:cNvPr>
+          <p:cNvCxnSpPr>
+            <a:cxnSpLocks/>
+            <a:stCxn id="35" idx="2"/>
+          </p:cNvCxnSpPr>
+          <p:nvPr/>
+        </p:nvCxnSpPr>
+        <p:spPr>
+          <a:xfrm rot="5400000">
+            <a:off x="5796999" y="4355284"/>
+            <a:ext cx="535296" cy="784332"/>
+          </a:xfrm>
+          <a:prstGeom prst="bentConnector3">
+            <a:avLst>
+              <a:gd name="adj1" fmla="val 73264"/>
+            </a:avLst>
+          </a:prstGeom>
+          <a:ln>
+            <a:solidFill>
+              <a:schemeClr val="tx1"/>
+            </a:solidFill>
+            <a:tailEnd type="triangle"/>
+          </a:ln>
+        </p:spPr>
+        <p:style>
+          <a:lnRef idx="1">
+            <a:schemeClr val="accent1"/>
+          </a:lnRef>
+          <a:fillRef idx="0">
+            <a:schemeClr val="accent1"/>
+          </a:fillRef>
+          <a:effectRef idx="0">
+            <a:schemeClr val="accent1"/>
+          </a:effectRef>
+          <a:fontRef idx="minor">
+            <a:schemeClr val="tx1"/>
+          </a:fontRef>
+        </p:style>
+      </p:cxnSp>
+      <p:cxnSp>
+        <p:nvCxnSpPr>
+          <p:cNvPr id="27" name="Connector: Elbow 26">
+            <a:extLst>
+              <a:ext uri="{FF2B5EF4-FFF2-40B4-BE49-F238E27FC236}">
+                <a16:creationId xmlns:a16="http://schemas.microsoft.com/office/drawing/2014/main" id="{7A9D6DED-903A-4BD8-8E81-32A0AD7C912E}"/>
+              </a:ext>
+            </a:extLst>
+          </p:cNvPr>
+          <p:cNvCxnSpPr>
+            <a:cxnSpLocks/>
+            <a:stCxn id="38" idx="2"/>
+            <a:endCxn id="20" idx="0"/>
+          </p:cNvCxnSpPr>
+          <p:nvPr/>
+        </p:nvCxnSpPr>
+        <p:spPr>
+          <a:xfrm rot="16200000" flipH="1">
+            <a:off x="7262510" y="4358030"/>
+            <a:ext cx="528180" cy="771723"/>
+          </a:xfrm>
+          <a:prstGeom prst="bentConnector3">
+            <a:avLst>
+              <a:gd name="adj1" fmla="val 74924"/>
+            </a:avLst>
+          </a:prstGeom>
+          <a:ln>
+            <a:solidFill>
+              <a:schemeClr val="tx1"/>
+            </a:solidFill>
+            <a:tailEnd type="triangle"/>
+          </a:ln>
+        </p:spPr>
+        <p:style>
+          <a:lnRef idx="1">
+            <a:schemeClr val="accent1"/>
+          </a:lnRef>
+          <a:fillRef idx="0">
+            <a:schemeClr val="accent1"/>
+          </a:fillRef>
+          <a:effectRef idx="0">
+            <a:schemeClr val="accent1"/>
+          </a:effectRef>
+          <a:fontRef idx="minor">
+            <a:schemeClr val="tx1"/>
+          </a:fontRef>
+        </p:style>
+      </p:cxnSp>
+      <p:cxnSp>
+        <p:nvCxnSpPr>
+          <p:cNvPr id="28" name="Connector: Elbow 27">
+            <a:extLst>
+              <a:ext uri="{FF2B5EF4-FFF2-40B4-BE49-F238E27FC236}">
+                <a16:creationId xmlns:a16="http://schemas.microsoft.com/office/drawing/2014/main" id="{E8DE0B51-684B-4C1B-8443-DCE9E0BFEFE4}"/>
+              </a:ext>
+            </a:extLst>
+          </p:cNvPr>
+          <p:cNvCxnSpPr>
+            <a:cxnSpLocks/>
+            <a:stCxn id="37" idx="2"/>
+            <a:endCxn id="21" idx="0"/>
+          </p:cNvCxnSpPr>
+          <p:nvPr/>
+        </p:nvCxnSpPr>
+        <p:spPr>
+          <a:xfrm rot="16200000" flipH="1">
+            <a:off x="6833752" y="4559908"/>
+            <a:ext cx="1158816" cy="998604"/>
+          </a:xfrm>
+          <a:prstGeom prst="bentConnector3">
+            <a:avLst>
+              <a:gd name="adj1" fmla="val 80432"/>
+            </a:avLst>
+          </a:prstGeom>
+          <a:ln>
+            <a:solidFill>
+              <a:schemeClr val="tx1"/>
+            </a:solidFill>
+            <a:tailEnd type="triangle"/>
+          </a:ln>
+        </p:spPr>
+        <p:style>
+          <a:lnRef idx="1">
+            <a:schemeClr val="accent1"/>
+          </a:lnRef>
+          <a:fillRef idx="0">
+            <a:schemeClr val="accent1"/>
+          </a:fillRef>
+          <a:effectRef idx="0">
+            <a:schemeClr val="accent1"/>
+          </a:effectRef>
+          <a:fontRef idx="minor">
+            <a:schemeClr val="tx1"/>
+          </a:fontRef>
+        </p:style>
+      </p:cxnSp>
+      <p:cxnSp>
+        <p:nvCxnSpPr>
+          <p:cNvPr id="30" name="Straight Arrow Connector 29">
+            <a:extLst>
+              <a:ext uri="{FF2B5EF4-FFF2-40B4-BE49-F238E27FC236}">
+                <a16:creationId xmlns:a16="http://schemas.microsoft.com/office/drawing/2014/main" id="{D6BAFCEC-D94A-4CFE-AAB3-2A45BA89C924}"/>
+              </a:ext>
+            </a:extLst>
+          </p:cNvPr>
+          <p:cNvCxnSpPr>
+            <a:cxnSpLocks/>
+            <a:stCxn id="22" idx="2"/>
+            <a:endCxn id="24" idx="0"/>
+          </p:cNvCxnSpPr>
+          <p:nvPr/>
+        </p:nvCxnSpPr>
+        <p:spPr>
+          <a:xfrm>
+            <a:off x="5672481" y="5338644"/>
+            <a:ext cx="1" cy="301262"/>
+          </a:xfrm>
+          <a:prstGeom prst="straightConnector1">
+            <a:avLst/>
+          </a:prstGeom>
+          <a:ln>
+            <a:solidFill>
+              <a:schemeClr val="tx1"/>
+            </a:solidFill>
+            <a:tailEnd type="triangle"/>
+          </a:ln>
+        </p:spPr>
+        <p:style>
+          <a:lnRef idx="1">
+            <a:schemeClr val="accent1"/>
+          </a:lnRef>
+          <a:fillRef idx="0">
+            <a:schemeClr val="accent1"/>
+          </a:fillRef>
+          <a:effectRef idx="0">
+            <a:schemeClr val="accent1"/>
+          </a:effectRef>
+          <a:fontRef idx="minor">
+            <a:schemeClr val="tx1"/>
+          </a:fontRef>
+        </p:style>
+      </p:cxnSp>
+      <p:cxnSp>
+        <p:nvCxnSpPr>
+          <p:cNvPr id="31" name="Straight Arrow Connector 30">
+            <a:extLst>
+              <a:ext uri="{FF2B5EF4-FFF2-40B4-BE49-F238E27FC236}">
+                <a16:creationId xmlns:a16="http://schemas.microsoft.com/office/drawing/2014/main" id="{E5446635-247B-42F3-8500-2ABA466EFFE4}"/>
+              </a:ext>
+            </a:extLst>
+          </p:cNvPr>
+          <p:cNvCxnSpPr>
+            <a:cxnSpLocks/>
+            <a:stCxn id="23" idx="2"/>
+            <a:endCxn id="25" idx="0"/>
+          </p:cNvCxnSpPr>
+          <p:nvPr/>
+        </p:nvCxnSpPr>
+        <p:spPr>
+          <a:xfrm>
+            <a:off x="6795276" y="5969280"/>
+            <a:ext cx="1298" cy="214329"/>
+          </a:xfrm>
+          <a:prstGeom prst="straightConnector1">
+            <a:avLst/>
+          </a:prstGeom>
+          <a:ln>
+            <a:solidFill>
+              <a:schemeClr val="tx1"/>
+            </a:solidFill>
+            <a:tailEnd type="triangle"/>
+          </a:ln>
+        </p:spPr>
+        <p:style>
+          <a:lnRef idx="1">
+            <a:schemeClr val="accent1"/>
+          </a:lnRef>
+          <a:fillRef idx="0">
+            <a:schemeClr val="accent1"/>
+          </a:fillRef>
+          <a:effectRef idx="0">
+            <a:schemeClr val="accent1"/>
+          </a:effectRef>
+          <a:fontRef idx="minor">
+            <a:schemeClr val="tx1"/>
+          </a:fontRef>
+        </p:style>
+      </p:cxnSp>
+      <p:cxnSp>
+        <p:nvCxnSpPr>
+          <p:cNvPr id="33" name="Connector: Elbow 32">
+            <a:extLst>
+              <a:ext uri="{FF2B5EF4-FFF2-40B4-BE49-F238E27FC236}">
+                <a16:creationId xmlns:a16="http://schemas.microsoft.com/office/drawing/2014/main" id="{55388541-725B-46D1-AFBE-AF15D421FFC4}"/>
+              </a:ext>
+            </a:extLst>
+          </p:cNvPr>
+          <p:cNvCxnSpPr>
+            <a:cxnSpLocks/>
+            <a:stCxn id="11" idx="2"/>
+            <a:endCxn id="13" idx="0"/>
+          </p:cNvCxnSpPr>
+          <p:nvPr/>
+        </p:nvCxnSpPr>
+        <p:spPr>
+          <a:xfrm rot="16200000" flipH="1">
+            <a:off x="6511923" y="3809523"/>
+            <a:ext cx="566705" cy="1"/>
+          </a:xfrm>
+          <a:prstGeom prst="bentConnector3">
+            <a:avLst>
+              <a:gd name="adj1" fmla="val 50000"/>
+            </a:avLst>
+          </a:prstGeom>
+          <a:ln>
+            <a:solidFill>
+              <a:schemeClr val="tx1"/>
+            </a:solidFill>
+            <a:tailEnd type="triangle"/>
+          </a:ln>
+        </p:spPr>
+        <p:style>
+          <a:lnRef idx="1">
+            <a:schemeClr val="accent1"/>
+          </a:lnRef>
+          <a:fillRef idx="0">
+            <a:schemeClr val="accent1"/>
+          </a:fillRef>
+          <a:effectRef idx="0">
+            <a:schemeClr val="accent1"/>
+          </a:effectRef>
+          <a:fontRef idx="minor">
+            <a:schemeClr val="tx1"/>
+          </a:fontRef>
+        </p:style>
+      </p:cxnSp>
+      <p:cxnSp>
+        <p:nvCxnSpPr>
+          <p:cNvPr id="34" name="Straight Arrow Connector 33">
+            <a:extLst>
+              <a:ext uri="{FF2B5EF4-FFF2-40B4-BE49-F238E27FC236}">
+                <a16:creationId xmlns:a16="http://schemas.microsoft.com/office/drawing/2014/main" id="{8CE768BA-7612-4F08-8CFF-FB4EC9EE46FA}"/>
+              </a:ext>
+            </a:extLst>
+          </p:cNvPr>
+          <p:cNvCxnSpPr>
+            <a:cxnSpLocks/>
+          </p:cNvCxnSpPr>
+          <p:nvPr/>
+        </p:nvCxnSpPr>
+        <p:spPr>
+          <a:xfrm>
+            <a:off x="5414481" y="3531606"/>
+            <a:ext cx="0" cy="1476376"/>
+          </a:xfrm>
+          <a:prstGeom prst="straightConnector1">
+            <a:avLst/>
+          </a:prstGeom>
+          <a:ln>
+            <a:solidFill>
+              <a:schemeClr val="tx1"/>
+            </a:solidFill>
+            <a:tailEnd type="triangle"/>
+          </a:ln>
+        </p:spPr>
+        <p:style>
+          <a:lnRef idx="1">
+            <a:schemeClr val="accent1"/>
+          </a:lnRef>
+          <a:fillRef idx="0">
+            <a:schemeClr val="accent1"/>
+          </a:fillRef>
+          <a:effectRef idx="0">
+            <a:schemeClr val="accent1"/>
+          </a:effectRef>
+          <a:fontRef idx="minor">
+            <a:schemeClr val="tx1"/>
+          </a:fontRef>
+        </p:style>
+      </p:cxnSp>
+      <p:sp>
+        <p:nvSpPr>
+          <p:cNvPr id="35" name="Rectangle 34">
+            <a:extLst>
+              <a:ext uri="{FF2B5EF4-FFF2-40B4-BE49-F238E27FC236}">
+                <a16:creationId xmlns:a16="http://schemas.microsoft.com/office/drawing/2014/main" id="{F6EA8998-94A1-4E22-9A11-A645350E936D}"/>
+              </a:ext>
+            </a:extLst>
+          </p:cNvPr>
+          <p:cNvSpPr/>
+          <p:nvPr/>
+        </p:nvSpPr>
+        <p:spPr>
+          <a:xfrm>
+            <a:off x="6347908" y="4333558"/>
+            <a:ext cx="217809" cy="146244"/>
+          </a:xfrm>
+          <a:prstGeom prst="rect">
+            <a:avLst/>
+          </a:prstGeom>
+          <a:noFill/>
+          <a:ln>
+            <a:noFill/>
+          </a:ln>
+        </p:spPr>
+        <p:style>
+          <a:lnRef idx="2">
+            <a:schemeClr val="accent1">
+              <a:shade val="50000"/>
+            </a:schemeClr>
+          </a:lnRef>
+          <a:fillRef idx="1">
+            <a:schemeClr val="accent1"/>
+          </a:fillRef>
+          <a:effectRef idx="0">
+            <a:schemeClr val="accent1"/>
+          </a:effectRef>
+          <a:fontRef idx="minor">
+            <a:schemeClr val="lt1"/>
+          </a:fontRef>
+        </p:style>
+        <p:txBody>
+          <a:bodyPr rtlCol="0" anchor="ctr"/>
+          <a:lstStyle/>
+          <a:p>
+            <a:pPr algn="ctr"/>
+            <a:endParaRPr lang="en-US"/>
+          </a:p>
+        </p:txBody>
+      </p:sp>
+      <p:sp>
+        <p:nvSpPr>
+          <p:cNvPr id="36" name="Rectangle 35">
+            <a:extLst>
+              <a:ext uri="{FF2B5EF4-FFF2-40B4-BE49-F238E27FC236}">
+                <a16:creationId xmlns:a16="http://schemas.microsoft.com/office/drawing/2014/main" id="{4E704BB5-E847-4E7D-8EEE-5479AFCF0839}"/>
+              </a:ext>
+            </a:extLst>
+          </p:cNvPr>
+          <p:cNvSpPr/>
+          <p:nvPr/>
+        </p:nvSpPr>
+        <p:spPr>
+          <a:xfrm>
+            <a:off x="6575507" y="4333558"/>
+            <a:ext cx="217809" cy="146244"/>
+          </a:xfrm>
+          <a:prstGeom prst="rect">
+            <a:avLst/>
+          </a:prstGeom>
+          <a:noFill/>
+          <a:ln>
+            <a:noFill/>
+          </a:ln>
+        </p:spPr>
+        <p:style>
+          <a:lnRef idx="2">
+            <a:schemeClr val="accent1">
+              <a:shade val="50000"/>
+            </a:schemeClr>
+          </a:lnRef>
+          <a:fillRef idx="1">
+            <a:schemeClr val="accent1"/>
+          </a:fillRef>
+          <a:effectRef idx="0">
+            <a:schemeClr val="accent1"/>
+          </a:effectRef>
+          <a:fontRef idx="minor">
+            <a:schemeClr val="lt1"/>
+          </a:fontRef>
+        </p:style>
+        <p:txBody>
+          <a:bodyPr rtlCol="0" anchor="ctr"/>
+          <a:lstStyle/>
+          <a:p>
+            <a:pPr algn="ctr"/>
+            <a:endParaRPr lang="en-US"/>
+          </a:p>
+        </p:txBody>
+      </p:sp>
+      <p:sp>
+        <p:nvSpPr>
+          <p:cNvPr id="37" name="Rectangle 36">
+            <a:extLst>
+              <a:ext uri="{FF2B5EF4-FFF2-40B4-BE49-F238E27FC236}">
+                <a16:creationId xmlns:a16="http://schemas.microsoft.com/office/drawing/2014/main" id="{C25C6EF9-450F-4D1F-90F1-72977511C546}"/>
+              </a:ext>
+            </a:extLst>
+          </p:cNvPr>
+          <p:cNvSpPr/>
+          <p:nvPr/>
+        </p:nvSpPr>
+        <p:spPr>
+          <a:xfrm>
+            <a:off x="6804953" y="4333558"/>
+            <a:ext cx="217809" cy="146244"/>
+          </a:xfrm>
+          <a:prstGeom prst="rect">
+            <a:avLst/>
+          </a:prstGeom>
+          <a:noFill/>
+          <a:ln>
+            <a:noFill/>
+          </a:ln>
+        </p:spPr>
+        <p:style>
+          <a:lnRef idx="2">
+            <a:schemeClr val="accent1">
+              <a:shade val="50000"/>
+            </a:schemeClr>
+          </a:lnRef>
+          <a:fillRef idx="1">
+            <a:schemeClr val="accent1"/>
+          </a:fillRef>
+          <a:effectRef idx="0">
+            <a:schemeClr val="accent1"/>
+          </a:effectRef>
+          <a:fontRef idx="minor">
+            <a:schemeClr val="lt1"/>
+          </a:fontRef>
+        </p:style>
+        <p:txBody>
+          <a:bodyPr rtlCol="0" anchor="ctr"/>
+          <a:lstStyle/>
+          <a:p>
+            <a:pPr algn="ctr"/>
+            <a:endParaRPr lang="en-US"/>
+          </a:p>
+        </p:txBody>
+      </p:sp>
+      <p:sp>
+        <p:nvSpPr>
+          <p:cNvPr id="38" name="Rectangle 37">
+            <a:extLst>
+              <a:ext uri="{FF2B5EF4-FFF2-40B4-BE49-F238E27FC236}">
+                <a16:creationId xmlns:a16="http://schemas.microsoft.com/office/drawing/2014/main" id="{6FA37058-B161-448E-A035-3727B214B8A1}"/>
+              </a:ext>
+            </a:extLst>
+          </p:cNvPr>
+          <p:cNvSpPr/>
+          <p:nvPr/>
+        </p:nvSpPr>
+        <p:spPr>
+          <a:xfrm>
+            <a:off x="7031834" y="4333558"/>
+            <a:ext cx="217809" cy="146244"/>
+          </a:xfrm>
+          <a:prstGeom prst="rect">
+            <a:avLst/>
+          </a:prstGeom>
+          <a:noFill/>
+          <a:ln>
+            <a:noFill/>
+          </a:ln>
+        </p:spPr>
+        <p:style>
+          <a:lnRef idx="2">
+            <a:schemeClr val="accent1">
+              <a:shade val="50000"/>
+            </a:schemeClr>
+          </a:lnRef>
+          <a:fillRef idx="1">
+            <a:schemeClr val="accent1"/>
+          </a:fillRef>
+          <a:effectRef idx="0">
+            <a:schemeClr val="accent1"/>
+          </a:effectRef>
+          <a:fontRef idx="minor">
+            <a:schemeClr val="lt1"/>
+          </a:fontRef>
+        </p:style>
+        <p:txBody>
+          <a:bodyPr rtlCol="0" anchor="ctr"/>
+          <a:lstStyle/>
+          <a:p>
+            <a:pPr algn="ctr"/>
+            <a:endParaRPr lang="en-US"/>
+          </a:p>
+        </p:txBody>
+      </p:sp>
+      <p:cxnSp>
+        <p:nvCxnSpPr>
+          <p:cNvPr id="39" name="Straight Arrow Connector 38">
+            <a:extLst>
+              <a:ext uri="{FF2B5EF4-FFF2-40B4-BE49-F238E27FC236}">
+                <a16:creationId xmlns:a16="http://schemas.microsoft.com/office/drawing/2014/main" id="{F825BFFD-6B52-40C3-A723-BA03A1B2F99E}"/>
+              </a:ext>
+            </a:extLst>
+          </p:cNvPr>
+          <p:cNvCxnSpPr>
+            <a:cxnSpLocks/>
+            <a:stCxn id="18" idx="3"/>
+            <a:endCxn id="24" idx="1"/>
+          </p:cNvCxnSpPr>
+          <p:nvPr/>
+        </p:nvCxnSpPr>
+        <p:spPr>
+          <a:xfrm>
+            <a:off x="4105457" y="5805237"/>
+            <a:ext cx="1111823" cy="0"/>
+          </a:xfrm>
+          <a:prstGeom prst="straightConnector1">
+            <a:avLst/>
+          </a:prstGeom>
+          <a:ln>
+            <a:solidFill>
+              <a:schemeClr val="tx1"/>
+            </a:solidFill>
+            <a:tailEnd type="triangle"/>
+          </a:ln>
+        </p:spPr>
+        <p:style>
+          <a:lnRef idx="1">
+            <a:schemeClr val="accent1"/>
+          </a:lnRef>
+          <a:fillRef idx="0">
+            <a:schemeClr val="accent1"/>
+          </a:fillRef>
+          <a:effectRef idx="0">
+            <a:schemeClr val="accent1"/>
+          </a:effectRef>
+          <a:fontRef idx="minor">
+            <a:schemeClr val="tx1"/>
+          </a:fontRef>
+        </p:style>
+      </p:cxnSp>
+      <p:cxnSp>
+        <p:nvCxnSpPr>
+          <p:cNvPr id="40" name="Connector: Elbow 39">
+            <a:extLst>
+              <a:ext uri="{FF2B5EF4-FFF2-40B4-BE49-F238E27FC236}">
+                <a16:creationId xmlns:a16="http://schemas.microsoft.com/office/drawing/2014/main" id="{A8B1FF8B-7ED4-4FDF-B094-AE188A22FC48}"/>
+              </a:ext>
+            </a:extLst>
+          </p:cNvPr>
+          <p:cNvCxnSpPr>
+            <a:cxnSpLocks/>
+            <a:stCxn id="18" idx="0"/>
+            <a:endCxn id="42" idx="0"/>
+          </p:cNvCxnSpPr>
+          <p:nvPr/>
+        </p:nvCxnSpPr>
+        <p:spPr>
+          <a:xfrm rot="16200000" flipH="1">
+            <a:off x="5658337" y="3643896"/>
+            <a:ext cx="30322" cy="3972674"/>
+          </a:xfrm>
+          <a:prstGeom prst="bentConnector3">
+            <a:avLst>
+              <a:gd name="adj1" fmla="val -418838"/>
+            </a:avLst>
+          </a:prstGeom>
+          <a:ln>
+            <a:solidFill>
+              <a:schemeClr val="tx1"/>
+            </a:solidFill>
+            <a:tailEnd type="triangle"/>
+          </a:ln>
+        </p:spPr>
+        <p:style>
+          <a:lnRef idx="1">
+            <a:schemeClr val="accent1"/>
+          </a:lnRef>
+          <a:fillRef idx="0">
+            <a:schemeClr val="accent1"/>
+          </a:fillRef>
+          <a:effectRef idx="0">
+            <a:schemeClr val="accent1"/>
+          </a:effectRef>
+          <a:fontRef idx="minor">
+            <a:schemeClr val="tx1"/>
+          </a:fontRef>
+        </p:style>
+      </p:cxnSp>
+      <p:sp>
+        <p:nvSpPr>
+          <p:cNvPr id="41" name="Isosceles Triangle 40">
+            <a:extLst>
+              <a:ext uri="{FF2B5EF4-FFF2-40B4-BE49-F238E27FC236}">
+                <a16:creationId xmlns:a16="http://schemas.microsoft.com/office/drawing/2014/main" id="{79603E0D-5757-472B-A52C-C7D30C457A0F}"/>
+              </a:ext>
+            </a:extLst>
+          </p:cNvPr>
+          <p:cNvSpPr/>
+          <p:nvPr/>
+        </p:nvSpPr>
+        <p:spPr>
+          <a:xfrm rot="5400000">
+            <a:off x="3411445" y="3425069"/>
+            <a:ext cx="1664026" cy="102074"/>
+          </a:xfrm>
+          <a:prstGeom prst="triangle">
+            <a:avLst>
+              <a:gd name="adj" fmla="val 47544"/>
+            </a:avLst>
+          </a:prstGeom>
+          <a:solidFill>
+            <a:schemeClr val="tx1">
+              <a:lumMod val="20000"/>
+              <a:lumOff val="80000"/>
+            </a:schemeClr>
+          </a:solidFill>
+          <a:ln w="9525">
+            <a:solidFill>
+              <a:schemeClr val="tx1"/>
+            </a:solidFill>
+          </a:ln>
+        </p:spPr>
+        <p:style>
+          <a:lnRef idx="2">
+            <a:schemeClr val="accent1">
+              <a:shade val="50000"/>
+            </a:schemeClr>
+          </a:lnRef>
+          <a:fillRef idx="1">
+            <a:schemeClr val="accent1"/>
+          </a:fillRef>
+          <a:effectRef idx="0">
+            <a:schemeClr val="accent1"/>
+          </a:effectRef>
+          <a:fontRef idx="minor">
+            <a:schemeClr val="lt1"/>
+          </a:fontRef>
+        </p:style>
+        <p:txBody>
+          <a:bodyPr rtlCol="0" anchor="ctr"/>
+          <a:lstStyle/>
+          <a:p>
+            <a:pPr algn="ctr"/>
+            <a:endParaRPr lang="en-US"/>
+          </a:p>
+        </p:txBody>
+      </p:sp>
+      <p:sp>
+        <p:nvSpPr>
+          <p:cNvPr id="42" name="Rectangle 41">
+            <a:extLst>
+              <a:ext uri="{FF2B5EF4-FFF2-40B4-BE49-F238E27FC236}">
+                <a16:creationId xmlns:a16="http://schemas.microsoft.com/office/drawing/2014/main" id="{266E946E-D752-41C4-9A2F-371E34073EF0}"/>
+              </a:ext>
+            </a:extLst>
+          </p:cNvPr>
+          <p:cNvSpPr/>
+          <p:nvPr/>
+        </p:nvSpPr>
+        <p:spPr>
+          <a:xfrm>
+            <a:off x="7550930" y="5645394"/>
+            <a:ext cx="217809" cy="146244"/>
+          </a:xfrm>
+          <a:prstGeom prst="rect">
+            <a:avLst/>
+          </a:prstGeom>
+          <a:noFill/>
+          <a:ln>
+            <a:noFill/>
+          </a:ln>
+        </p:spPr>
+        <p:style>
+          <a:lnRef idx="2">
+            <a:schemeClr val="accent1">
+              <a:shade val="50000"/>
+            </a:schemeClr>
+          </a:lnRef>
+          <a:fillRef idx="1">
+            <a:schemeClr val="accent1"/>
+          </a:fillRef>
+          <a:effectRef idx="0">
+            <a:schemeClr val="accent1"/>
+          </a:effectRef>
+          <a:fontRef idx="minor">
+            <a:schemeClr val="lt1"/>
+          </a:fontRef>
+        </p:style>
+        <p:txBody>
+          <a:bodyPr rtlCol="0" anchor="ctr"/>
+          <a:lstStyle/>
+          <a:p>
+            <a:pPr algn="ctr"/>
+            <a:endParaRPr lang="en-US"/>
+          </a:p>
+        </p:txBody>
+      </p:sp>
+      <p:cxnSp>
+        <p:nvCxnSpPr>
+          <p:cNvPr id="43" name="Straight Arrow Connector 42">
+            <a:extLst>
+              <a:ext uri="{FF2B5EF4-FFF2-40B4-BE49-F238E27FC236}">
+                <a16:creationId xmlns:a16="http://schemas.microsoft.com/office/drawing/2014/main" id="{582526A7-E79F-45AE-8FD5-57C3DF40ADBA}"/>
+              </a:ext>
+            </a:extLst>
+          </p:cNvPr>
+          <p:cNvCxnSpPr>
+            <a:cxnSpLocks/>
+            <a:stCxn id="25" idx="3"/>
+          </p:cNvCxnSpPr>
+          <p:nvPr/>
+        </p:nvCxnSpPr>
+        <p:spPr>
+          <a:xfrm>
+            <a:off x="7251775" y="6348940"/>
+            <a:ext cx="1746758" cy="0"/>
+          </a:xfrm>
+          <a:prstGeom prst="straightConnector1">
+            <a:avLst/>
+          </a:prstGeom>
+          <a:ln>
+            <a:solidFill>
+              <a:schemeClr val="tx1"/>
+            </a:solidFill>
+            <a:tailEnd type="triangle"/>
+          </a:ln>
+        </p:spPr>
+        <p:style>
+          <a:lnRef idx="1">
+            <a:schemeClr val="accent1"/>
+          </a:lnRef>
+          <a:fillRef idx="0">
+            <a:schemeClr val="accent1"/>
+          </a:fillRef>
+          <a:effectRef idx="0">
+            <a:schemeClr val="accent1"/>
+          </a:effectRef>
+          <a:fontRef idx="minor">
+            <a:schemeClr val="tx1"/>
+          </a:fontRef>
+        </p:style>
+      </p:cxnSp>
+      <p:cxnSp>
+        <p:nvCxnSpPr>
+          <p:cNvPr id="44" name="Straight Arrow Connector 43">
+            <a:extLst>
+              <a:ext uri="{FF2B5EF4-FFF2-40B4-BE49-F238E27FC236}">
+                <a16:creationId xmlns:a16="http://schemas.microsoft.com/office/drawing/2014/main" id="{6F66CE5C-EF13-4BDD-B125-EEC2EFD2016F}"/>
+              </a:ext>
+            </a:extLst>
+          </p:cNvPr>
+          <p:cNvCxnSpPr>
+            <a:cxnSpLocks/>
+            <a:stCxn id="21" idx="3"/>
+          </p:cNvCxnSpPr>
+          <p:nvPr/>
+        </p:nvCxnSpPr>
+        <p:spPr>
+          <a:xfrm>
+            <a:off x="8367663" y="5803949"/>
+            <a:ext cx="630870" cy="0"/>
+          </a:xfrm>
+          <a:prstGeom prst="straightConnector1">
+            <a:avLst/>
+          </a:prstGeom>
+          <a:ln>
+            <a:solidFill>
+              <a:schemeClr val="tx1"/>
+            </a:solidFill>
+            <a:tailEnd type="triangle"/>
+          </a:ln>
+        </p:spPr>
+        <p:style>
+          <a:lnRef idx="1">
+            <a:schemeClr val="accent1"/>
+          </a:lnRef>
+          <a:fillRef idx="0">
+            <a:schemeClr val="accent1"/>
+          </a:fillRef>
+          <a:effectRef idx="0">
+            <a:schemeClr val="accent1"/>
+          </a:effectRef>
+          <a:fontRef idx="minor">
+            <a:schemeClr val="tx1"/>
+          </a:fontRef>
+        </p:style>
+      </p:cxnSp>
+      <p:cxnSp>
+        <p:nvCxnSpPr>
+          <p:cNvPr id="45" name="Straight Arrow Connector 44">
+            <a:extLst>
+              <a:ext uri="{FF2B5EF4-FFF2-40B4-BE49-F238E27FC236}">
+                <a16:creationId xmlns:a16="http://schemas.microsoft.com/office/drawing/2014/main" id="{A3A4FF8C-7D8D-427C-A499-9978A2A1B661}"/>
+              </a:ext>
+            </a:extLst>
+          </p:cNvPr>
+          <p:cNvCxnSpPr>
+            <a:cxnSpLocks/>
+            <a:stCxn id="20" idx="3"/>
+          </p:cNvCxnSpPr>
+          <p:nvPr/>
+        </p:nvCxnSpPr>
+        <p:spPr>
+          <a:xfrm>
+            <a:off x="8367663" y="5173313"/>
+            <a:ext cx="630870" cy="0"/>
+          </a:xfrm>
+          <a:prstGeom prst="straightConnector1">
+            <a:avLst/>
+          </a:prstGeom>
+          <a:ln>
+            <a:solidFill>
+              <a:schemeClr val="tx1"/>
+            </a:solidFill>
+            <a:tailEnd type="triangle"/>
+          </a:ln>
+        </p:spPr>
+        <p:style>
+          <a:lnRef idx="1">
+            <a:schemeClr val="accent1"/>
+          </a:lnRef>
+          <a:fillRef idx="0">
+            <a:schemeClr val="accent1"/>
+          </a:fillRef>
+          <a:effectRef idx="0">
+            <a:schemeClr val="accent1"/>
+          </a:effectRef>
+          <a:fontRef idx="minor">
+            <a:schemeClr val="tx1"/>
+          </a:fontRef>
+        </p:style>
+      </p:cxnSp>
+      <p:cxnSp>
+        <p:nvCxnSpPr>
+          <p:cNvPr id="46" name="Straight Arrow Connector 45">
+            <a:extLst>
+              <a:ext uri="{FF2B5EF4-FFF2-40B4-BE49-F238E27FC236}">
+                <a16:creationId xmlns:a16="http://schemas.microsoft.com/office/drawing/2014/main" id="{64EFC8E9-6BB7-4091-8317-68B43A344ADD}"/>
+              </a:ext>
+            </a:extLst>
+          </p:cNvPr>
+          <p:cNvCxnSpPr>
+            <a:cxnSpLocks/>
+          </p:cNvCxnSpPr>
+          <p:nvPr/>
+        </p:nvCxnSpPr>
+        <p:spPr>
+          <a:xfrm>
+            <a:off x="8125154" y="3523986"/>
+            <a:ext cx="0" cy="1476376"/>
+          </a:xfrm>
+          <a:prstGeom prst="straightConnector1">
+            <a:avLst/>
+          </a:prstGeom>
+          <a:ln>
+            <a:solidFill>
+              <a:schemeClr val="tx1"/>
+            </a:solidFill>
+            <a:tailEnd type="triangle"/>
+          </a:ln>
+        </p:spPr>
+        <p:style>
+          <a:lnRef idx="1">
+            <a:schemeClr val="accent1"/>
+          </a:lnRef>
+          <a:fillRef idx="0">
+            <a:schemeClr val="accent1"/>
+          </a:fillRef>
+          <a:effectRef idx="0">
+            <a:schemeClr val="accent1"/>
+          </a:effectRef>
+          <a:fontRef idx="minor">
+            <a:schemeClr val="tx1"/>
+          </a:fontRef>
+        </p:style>
+      </p:cxnSp>
+      <p:sp>
+        <p:nvSpPr>
+          <p:cNvPr id="47" name="Rectangle 46">
+            <a:extLst>
+              <a:ext uri="{FF2B5EF4-FFF2-40B4-BE49-F238E27FC236}">
+                <a16:creationId xmlns:a16="http://schemas.microsoft.com/office/drawing/2014/main" id="{1BC9FEB6-29B1-4608-9F1C-29FE7996CB7A}"/>
+              </a:ext>
+            </a:extLst>
+          </p:cNvPr>
+          <p:cNvSpPr/>
+          <p:nvPr/>
+        </p:nvSpPr>
+        <p:spPr>
+          <a:xfrm>
+            <a:off x="3270836" y="4130119"/>
+            <a:ext cx="836593" cy="380329"/>
+          </a:xfrm>
+          <a:prstGeom prst="rect">
+            <a:avLst/>
+          </a:prstGeom>
+          <a:pattFill prst="wdUpDiag">
+            <a:fgClr>
+              <a:schemeClr val="tx2">
+                <a:lumMod val="20000"/>
+                <a:lumOff val="80000"/>
+              </a:schemeClr>
+            </a:fgClr>
+            <a:bgClr>
+              <a:schemeClr val="bg1"/>
+            </a:bgClr>
+          </a:pattFill>
+          <a:ln w="9525">
+            <a:solidFill>
+              <a:schemeClr val="tx1"/>
+            </a:solidFill>
+          </a:ln>
+        </p:spPr>
+        <p:style>
+          <a:lnRef idx="2">
+            <a:schemeClr val="accent1">
+              <a:shade val="50000"/>
+            </a:schemeClr>
+          </a:lnRef>
+          <a:fillRef idx="1">
+            <a:schemeClr val="accent1"/>
+          </a:fillRef>
+          <a:effectRef idx="0">
+            <a:schemeClr val="accent1"/>
+          </a:effectRef>
+          <a:fontRef idx="minor">
+            <a:schemeClr val="lt1"/>
+          </a:fontRef>
+        </p:style>
+        <p:txBody>
+          <a:bodyPr rtlCol="0" anchor="ctr"/>
+          <a:lstStyle/>
+          <a:p>
+            <a:pPr algn="ctr"/>
+            <a:r>
+              <a:rPr lang="en-US" sz="700" b="1" dirty="0">
+                <a:solidFill>
+                  <a:schemeClr val="tx1"/>
+                </a:solidFill>
+              </a:rPr>
+              <a:t>Time range</a:t>
+            </a:r>
+          </a:p>
+        </p:txBody>
+      </p:sp>
+      <p:grpSp>
+        <p:nvGrpSpPr>
+          <p:cNvPr id="53" name="Group 52">
+            <a:extLst>
+              <a:ext uri="{FF2B5EF4-FFF2-40B4-BE49-F238E27FC236}">
+                <a16:creationId xmlns:a16="http://schemas.microsoft.com/office/drawing/2014/main" id="{86248C88-A0C9-434E-B218-0C96F80C69E1}"/>
+              </a:ext>
+            </a:extLst>
+          </p:cNvPr>
+          <p:cNvGrpSpPr/>
+          <p:nvPr/>
+        </p:nvGrpSpPr>
+        <p:grpSpPr>
+          <a:xfrm>
+            <a:off x="5563564" y="5394507"/>
+            <a:ext cx="212406" cy="177839"/>
+            <a:chOff x="6441612" y="2438619"/>
+            <a:chExt cx="212406" cy="177839"/>
+          </a:xfrm>
+        </p:grpSpPr>
+        <p:cxnSp>
+          <p:nvCxnSpPr>
+            <p:cNvPr id="54" name="Straight Connector 53">
+              <a:extLst>
+                <a:ext uri="{FF2B5EF4-FFF2-40B4-BE49-F238E27FC236}">
+                  <a16:creationId xmlns:a16="http://schemas.microsoft.com/office/drawing/2014/main" id="{5D087983-FBA3-44EF-8438-11C96B57377A}"/>
+                </a:ext>
+              </a:extLst>
+            </p:cNvPr>
+            <p:cNvCxnSpPr>
+              <a:cxnSpLocks/>
+            </p:cNvCxnSpPr>
+            <p:nvPr/>
+          </p:nvCxnSpPr>
+          <p:spPr>
+            <a:xfrm>
+              <a:off x="6443003" y="2533114"/>
+              <a:ext cx="211015" cy="0"/>
+            </a:xfrm>
+            <a:prstGeom prst="line">
+              <a:avLst/>
+            </a:prstGeom>
+            <a:ln>
+              <a:solidFill>
+                <a:schemeClr val="tx1"/>
+              </a:solidFill>
+            </a:ln>
+          </p:spPr>
+          <p:style>
+            <a:lnRef idx="1">
+              <a:schemeClr val="accent1"/>
+            </a:lnRef>
+            <a:fillRef idx="0">
+              <a:schemeClr val="accent1"/>
+            </a:fillRef>
+            <a:effectRef idx="0">
+              <a:schemeClr val="accent1"/>
+            </a:effectRef>
+            <a:fontRef idx="minor">
+              <a:schemeClr val="tx1"/>
+            </a:fontRef>
+          </p:style>
+        </p:cxnSp>
+        <p:sp>
+          <p:nvSpPr>
+            <p:cNvPr id="55" name="Oval 54">
+              <a:extLst>
+                <a:ext uri="{FF2B5EF4-FFF2-40B4-BE49-F238E27FC236}">
+                  <a16:creationId xmlns:a16="http://schemas.microsoft.com/office/drawing/2014/main" id="{08383CE8-1F06-4DC2-A0A4-8903B737B942}"/>
+                </a:ext>
+              </a:extLst>
+            </p:cNvPr>
+            <p:cNvSpPr/>
+            <p:nvPr/>
+          </p:nvSpPr>
+          <p:spPr>
+            <a:xfrm>
+              <a:off x="6495297" y="2479901"/>
+              <a:ext cx="106425" cy="106425"/>
+            </a:xfrm>
+            <a:prstGeom prst="ellipse">
+              <a:avLst/>
+            </a:prstGeom>
+            <a:solidFill>
+              <a:schemeClr val="bg1"/>
+            </a:solidFill>
+            <a:ln w="9525">
+              <a:solidFill>
+                <a:schemeClr val="tx1"/>
+              </a:solidFill>
+            </a:ln>
+          </p:spPr>
+          <p:style>
+            <a:lnRef idx="2">
+              <a:schemeClr val="accent1">
+                <a:shade val="50000"/>
+              </a:schemeClr>
+            </a:lnRef>
+            <a:fillRef idx="1">
+              <a:schemeClr val="accent1"/>
+            </a:fillRef>
+            <a:effectRef idx="0">
+              <a:schemeClr val="accent1"/>
+            </a:effectRef>
+            <a:fontRef idx="minor">
+              <a:schemeClr val="lt1"/>
+            </a:fontRef>
+          </p:style>
+          <p:txBody>
+            <a:bodyPr rtlCol="0" anchor="ctr"/>
+            <a:lstStyle/>
+            <a:p>
+              <a:pPr algn="ctr"/>
+              <a:endParaRPr lang="en-US"/>
+            </a:p>
+          </p:txBody>
+        </p:sp>
+        <p:sp>
+          <p:nvSpPr>
+            <p:cNvPr id="56" name="Rectangle 55">
+              <a:extLst>
+                <a:ext uri="{FF2B5EF4-FFF2-40B4-BE49-F238E27FC236}">
+                  <a16:creationId xmlns:a16="http://schemas.microsoft.com/office/drawing/2014/main" id="{3DA8F936-4254-43F0-8F8B-929056C641CF}"/>
+                </a:ext>
+              </a:extLst>
+            </p:cNvPr>
+            <p:cNvSpPr/>
+            <p:nvPr/>
+          </p:nvSpPr>
+          <p:spPr>
+            <a:xfrm>
+              <a:off x="6441612" y="2550328"/>
+              <a:ext cx="211015" cy="45719"/>
+            </a:xfrm>
+            <a:prstGeom prst="rect">
+              <a:avLst/>
+            </a:prstGeom>
+            <a:solidFill>
+              <a:schemeClr val="bg1"/>
+            </a:solidFill>
+            <a:ln>
+              <a:solidFill>
+                <a:schemeClr val="bg1"/>
+              </a:solidFill>
+            </a:ln>
+          </p:spPr>
+          <p:style>
+            <a:lnRef idx="2">
+              <a:schemeClr val="accent1">
+                <a:shade val="50000"/>
+              </a:schemeClr>
+            </a:lnRef>
+            <a:fillRef idx="1">
+              <a:schemeClr val="accent1"/>
+            </a:fillRef>
+            <a:effectRef idx="0">
+              <a:schemeClr val="accent1"/>
+            </a:effectRef>
+            <a:fontRef idx="minor">
+              <a:schemeClr val="lt1"/>
+            </a:fontRef>
+          </p:style>
+          <p:txBody>
+            <a:bodyPr rtlCol="0" anchor="ctr"/>
+            <a:lstStyle/>
+            <a:p>
+              <a:pPr algn="ctr"/>
+              <a:endParaRPr lang="en-US"/>
+            </a:p>
+          </p:txBody>
+        </p:sp>
+        <p:cxnSp>
+          <p:nvCxnSpPr>
+            <p:cNvPr id="57" name="Straight Connector 56">
+              <a:extLst>
+                <a:ext uri="{FF2B5EF4-FFF2-40B4-BE49-F238E27FC236}">
+                  <a16:creationId xmlns:a16="http://schemas.microsoft.com/office/drawing/2014/main" id="{F09D4043-04CE-4121-A338-01FA4307EED6}"/>
+                </a:ext>
+              </a:extLst>
+            </p:cNvPr>
+            <p:cNvCxnSpPr>
+              <a:cxnSpLocks/>
+            </p:cNvCxnSpPr>
+            <p:nvPr/>
+          </p:nvCxnSpPr>
+          <p:spPr>
+            <a:xfrm>
+              <a:off x="6551624" y="2438619"/>
+              <a:ext cx="0" cy="177839"/>
+            </a:xfrm>
+            <a:prstGeom prst="line">
+              <a:avLst/>
+            </a:prstGeom>
+            <a:ln>
+              <a:solidFill>
+                <a:schemeClr val="tx1"/>
+              </a:solidFill>
+            </a:ln>
+          </p:spPr>
+          <p:style>
+            <a:lnRef idx="1">
+              <a:schemeClr val="accent1"/>
+            </a:lnRef>
+            <a:fillRef idx="0">
+              <a:schemeClr val="accent1"/>
+            </a:fillRef>
+            <a:effectRef idx="0">
+              <a:schemeClr val="accent1"/>
+            </a:effectRef>
+            <a:fontRef idx="minor">
+              <a:schemeClr val="tx1"/>
+            </a:fontRef>
+          </p:style>
+        </p:cxnSp>
+      </p:grpSp>
+      <p:sp>
+        <p:nvSpPr>
+          <p:cNvPr id="58" name="TextBox 57">
+            <a:extLst>
+              <a:ext uri="{FF2B5EF4-FFF2-40B4-BE49-F238E27FC236}">
+                <a16:creationId xmlns:a16="http://schemas.microsoft.com/office/drawing/2014/main" id="{E77847FD-2D09-4EAA-971B-324D0ECCABE0}"/>
+              </a:ext>
+            </a:extLst>
+          </p:cNvPr>
+          <p:cNvSpPr txBox="1"/>
+          <p:nvPr/>
+        </p:nvSpPr>
+        <p:spPr>
+          <a:xfrm rot="16200000">
+            <a:off x="8182636" y="5420905"/>
+            <a:ext cx="1868070" cy="215444"/>
+          </a:xfrm>
+          <a:prstGeom prst="rect">
+            <a:avLst/>
+          </a:prstGeom>
+          <a:noFill/>
+        </p:spPr>
+        <p:txBody>
+          <a:bodyPr wrap="square" rtlCol="0">
+            <a:spAutoFit/>
+          </a:bodyPr>
+          <a:lstStyle/>
+          <a:p>
+            <a:r>
+              <a:rPr lang="en-US" sz="800" i="1" dirty="0"/>
+              <a:t>Electricity and gas demand</a:t>
+            </a:r>
+          </a:p>
+        </p:txBody>
+      </p:sp>
+      <p:sp>
+        <p:nvSpPr>
+          <p:cNvPr id="60" name="TextBox 59">
+            <a:extLst>
+              <a:ext uri="{FF2B5EF4-FFF2-40B4-BE49-F238E27FC236}">
+                <a16:creationId xmlns:a16="http://schemas.microsoft.com/office/drawing/2014/main" id="{50E4A384-FD6F-419C-BBB6-2DDC1AB937DE}"/>
+              </a:ext>
+            </a:extLst>
+          </p:cNvPr>
+          <p:cNvSpPr txBox="1"/>
+          <p:nvPr/>
+        </p:nvSpPr>
+        <p:spPr>
+          <a:xfrm>
+            <a:off x="333633" y="357380"/>
+            <a:ext cx="12362498" cy="1171283"/>
+          </a:xfrm>
+          <a:prstGeom prst="rect">
+            <a:avLst/>
+          </a:prstGeom>
+          <a:noFill/>
+        </p:spPr>
+        <p:txBody>
+          <a:bodyPr wrap="square" rtlCol="0">
+            <a:spAutoFit/>
+          </a:bodyPr>
+          <a:lstStyle/>
+          <a:p>
+            <a:r>
+              <a:rPr lang="fr-CH" b="1" dirty="0" err="1"/>
+              <a:t>Where</a:t>
+            </a:r>
+            <a:r>
+              <a:rPr lang="fr-CH" b="1" dirty="0"/>
+              <a:t>: </a:t>
+            </a:r>
+            <a:r>
+              <a:rPr lang="fr-CH" dirty="0" err="1"/>
+              <a:t>overview</a:t>
+            </a:r>
+            <a:r>
+              <a:rPr lang="fr-CH" dirty="0"/>
+              <a:t>&gt;index</a:t>
+            </a:r>
+          </a:p>
+          <a:p>
+            <a:r>
+              <a:rPr lang="fr-CH" b="1" dirty="0"/>
+              <a:t>Name: </a:t>
+            </a:r>
+            <a:r>
+              <a:rPr lang="en-US" dirty="0"/>
+              <a:t>ModelFramework.png </a:t>
+            </a:r>
+            <a:endParaRPr lang="fr-CH" b="1" dirty="0"/>
+          </a:p>
+          <a:p>
+            <a:r>
+              <a:rPr lang="en-US" b="1" dirty="0"/>
+              <a:t>Caption</a:t>
+            </a:r>
+            <a:r>
+              <a:rPr lang="en-US" dirty="0"/>
+              <a:t>: Domestic energy demand model framework using </a:t>
+            </a:r>
+            <a:r>
+              <a:rPr lang="en-US" dirty="0" err="1"/>
+              <a:t>demod</a:t>
+            </a:r>
+            <a:r>
+              <a:rPr lang="en-US" dirty="0"/>
+              <a:t>: a possible configuration</a:t>
+            </a:r>
+            <a:endParaRPr lang="en-US" b="1" dirty="0"/>
+          </a:p>
+        </p:txBody>
+      </p:sp>
+      <p:sp>
+        <p:nvSpPr>
+          <p:cNvPr id="61" name="Rectangle 60">
+            <a:extLst>
+              <a:ext uri="{FF2B5EF4-FFF2-40B4-BE49-F238E27FC236}">
+                <a16:creationId xmlns:a16="http://schemas.microsoft.com/office/drawing/2014/main" id="{4666A7A1-E1A7-48A5-83B8-B58C19AA6DC4}"/>
+              </a:ext>
+            </a:extLst>
+          </p:cNvPr>
+          <p:cNvSpPr/>
+          <p:nvPr/>
+        </p:nvSpPr>
+        <p:spPr>
+          <a:xfrm>
+            <a:off x="3275451" y="4780192"/>
+            <a:ext cx="836593" cy="380329"/>
+          </a:xfrm>
+          <a:prstGeom prst="rect">
+            <a:avLst/>
+          </a:prstGeom>
+          <a:pattFill prst="wdUpDiag">
+            <a:fgClr>
+              <a:schemeClr val="tx2">
+                <a:lumMod val="20000"/>
+                <a:lumOff val="80000"/>
+              </a:schemeClr>
+            </a:fgClr>
+            <a:bgClr>
+              <a:schemeClr val="bg1"/>
+            </a:bgClr>
+          </a:pattFill>
+          <a:ln w="9525">
+            <a:solidFill>
+              <a:schemeClr val="tx1"/>
+            </a:solidFill>
+          </a:ln>
+        </p:spPr>
+        <p:style>
+          <a:lnRef idx="2">
+            <a:schemeClr val="accent1">
+              <a:shade val="50000"/>
+            </a:schemeClr>
+          </a:lnRef>
+          <a:fillRef idx="1">
+            <a:schemeClr val="accent1"/>
+          </a:fillRef>
+          <a:effectRef idx="0">
+            <a:schemeClr val="accent1"/>
+          </a:effectRef>
+          <a:fontRef idx="minor">
+            <a:schemeClr val="lt1"/>
+          </a:fontRef>
+        </p:style>
+        <p:txBody>
+          <a:bodyPr rtlCol="0" anchor="ctr"/>
+          <a:lstStyle/>
+          <a:p>
+            <a:pPr algn="ctr"/>
+            <a:r>
+              <a:rPr lang="en-US" sz="700" b="1" dirty="0">
+                <a:solidFill>
+                  <a:schemeClr val="tx1"/>
+                </a:solidFill>
+              </a:rPr>
+              <a:t>Historical weather data</a:t>
+            </a:r>
+          </a:p>
+        </p:txBody>
+      </p:sp>
+      <p:cxnSp>
+        <p:nvCxnSpPr>
+          <p:cNvPr id="62" name="Straight Arrow Connector 61">
+            <a:extLst>
+              <a:ext uri="{FF2B5EF4-FFF2-40B4-BE49-F238E27FC236}">
+                <a16:creationId xmlns:a16="http://schemas.microsoft.com/office/drawing/2014/main" id="{CE83B118-6D9E-404E-A6D1-349F406CECB0}"/>
+              </a:ext>
+            </a:extLst>
+          </p:cNvPr>
+          <p:cNvCxnSpPr>
+            <a:cxnSpLocks/>
+          </p:cNvCxnSpPr>
+          <p:nvPr/>
+        </p:nvCxnSpPr>
+        <p:spPr>
+          <a:xfrm>
+            <a:off x="3484081" y="5160521"/>
+            <a:ext cx="0" cy="447868"/>
+          </a:xfrm>
+          <a:prstGeom prst="straightConnector1">
+            <a:avLst/>
+          </a:prstGeom>
+          <a:ln>
+            <a:solidFill>
+              <a:schemeClr val="tx1"/>
+            </a:solidFill>
+            <a:tailEnd type="triangle"/>
+          </a:ln>
+        </p:spPr>
+        <p:style>
+          <a:lnRef idx="1">
+            <a:schemeClr val="accent1"/>
+          </a:lnRef>
+          <a:fillRef idx="0">
+            <a:schemeClr val="accent1"/>
+          </a:fillRef>
+          <a:effectRef idx="0">
+            <a:schemeClr val="accent1"/>
+          </a:effectRef>
+          <a:fontRef idx="minor">
+            <a:schemeClr val="tx1"/>
+          </a:fontRef>
+        </p:style>
+      </p:cxnSp>
+      <p:cxnSp>
+        <p:nvCxnSpPr>
+          <p:cNvPr id="65" name="Connector: Elbow 64">
+            <a:extLst>
+              <a:ext uri="{FF2B5EF4-FFF2-40B4-BE49-F238E27FC236}">
+                <a16:creationId xmlns:a16="http://schemas.microsoft.com/office/drawing/2014/main" id="{F38CEA34-732A-4BDC-9E59-ED244A3B49CC}"/>
+              </a:ext>
+            </a:extLst>
+          </p:cNvPr>
+          <p:cNvCxnSpPr>
+            <a:cxnSpLocks/>
+            <a:stCxn id="20" idx="1"/>
+            <a:endCxn id="23" idx="0"/>
+          </p:cNvCxnSpPr>
+          <p:nvPr/>
+        </p:nvCxnSpPr>
+        <p:spPr>
+          <a:xfrm rot="10800000" flipV="1">
+            <a:off x="6795276" y="5173312"/>
+            <a:ext cx="661984" cy="465305"/>
+          </a:xfrm>
+          <a:prstGeom prst="bentConnector2">
+            <a:avLst/>
+          </a:prstGeom>
+          <a:ln>
+            <a:solidFill>
+              <a:schemeClr val="tx1"/>
+            </a:solidFill>
+            <a:tailEnd type="triangle"/>
+          </a:ln>
+        </p:spPr>
+        <p:style>
+          <a:lnRef idx="1">
+            <a:schemeClr val="accent1"/>
+          </a:lnRef>
+          <a:fillRef idx="0">
+            <a:schemeClr val="accent1"/>
+          </a:fillRef>
+          <a:effectRef idx="0">
+            <a:schemeClr val="accent1"/>
+          </a:effectRef>
+          <a:fontRef idx="minor">
+            <a:schemeClr val="tx1"/>
+          </a:fontRef>
+        </p:style>
+      </p:cxnSp>
+      <p:grpSp>
+        <p:nvGrpSpPr>
+          <p:cNvPr id="68" name="Group 67">
+            <a:extLst>
+              <a:ext uri="{FF2B5EF4-FFF2-40B4-BE49-F238E27FC236}">
+                <a16:creationId xmlns:a16="http://schemas.microsoft.com/office/drawing/2014/main" id="{28A5942F-3576-479D-BBD2-9F2DAC6F3170}"/>
+              </a:ext>
+            </a:extLst>
+          </p:cNvPr>
+          <p:cNvGrpSpPr/>
+          <p:nvPr/>
+        </p:nvGrpSpPr>
+        <p:grpSpPr>
+          <a:xfrm>
+            <a:off x="6687113" y="5394507"/>
+            <a:ext cx="212406" cy="177839"/>
+            <a:chOff x="6441612" y="2438619"/>
+            <a:chExt cx="212406" cy="177839"/>
+          </a:xfrm>
+        </p:grpSpPr>
+        <p:cxnSp>
+          <p:nvCxnSpPr>
+            <p:cNvPr id="69" name="Straight Connector 68">
+              <a:extLst>
+                <a:ext uri="{FF2B5EF4-FFF2-40B4-BE49-F238E27FC236}">
+                  <a16:creationId xmlns:a16="http://schemas.microsoft.com/office/drawing/2014/main" id="{13B0CFE7-5B70-42BC-B090-48B6331425A1}"/>
+                </a:ext>
+              </a:extLst>
+            </p:cNvPr>
+            <p:cNvCxnSpPr>
+              <a:cxnSpLocks/>
+            </p:cNvCxnSpPr>
+            <p:nvPr/>
+          </p:nvCxnSpPr>
+          <p:spPr>
+            <a:xfrm>
+              <a:off x="6443003" y="2533114"/>
+              <a:ext cx="211015" cy="0"/>
+            </a:xfrm>
+            <a:prstGeom prst="line">
+              <a:avLst/>
+            </a:prstGeom>
+            <a:ln>
+              <a:solidFill>
+                <a:schemeClr val="tx1"/>
+              </a:solidFill>
+            </a:ln>
+          </p:spPr>
+          <p:style>
+            <a:lnRef idx="1">
+              <a:schemeClr val="accent1"/>
+            </a:lnRef>
+            <a:fillRef idx="0">
+              <a:schemeClr val="accent1"/>
+            </a:fillRef>
+            <a:effectRef idx="0">
+              <a:schemeClr val="accent1"/>
+            </a:effectRef>
+            <a:fontRef idx="minor">
+              <a:schemeClr val="tx1"/>
+            </a:fontRef>
+          </p:style>
+        </p:cxnSp>
+        <p:sp>
+          <p:nvSpPr>
+            <p:cNvPr id="70" name="Oval 69">
+              <a:extLst>
+                <a:ext uri="{FF2B5EF4-FFF2-40B4-BE49-F238E27FC236}">
+                  <a16:creationId xmlns:a16="http://schemas.microsoft.com/office/drawing/2014/main" id="{9604BC7C-8828-4ED1-BAAA-E9CF2EC8E94E}"/>
+                </a:ext>
+              </a:extLst>
+            </p:cNvPr>
+            <p:cNvSpPr/>
+            <p:nvPr/>
+          </p:nvSpPr>
+          <p:spPr>
+            <a:xfrm>
+              <a:off x="6495297" y="2479901"/>
+              <a:ext cx="106425" cy="106425"/>
+            </a:xfrm>
+            <a:prstGeom prst="ellipse">
+              <a:avLst/>
+            </a:prstGeom>
+            <a:solidFill>
+              <a:schemeClr val="bg1"/>
+            </a:solidFill>
+            <a:ln w="9525">
+              <a:solidFill>
+                <a:schemeClr val="tx1"/>
+              </a:solidFill>
+            </a:ln>
+          </p:spPr>
+          <p:style>
+            <a:lnRef idx="2">
+              <a:schemeClr val="accent1">
+                <a:shade val="50000"/>
+              </a:schemeClr>
+            </a:lnRef>
+            <a:fillRef idx="1">
+              <a:schemeClr val="accent1"/>
+            </a:fillRef>
+            <a:effectRef idx="0">
+              <a:schemeClr val="accent1"/>
+            </a:effectRef>
+            <a:fontRef idx="minor">
+              <a:schemeClr val="lt1"/>
+            </a:fontRef>
+          </p:style>
+          <p:txBody>
+            <a:bodyPr rtlCol="0" anchor="ctr"/>
+            <a:lstStyle/>
+            <a:p>
+              <a:pPr algn="ctr"/>
+              <a:endParaRPr lang="en-US"/>
+            </a:p>
+          </p:txBody>
+        </p:sp>
+        <p:sp>
+          <p:nvSpPr>
+            <p:cNvPr id="71" name="Rectangle 70">
+              <a:extLst>
+                <a:ext uri="{FF2B5EF4-FFF2-40B4-BE49-F238E27FC236}">
+                  <a16:creationId xmlns:a16="http://schemas.microsoft.com/office/drawing/2014/main" id="{F67A0D3D-3B82-451D-ACB2-FCA70566C02B}"/>
+                </a:ext>
+              </a:extLst>
+            </p:cNvPr>
+            <p:cNvSpPr/>
+            <p:nvPr/>
+          </p:nvSpPr>
+          <p:spPr>
+            <a:xfrm>
+              <a:off x="6441612" y="2550328"/>
+              <a:ext cx="211015" cy="45719"/>
+            </a:xfrm>
+            <a:prstGeom prst="rect">
+              <a:avLst/>
+            </a:prstGeom>
+            <a:solidFill>
+              <a:schemeClr val="bg1"/>
+            </a:solidFill>
+            <a:ln>
+              <a:solidFill>
+                <a:schemeClr val="bg1"/>
+              </a:solidFill>
+            </a:ln>
+          </p:spPr>
+          <p:style>
+            <a:lnRef idx="2">
+              <a:schemeClr val="accent1">
+                <a:shade val="50000"/>
+              </a:schemeClr>
+            </a:lnRef>
+            <a:fillRef idx="1">
+              <a:schemeClr val="accent1"/>
+            </a:fillRef>
+            <a:effectRef idx="0">
+              <a:schemeClr val="accent1"/>
+            </a:effectRef>
+            <a:fontRef idx="minor">
+              <a:schemeClr val="lt1"/>
+            </a:fontRef>
+          </p:style>
+          <p:txBody>
+            <a:bodyPr rtlCol="0" anchor="ctr"/>
+            <a:lstStyle/>
+            <a:p>
+              <a:pPr algn="ctr"/>
+              <a:endParaRPr lang="en-US"/>
+            </a:p>
+          </p:txBody>
+        </p:sp>
+        <p:cxnSp>
+          <p:nvCxnSpPr>
+            <p:cNvPr id="72" name="Straight Connector 71">
+              <a:extLst>
+                <a:ext uri="{FF2B5EF4-FFF2-40B4-BE49-F238E27FC236}">
+                  <a16:creationId xmlns:a16="http://schemas.microsoft.com/office/drawing/2014/main" id="{E6090024-FBE3-4988-8FF8-9DB9C4B205A3}"/>
+                </a:ext>
+              </a:extLst>
+            </p:cNvPr>
+            <p:cNvCxnSpPr>
+              <a:cxnSpLocks/>
+            </p:cNvCxnSpPr>
+            <p:nvPr/>
+          </p:nvCxnSpPr>
+          <p:spPr>
+            <a:xfrm>
+              <a:off x="6551624" y="2438619"/>
+              <a:ext cx="0" cy="177839"/>
+            </a:xfrm>
+            <a:prstGeom prst="line">
+              <a:avLst/>
+            </a:prstGeom>
+            <a:ln>
+              <a:solidFill>
+                <a:schemeClr val="tx1"/>
+              </a:solidFill>
+            </a:ln>
+          </p:spPr>
+          <p:style>
+            <a:lnRef idx="1">
+              <a:schemeClr val="accent1"/>
+            </a:lnRef>
+            <a:fillRef idx="0">
+              <a:schemeClr val="accent1"/>
+            </a:fillRef>
+            <a:effectRef idx="0">
+              <a:schemeClr val="accent1"/>
+            </a:effectRef>
+            <a:fontRef idx="minor">
+              <a:schemeClr val="tx1"/>
+            </a:fontRef>
+          </p:style>
+        </p:cxnSp>
+      </p:grpSp>
+      <p:cxnSp>
+        <p:nvCxnSpPr>
+          <p:cNvPr id="79" name="Straight Arrow Connector 78">
+            <a:extLst>
+              <a:ext uri="{FF2B5EF4-FFF2-40B4-BE49-F238E27FC236}">
+                <a16:creationId xmlns:a16="http://schemas.microsoft.com/office/drawing/2014/main" id="{5B6DE6C5-CAA8-494B-979E-55AD05EBD456}"/>
+              </a:ext>
+            </a:extLst>
+          </p:cNvPr>
+          <p:cNvCxnSpPr>
+            <a:cxnSpLocks/>
+            <a:stCxn id="24" idx="3"/>
+            <a:endCxn id="23" idx="1"/>
+          </p:cNvCxnSpPr>
+          <p:nvPr/>
+        </p:nvCxnSpPr>
+        <p:spPr>
+          <a:xfrm flipV="1">
+            <a:off x="6127683" y="5803949"/>
+            <a:ext cx="212391" cy="1288"/>
+          </a:xfrm>
+          <a:prstGeom prst="straightConnector1">
+            <a:avLst/>
+          </a:prstGeom>
+          <a:ln>
+            <a:solidFill>
+              <a:schemeClr val="tx1"/>
+            </a:solidFill>
+            <a:tailEnd type="triangle"/>
+          </a:ln>
+        </p:spPr>
+        <p:style>
+          <a:lnRef idx="1">
+            <a:schemeClr val="accent1"/>
+          </a:lnRef>
+          <a:fillRef idx="0">
+            <a:schemeClr val="accent1"/>
+          </a:fillRef>
+          <a:effectRef idx="0">
+            <a:schemeClr val="accent1"/>
+          </a:effectRef>
+          <a:fontRef idx="minor">
+            <a:schemeClr val="tx1"/>
+          </a:fontRef>
+        </p:style>
+      </p:cxnSp>
+      <p:grpSp>
+        <p:nvGrpSpPr>
+          <p:cNvPr id="88" name="Group 87">
+            <a:extLst>
+              <a:ext uri="{FF2B5EF4-FFF2-40B4-BE49-F238E27FC236}">
+                <a16:creationId xmlns:a16="http://schemas.microsoft.com/office/drawing/2014/main" id="{05D72727-5227-40E5-92A3-CBAE5D59227D}"/>
+              </a:ext>
+            </a:extLst>
+          </p:cNvPr>
+          <p:cNvGrpSpPr/>
+          <p:nvPr/>
+        </p:nvGrpSpPr>
+        <p:grpSpPr>
+          <a:xfrm>
+            <a:off x="6804177" y="5080411"/>
+            <a:ext cx="212406" cy="177839"/>
+            <a:chOff x="6441612" y="2438619"/>
+            <a:chExt cx="212406" cy="177839"/>
+          </a:xfrm>
+        </p:grpSpPr>
+        <p:cxnSp>
+          <p:nvCxnSpPr>
+            <p:cNvPr id="89" name="Straight Connector 88">
+              <a:extLst>
+                <a:ext uri="{FF2B5EF4-FFF2-40B4-BE49-F238E27FC236}">
+                  <a16:creationId xmlns:a16="http://schemas.microsoft.com/office/drawing/2014/main" id="{4C4DAFE7-4D0E-4D32-8740-56B084BBFF81}"/>
+                </a:ext>
+              </a:extLst>
+            </p:cNvPr>
+            <p:cNvCxnSpPr>
+              <a:cxnSpLocks/>
+            </p:cNvCxnSpPr>
+            <p:nvPr/>
+          </p:nvCxnSpPr>
+          <p:spPr>
+            <a:xfrm>
+              <a:off x="6443003" y="2533114"/>
+              <a:ext cx="211015" cy="0"/>
+            </a:xfrm>
+            <a:prstGeom prst="line">
+              <a:avLst/>
+            </a:prstGeom>
+            <a:ln>
+              <a:solidFill>
+                <a:schemeClr val="tx1"/>
+              </a:solidFill>
+            </a:ln>
+          </p:spPr>
+          <p:style>
+            <a:lnRef idx="1">
+              <a:schemeClr val="accent1"/>
+            </a:lnRef>
+            <a:fillRef idx="0">
+              <a:schemeClr val="accent1"/>
+            </a:fillRef>
+            <a:effectRef idx="0">
+              <a:schemeClr val="accent1"/>
+            </a:effectRef>
+            <a:fontRef idx="minor">
+              <a:schemeClr val="tx1"/>
+            </a:fontRef>
+          </p:style>
+        </p:cxnSp>
+        <p:sp>
+          <p:nvSpPr>
+            <p:cNvPr id="90" name="Oval 89">
+              <a:extLst>
+                <a:ext uri="{FF2B5EF4-FFF2-40B4-BE49-F238E27FC236}">
+                  <a16:creationId xmlns:a16="http://schemas.microsoft.com/office/drawing/2014/main" id="{4AC03B65-319D-4D21-B827-84F48BFE72B2}"/>
+                </a:ext>
+              </a:extLst>
+            </p:cNvPr>
+            <p:cNvSpPr/>
+            <p:nvPr/>
+          </p:nvSpPr>
+          <p:spPr>
+            <a:xfrm>
+              <a:off x="6495297" y="2479901"/>
+              <a:ext cx="106425" cy="106425"/>
+            </a:xfrm>
+            <a:prstGeom prst="ellipse">
+              <a:avLst/>
+            </a:prstGeom>
+            <a:solidFill>
+              <a:schemeClr val="bg1"/>
+            </a:solidFill>
+            <a:ln w="9525">
+              <a:solidFill>
+                <a:schemeClr val="tx1"/>
+              </a:solidFill>
+            </a:ln>
+          </p:spPr>
+          <p:style>
+            <a:lnRef idx="2">
+              <a:schemeClr val="accent1">
+                <a:shade val="50000"/>
+              </a:schemeClr>
+            </a:lnRef>
+            <a:fillRef idx="1">
+              <a:schemeClr val="accent1"/>
+            </a:fillRef>
+            <a:effectRef idx="0">
+              <a:schemeClr val="accent1"/>
+            </a:effectRef>
+            <a:fontRef idx="minor">
+              <a:schemeClr val="lt1"/>
+            </a:fontRef>
+          </p:style>
+          <p:txBody>
+            <a:bodyPr rtlCol="0" anchor="ctr"/>
+            <a:lstStyle/>
+            <a:p>
+              <a:pPr algn="ctr"/>
+              <a:endParaRPr lang="en-US"/>
+            </a:p>
+          </p:txBody>
+        </p:sp>
+        <p:sp>
+          <p:nvSpPr>
+            <p:cNvPr id="91" name="Rectangle 90">
+              <a:extLst>
+                <a:ext uri="{FF2B5EF4-FFF2-40B4-BE49-F238E27FC236}">
+                  <a16:creationId xmlns:a16="http://schemas.microsoft.com/office/drawing/2014/main" id="{C48CB11A-2A3F-490A-86B6-471761CA1073}"/>
+                </a:ext>
+              </a:extLst>
+            </p:cNvPr>
+            <p:cNvSpPr/>
+            <p:nvPr/>
+          </p:nvSpPr>
+          <p:spPr>
+            <a:xfrm>
+              <a:off x="6441612" y="2550328"/>
+              <a:ext cx="211015" cy="45719"/>
+            </a:xfrm>
+            <a:prstGeom prst="rect">
+              <a:avLst/>
+            </a:prstGeom>
+            <a:solidFill>
+              <a:schemeClr val="bg1"/>
+            </a:solidFill>
+            <a:ln>
+              <a:solidFill>
+                <a:schemeClr val="bg1"/>
+              </a:solidFill>
+            </a:ln>
+          </p:spPr>
+          <p:style>
+            <a:lnRef idx="2">
+              <a:schemeClr val="accent1">
+                <a:shade val="50000"/>
+              </a:schemeClr>
+            </a:lnRef>
+            <a:fillRef idx="1">
+              <a:schemeClr val="accent1"/>
+            </a:fillRef>
+            <a:effectRef idx="0">
+              <a:schemeClr val="accent1"/>
+            </a:effectRef>
+            <a:fontRef idx="minor">
+              <a:schemeClr val="lt1"/>
+            </a:fontRef>
+          </p:style>
+          <p:txBody>
+            <a:bodyPr rtlCol="0" anchor="ctr"/>
+            <a:lstStyle/>
+            <a:p>
+              <a:pPr algn="ctr"/>
+              <a:endParaRPr lang="en-US"/>
+            </a:p>
+          </p:txBody>
+        </p:sp>
+        <p:cxnSp>
+          <p:nvCxnSpPr>
+            <p:cNvPr id="92" name="Straight Connector 91">
+              <a:extLst>
+                <a:ext uri="{FF2B5EF4-FFF2-40B4-BE49-F238E27FC236}">
+                  <a16:creationId xmlns:a16="http://schemas.microsoft.com/office/drawing/2014/main" id="{50682F11-8565-42DF-8008-3BC9254639DB}"/>
+                </a:ext>
+              </a:extLst>
+            </p:cNvPr>
+            <p:cNvCxnSpPr>
+              <a:cxnSpLocks/>
+            </p:cNvCxnSpPr>
+            <p:nvPr/>
+          </p:nvCxnSpPr>
+          <p:spPr>
+            <a:xfrm>
+              <a:off x="6551624" y="2438619"/>
+              <a:ext cx="0" cy="177839"/>
+            </a:xfrm>
+            <a:prstGeom prst="line">
+              <a:avLst/>
+            </a:prstGeom>
+            <a:ln>
+              <a:solidFill>
+                <a:schemeClr val="tx1"/>
+              </a:solidFill>
+            </a:ln>
+          </p:spPr>
+          <p:style>
+            <a:lnRef idx="1">
+              <a:schemeClr val="accent1"/>
+            </a:lnRef>
+            <a:fillRef idx="0">
+              <a:schemeClr val="accent1"/>
+            </a:fillRef>
+            <a:effectRef idx="0">
+              <a:schemeClr val="accent1"/>
+            </a:effectRef>
+            <a:fontRef idx="minor">
+              <a:schemeClr val="tx1"/>
+            </a:fontRef>
+          </p:style>
+        </p:cxnSp>
+      </p:grpSp>
+      <p:sp>
+        <p:nvSpPr>
+          <p:cNvPr id="219" name="Oval 218">
+            <a:extLst>
+              <a:ext uri="{FF2B5EF4-FFF2-40B4-BE49-F238E27FC236}">
+                <a16:creationId xmlns:a16="http://schemas.microsoft.com/office/drawing/2014/main" id="{246272BB-B50B-4D56-A702-68A5A062E799}"/>
+              </a:ext>
+            </a:extLst>
+          </p:cNvPr>
+          <p:cNvSpPr/>
+          <p:nvPr/>
+        </p:nvSpPr>
+        <p:spPr>
+          <a:xfrm>
+            <a:off x="1082786" y="3285941"/>
+            <a:ext cx="380329" cy="380329"/>
+          </a:xfrm>
+          <a:prstGeom prst="ellipse">
+            <a:avLst/>
+          </a:prstGeom>
+          <a:solidFill>
+            <a:srgbClr val="CAE5F7"/>
+          </a:solidFill>
+          <a:ln>
+            <a:solidFill>
+              <a:schemeClr val="tx1"/>
+            </a:solidFill>
+          </a:ln>
+        </p:spPr>
+        <p:style>
+          <a:lnRef idx="2">
+            <a:schemeClr val="accent1">
+              <a:shade val="50000"/>
+            </a:schemeClr>
+          </a:lnRef>
+          <a:fillRef idx="1">
+            <a:schemeClr val="accent1"/>
+          </a:fillRef>
+          <a:effectRef idx="0">
+            <a:schemeClr val="accent1"/>
+          </a:effectRef>
+          <a:fontRef idx="minor">
+            <a:schemeClr val="lt1"/>
+          </a:fontRef>
+        </p:style>
+        <p:txBody>
+          <a:bodyPr rtlCol="0" anchor="ctr"/>
+          <a:lstStyle/>
+          <a:p>
+            <a:pPr algn="ctr"/>
+            <a:endParaRPr lang="en-US"/>
+          </a:p>
+        </p:txBody>
+      </p:sp>
+      <p:sp>
+        <p:nvSpPr>
+          <p:cNvPr id="220" name="Oval 219">
+            <a:extLst>
+              <a:ext uri="{FF2B5EF4-FFF2-40B4-BE49-F238E27FC236}">
+                <a16:creationId xmlns:a16="http://schemas.microsoft.com/office/drawing/2014/main" id="{C2D0861B-038D-42F9-8460-0CD5E3363660}"/>
+              </a:ext>
+            </a:extLst>
+          </p:cNvPr>
+          <p:cNvSpPr/>
+          <p:nvPr/>
+        </p:nvSpPr>
+        <p:spPr>
+          <a:xfrm>
+            <a:off x="1082785" y="3809296"/>
+            <a:ext cx="380329" cy="380329"/>
+          </a:xfrm>
+          <a:prstGeom prst="ellipse">
+            <a:avLst/>
+          </a:prstGeom>
+          <a:solidFill>
+            <a:srgbClr val="FFFFC2"/>
+          </a:solidFill>
+          <a:ln>
+            <a:solidFill>
+              <a:schemeClr val="tx1"/>
+            </a:solidFill>
+          </a:ln>
+        </p:spPr>
+        <p:style>
+          <a:lnRef idx="2">
+            <a:schemeClr val="accent1">
+              <a:shade val="50000"/>
+            </a:schemeClr>
+          </a:lnRef>
+          <a:fillRef idx="1">
+            <a:schemeClr val="accent1"/>
+          </a:fillRef>
+          <a:effectRef idx="0">
+            <a:schemeClr val="accent1"/>
+          </a:effectRef>
+          <a:fontRef idx="minor">
+            <a:schemeClr val="lt1"/>
+          </a:fontRef>
+        </p:style>
+        <p:txBody>
+          <a:bodyPr rtlCol="0" anchor="ctr"/>
+          <a:lstStyle/>
+          <a:p>
+            <a:pPr algn="ctr"/>
+            <a:endParaRPr lang="en-US"/>
+          </a:p>
+        </p:txBody>
+      </p:sp>
+      <p:sp>
+        <p:nvSpPr>
+          <p:cNvPr id="221" name="Oval 220">
+            <a:extLst>
+              <a:ext uri="{FF2B5EF4-FFF2-40B4-BE49-F238E27FC236}">
+                <a16:creationId xmlns:a16="http://schemas.microsoft.com/office/drawing/2014/main" id="{EEE377C3-0803-4494-BFB7-D7F581FF34A1}"/>
+              </a:ext>
+            </a:extLst>
+          </p:cNvPr>
+          <p:cNvSpPr/>
+          <p:nvPr/>
+        </p:nvSpPr>
+        <p:spPr>
+          <a:xfrm>
+            <a:off x="1082784" y="4332651"/>
+            <a:ext cx="380329" cy="380329"/>
+          </a:xfrm>
+          <a:prstGeom prst="ellipse">
+            <a:avLst/>
+          </a:prstGeom>
+          <a:solidFill>
+            <a:srgbClr val="F6CCCC"/>
+          </a:solidFill>
+          <a:ln>
+            <a:solidFill>
+              <a:schemeClr val="tx1"/>
+            </a:solidFill>
+          </a:ln>
+        </p:spPr>
+        <p:style>
+          <a:lnRef idx="2">
+            <a:schemeClr val="accent1">
+              <a:shade val="50000"/>
+            </a:schemeClr>
+          </a:lnRef>
+          <a:fillRef idx="1">
+            <a:schemeClr val="accent1"/>
+          </a:fillRef>
+          <a:effectRef idx="0">
+            <a:schemeClr val="accent1"/>
+          </a:effectRef>
+          <a:fontRef idx="minor">
+            <a:schemeClr val="lt1"/>
+          </a:fontRef>
+        </p:style>
+        <p:txBody>
+          <a:bodyPr rtlCol="0" anchor="ctr"/>
+          <a:lstStyle/>
+          <a:p>
+            <a:pPr algn="ctr"/>
+            <a:endParaRPr lang="en-US"/>
+          </a:p>
+        </p:txBody>
+      </p:sp>
+      <p:sp>
+        <p:nvSpPr>
+          <p:cNvPr id="222" name="Oval 221">
+            <a:extLst>
+              <a:ext uri="{FF2B5EF4-FFF2-40B4-BE49-F238E27FC236}">
+                <a16:creationId xmlns:a16="http://schemas.microsoft.com/office/drawing/2014/main" id="{A61D99AB-2A7D-4D66-9D69-BE4A97DDF0D6}"/>
+              </a:ext>
+            </a:extLst>
+          </p:cNvPr>
+          <p:cNvSpPr/>
+          <p:nvPr/>
+        </p:nvSpPr>
+        <p:spPr>
+          <a:xfrm>
+            <a:off x="1082786" y="4834650"/>
+            <a:ext cx="380329" cy="380329"/>
+          </a:xfrm>
+          <a:prstGeom prst="ellipse">
+            <a:avLst/>
+          </a:prstGeom>
+          <a:solidFill>
+            <a:srgbClr val="CCEFDC"/>
+          </a:solidFill>
+          <a:ln>
+            <a:solidFill>
+              <a:schemeClr val="tx1"/>
+            </a:solidFill>
+          </a:ln>
+        </p:spPr>
+        <p:style>
+          <a:lnRef idx="2">
+            <a:schemeClr val="accent1">
+              <a:shade val="50000"/>
+            </a:schemeClr>
+          </a:lnRef>
+          <a:fillRef idx="1">
+            <a:schemeClr val="accent1"/>
+          </a:fillRef>
+          <a:effectRef idx="0">
+            <a:schemeClr val="accent1"/>
+          </a:effectRef>
+          <a:fontRef idx="minor">
+            <a:schemeClr val="lt1"/>
+          </a:fontRef>
+        </p:style>
+        <p:txBody>
+          <a:bodyPr rtlCol="0" anchor="ctr"/>
+          <a:lstStyle/>
+          <a:p>
+            <a:pPr algn="ctr"/>
+            <a:endParaRPr lang="en-US"/>
+          </a:p>
+        </p:txBody>
+      </p:sp>
+    </p:spTree>
+    <p:extLst>
+      <p:ext uri="{BB962C8B-B14F-4D97-AF65-F5344CB8AC3E}">
+        <p14:creationId xmlns:p14="http://schemas.microsoft.com/office/powerpoint/2010/main" val="923345229"/>
+      </p:ext>
+    </p:extLst>
+  </p:cSld>
+  <p:clrMapOvr>
+    <a:masterClrMapping/>
+  </p:clrMapOvr>
+</p:sld>
+</file>
+
+<file path=ppt/slides/slide3.xml><?xml version="1.0" encoding="utf-8"?>
 <p:sld xmlns:a="http://schemas.openxmlformats.org/drawingml/2006/main" xmlns:r="http://schemas.openxmlformats.org/officeDocument/2006/relationships" xmlns:p="http://schemas.openxmlformats.org/presentationml/2006/main">
   <p:cSld>
     <p:spTree>
@@ -15493,12 +19031,29 @@
 </file>
 
 <file path=customXml/item1.xml><?xml version="1.0" encoding="utf-8"?>
-<?mso-contentType ?>
-<FormTemplates xmlns="http://schemas.microsoft.com/sharepoint/v3/contenttype/forms">
-  <Display>DocumentLibraryForm</Display>
-  <Edit>DocumentLibraryForm</Edit>
-  <New>DocumentLibraryForm</New>
-</FormTemplates>
+<p:properties xmlns:p="http://schemas.microsoft.com/office/2006/metadata/properties" xmlns:xsi="http://www.w3.org/2001/XMLSchema-instance" xmlns:pc="http://schemas.microsoft.com/office/infopath/2007/PartnerControls">
+  <documentManagement>
+    <EPFLAuthor xmlns="366578e5-d8fa-4ca3-80b4-96d4f4020af2">
+      <UserInfo>
+        <DisplayName/>
+        <AccountId xsi:nil="true"/>
+        <AccountType/>
+      </UserInfo>
+    </EPFLAuthor>
+    <a822da24a7be47f7b2b8d6471b611ecd xmlns="366578e5-d8fa-4ca3-80b4-96d4f4020af2">
+      <Terms xmlns="http://schemas.microsoft.com/office/infopath/2007/PartnerControls">
+        <TermInfo xmlns="http://schemas.microsoft.com/office/infopath/2007/PartnerControls">
+          <TermName xmlns="http://schemas.microsoft.com/office/infopath/2007/PartnerControls">Public</TermName>
+          <TermId xmlns="http://schemas.microsoft.com/office/infopath/2007/PartnerControls">bed90794-060d-40e3-8efd-fc84c2f09e8f</TermId>
+        </TermInfo>
+      </Terms>
+    </a822da24a7be47f7b2b8d6471b611ecd>
+    <EPFLUsageTaxHTField0 xmlns="366578e5-d8fa-4ca3-80b4-96d4f4020af2" xsi:nil="true"/>
+    <TaxCatchAll xmlns="505a1229-fefc-4964-aa43-a843a2e4cec8">
+      <Value>1</Value>
+    </TaxCatchAll>
+  </documentManagement>
+</p:properties>
 </file>
 
 <file path=customXml/item2.xml><?xml version="1.0" encoding="utf-8"?>
@@ -15673,35 +19228,27 @@
 </file>
 
 <file path=customXml/item3.xml><?xml version="1.0" encoding="utf-8"?>
-<p:properties xmlns:p="http://schemas.microsoft.com/office/2006/metadata/properties" xmlns:xsi="http://www.w3.org/2001/XMLSchema-instance" xmlns:pc="http://schemas.microsoft.com/office/infopath/2007/PartnerControls">
-  <documentManagement>
-    <EPFLAuthor xmlns="366578e5-d8fa-4ca3-80b4-96d4f4020af2">
-      <UserInfo>
-        <DisplayName/>
-        <AccountId xsi:nil="true"/>
-        <AccountType/>
-      </UserInfo>
-    </EPFLAuthor>
-    <a822da24a7be47f7b2b8d6471b611ecd xmlns="366578e5-d8fa-4ca3-80b4-96d4f4020af2">
-      <Terms xmlns="http://schemas.microsoft.com/office/infopath/2007/PartnerControls">
-        <TermInfo xmlns="http://schemas.microsoft.com/office/infopath/2007/PartnerControls">
-          <TermName xmlns="http://schemas.microsoft.com/office/infopath/2007/PartnerControls">Public</TermName>
-          <TermId xmlns="http://schemas.microsoft.com/office/infopath/2007/PartnerControls">bed90794-060d-40e3-8efd-fc84c2f09e8f</TermId>
-        </TermInfo>
-      </Terms>
-    </a822da24a7be47f7b2b8d6471b611ecd>
-    <EPFLUsageTaxHTField0 xmlns="366578e5-d8fa-4ca3-80b4-96d4f4020af2" xsi:nil="true"/>
-    <TaxCatchAll xmlns="505a1229-fefc-4964-aa43-a843a2e4cec8">
-      <Value>1</Value>
-    </TaxCatchAll>
-  </documentManagement>
-</p:properties>
+<?mso-contentType ?>
+<FormTemplates xmlns="http://schemas.microsoft.com/sharepoint/v3/contenttype/forms">
+  <Display>DocumentLibraryForm</Display>
+  <Edit>DocumentLibraryForm</Edit>
+  <New>DocumentLibraryForm</New>
+</FormTemplates>
 </file>
 
 <file path=customXml/itemProps1.xml><?xml version="1.0" encoding="utf-8"?>
-<ds:datastoreItem xmlns:ds="http://schemas.openxmlformats.org/officeDocument/2006/customXml" ds:itemID="{B6EC99A6-5E64-4A2A-9ABF-C3A21F434FEC}">
+<ds:datastoreItem xmlns:ds="http://schemas.openxmlformats.org/officeDocument/2006/customXml" ds:itemID="{79A7CB31-E4DC-4063-BDCD-36DC5F1DA1C8}">
   <ds:schemaRefs>
-    <ds:schemaRef ds:uri="http://schemas.microsoft.com/sharepoint/v3/contenttype/forms"/>
+    <ds:schemaRef ds:uri="366578e5-d8fa-4ca3-80b4-96d4f4020af2"/>
+    <ds:schemaRef ds:uri="http://purl.org/dc/elements/1.1/"/>
+    <ds:schemaRef ds:uri="http://schemas.microsoft.com/office/2006/documentManagement/types"/>
+    <ds:schemaRef ds:uri="http://www.w3.org/XML/1998/namespace"/>
+    <ds:schemaRef ds:uri="http://purl.org/dc/dcmitype/"/>
+    <ds:schemaRef ds:uri="http://schemas.openxmlformats.org/package/2006/metadata/core-properties"/>
+    <ds:schemaRef ds:uri="http://schemas.microsoft.com/office/2006/metadata/properties"/>
+    <ds:schemaRef ds:uri="http://purl.org/dc/terms/"/>
+    <ds:schemaRef ds:uri="http://schemas.microsoft.com/office/infopath/2007/PartnerControls"/>
+    <ds:schemaRef ds:uri="505a1229-fefc-4964-aa43-a843a2e4cec8"/>
   </ds:schemaRefs>
 </ds:datastoreItem>
 </file>
@@ -15726,18 +19273,9 @@
 </file>
 
 <file path=customXml/itemProps3.xml><?xml version="1.0" encoding="utf-8"?>
-<ds:datastoreItem xmlns:ds="http://schemas.openxmlformats.org/officeDocument/2006/customXml" ds:itemID="{79A7CB31-E4DC-4063-BDCD-36DC5F1DA1C8}">
+<ds:datastoreItem xmlns:ds="http://schemas.openxmlformats.org/officeDocument/2006/customXml" ds:itemID="{B6EC99A6-5E64-4A2A-9ABF-C3A21F434FEC}">
   <ds:schemaRefs>
-    <ds:schemaRef ds:uri="366578e5-d8fa-4ca3-80b4-96d4f4020af2"/>
-    <ds:schemaRef ds:uri="http://purl.org/dc/elements/1.1/"/>
-    <ds:schemaRef ds:uri="http://schemas.microsoft.com/office/2006/documentManagement/types"/>
-    <ds:schemaRef ds:uri="http://www.w3.org/XML/1998/namespace"/>
-    <ds:schemaRef ds:uri="http://purl.org/dc/dcmitype/"/>
-    <ds:schemaRef ds:uri="http://schemas.openxmlformats.org/package/2006/metadata/core-properties"/>
-    <ds:schemaRef ds:uri="http://schemas.microsoft.com/office/2006/metadata/properties"/>
-    <ds:schemaRef ds:uri="http://purl.org/dc/terms/"/>
-    <ds:schemaRef ds:uri="http://schemas.microsoft.com/office/infopath/2007/PartnerControls"/>
-    <ds:schemaRef ds:uri="505a1229-fefc-4964-aa43-a843a2e4cec8"/>
+    <ds:schemaRef ds:uri="http://schemas.microsoft.com/sharepoint/v3/contenttype/forms"/>
   </ds:schemaRefs>
 </ds:datastoreItem>
 </file>
</xml_diff>